<commit_message>
update file presentasi jBPM
</commit_message>
<xml_diff>
--- a/Eksplorasi WSO2 BPS dan JBPM.pptx
+++ b/Eksplorasi WSO2 BPS dan JBPM.pptx
@@ -11,7 +11,16 @@
     <p:sldId id="259" r:id="rId5"/>
     <p:sldId id="260" r:id="rId6"/>
     <p:sldId id="262" r:id="rId7"/>
-    <p:sldId id="261" r:id="rId8"/>
+    <p:sldId id="263" r:id="rId8"/>
+    <p:sldId id="264" r:id="rId9"/>
+    <p:sldId id="265" r:id="rId10"/>
+    <p:sldId id="266" r:id="rId11"/>
+    <p:sldId id="267" r:id="rId12"/>
+    <p:sldId id="269" r:id="rId13"/>
+    <p:sldId id="270" r:id="rId14"/>
+    <p:sldId id="272" r:id="rId15"/>
+    <p:sldId id="271" r:id="rId16"/>
+    <p:sldId id="261" r:id="rId17"/>
   </p:sldIdLst>
   <p:sldSz cx="12192000" cy="6858000"/>
   <p:notesSz cx="6858000" cy="9144000"/>
@@ -189,7 +198,7 @@
           <a:p>
             <a:fld id="{57005652-591E-4304-91BB-D364AD411A40}" type="datetimeFigureOut">
               <a:rPr lang="en-US" smtClean="0"/>
-              <a:t>11/26/2014</a:t>
+              <a:t>12/3/2014</a:t>
             </a:fld>
             <a:endParaRPr lang="en-US"/>
           </a:p>
@@ -719,7 +728,7 @@
           <a:p>
             <a:fld id="{57005652-591E-4304-91BB-D364AD411A40}" type="datetimeFigureOut">
               <a:rPr lang="en-US" smtClean="0"/>
-              <a:t>11/26/2014</a:t>
+              <a:t>12/3/2014</a:t>
             </a:fld>
             <a:endParaRPr lang="en-US"/>
           </a:p>
@@ -1038,7 +1047,7 @@
           <a:p>
             <a:fld id="{57005652-591E-4304-91BB-D364AD411A40}" type="datetimeFigureOut">
               <a:rPr lang="en-US" smtClean="0"/>
-              <a:t>11/26/2014</a:t>
+              <a:t>12/3/2014</a:t>
             </a:fld>
             <a:endParaRPr lang="en-US"/>
           </a:p>
@@ -1329,7 +1338,7 @@
           <a:p>
             <a:fld id="{57005652-591E-4304-91BB-D364AD411A40}" type="datetimeFigureOut">
               <a:rPr lang="en-US" smtClean="0"/>
-              <a:t>11/26/2014</a:t>
+              <a:t>12/3/2014</a:t>
             </a:fld>
             <a:endParaRPr lang="en-US"/>
           </a:p>
@@ -1909,7 +1918,7 @@
           <a:p>
             <a:fld id="{57005652-591E-4304-91BB-D364AD411A40}" type="datetimeFigureOut">
               <a:rPr lang="en-US" smtClean="0"/>
-              <a:t>11/26/2014</a:t>
+              <a:t>12/3/2014</a:t>
             </a:fld>
             <a:endParaRPr lang="en-US"/>
           </a:p>
@@ -2004,7 +2013,7 @@
           <a:p>
             <a:fld id="{57005652-591E-4304-91BB-D364AD411A40}" type="datetimeFigureOut">
               <a:rPr lang="en-US" smtClean="0"/>
-              <a:t>11/26/2014</a:t>
+              <a:t>12/3/2014</a:t>
             </a:fld>
             <a:endParaRPr lang="en-US"/>
           </a:p>
@@ -2718,7 +2727,7 @@
           <a:p>
             <a:fld id="{57005652-591E-4304-91BB-D364AD411A40}" type="datetimeFigureOut">
               <a:rPr lang="en-US" smtClean="0"/>
-              <a:t>11/26/2014</a:t>
+              <a:t>12/3/2014</a:t>
             </a:fld>
             <a:endParaRPr lang="en-US"/>
           </a:p>
@@ -2975,7 +2984,7 @@
           <a:p>
             <a:fld id="{57005652-591E-4304-91BB-D364AD411A40}" type="datetimeFigureOut">
               <a:rPr lang="en-US" smtClean="0"/>
-              <a:t>11/26/2014</a:t>
+              <a:t>12/3/2014</a:t>
             </a:fld>
             <a:endParaRPr lang="en-US"/>
           </a:p>
@@ -3209,7 +3218,7 @@
           <a:p>
             <a:fld id="{57005652-591E-4304-91BB-D364AD411A40}" type="datetimeFigureOut">
               <a:rPr lang="en-US" smtClean="0"/>
-              <a:t>11/26/2014</a:t>
+              <a:t>12/3/2014</a:t>
             </a:fld>
             <a:endParaRPr lang="en-US"/>
           </a:p>
@@ -3488,7 +3497,7 @@
           <a:p>
             <a:fld id="{57005652-591E-4304-91BB-D364AD411A40}" type="datetimeFigureOut">
               <a:rPr lang="en-US" smtClean="0"/>
-              <a:t>11/26/2014</a:t>
+              <a:t>12/3/2014</a:t>
             </a:fld>
             <a:endParaRPr lang="en-US"/>
           </a:p>
@@ -3779,7 +3788,7 @@
           <a:p>
             <a:fld id="{57005652-591E-4304-91BB-D364AD411A40}" type="datetimeFigureOut">
               <a:rPr lang="en-US" smtClean="0"/>
-              <a:t>11/26/2014</a:t>
+              <a:t>12/3/2014</a:t>
             </a:fld>
             <a:endParaRPr lang="en-US"/>
           </a:p>
@@ -4052,7 +4061,7 @@
           <a:p>
             <a:fld id="{57005652-591E-4304-91BB-D364AD411A40}" type="datetimeFigureOut">
               <a:rPr lang="en-US" smtClean="0"/>
-              <a:t>11/26/2014</a:t>
+              <a:t>12/3/2014</a:t>
             </a:fld>
             <a:endParaRPr lang="en-US"/>
           </a:p>
@@ -4584,11 +4593,7 @@
             </a:r>
             <a:r>
               <a:rPr lang="en-US" dirty="0" smtClean="0"/>
-              <a:t> </a:t>
-            </a:r>
-            <a:r>
-              <a:rPr lang="en-US" dirty="0" smtClean="0"/>
-              <a:t>Alfresco</a:t>
+              <a:t> Alfresco</a:t>
             </a:r>
           </a:p>
           <a:p>
@@ -4728,6 +4733,1298 @@
   <p:clrMapOvr>
     <a:masterClrMapping/>
   </p:clrMapOvr>
+</p:sld>
+</file>
+
+<file path=ppt/slides/slide10.xml><?xml version="1.0" encoding="utf-8"?>
+<p:sld xmlns:a="http://schemas.openxmlformats.org/drawingml/2006/main" xmlns:r="http://schemas.openxmlformats.org/officeDocument/2006/relationships" xmlns:p="http://schemas.openxmlformats.org/presentationml/2006/main">
+  <p:cSld>
+    <p:spTree>
+      <p:nvGrpSpPr>
+        <p:cNvPr id="1" name=""/>
+        <p:cNvGrpSpPr/>
+        <p:nvPr/>
+      </p:nvGrpSpPr>
+      <p:grpSpPr>
+        <a:xfrm>
+          <a:off x="0" y="0"/>
+          <a:ext cx="0" cy="0"/>
+          <a:chOff x="0" y="0"/>
+          <a:chExt cx="0" cy="0"/>
+        </a:xfrm>
+      </p:grpSpPr>
+      <p:pic>
+        <p:nvPicPr>
+          <p:cNvPr id="5" name="Content Placeholder 4"/>
+          <p:cNvPicPr>
+            <a:picLocks noGrp="1" noChangeAspect="1"/>
+          </p:cNvPicPr>
+          <p:nvPr>
+            <p:ph idx="1"/>
+          </p:nvPr>
+        </p:nvPicPr>
+        <p:blipFill>
+          <a:blip r:embed="rId2">
+            <a:extLst>
+              <a:ext uri="{28A0092B-C50C-407E-A947-70E740481C1C}">
+                <a14:useLocalDpi xmlns:a14="http://schemas.microsoft.com/office/drawing/2010/main" val="0"/>
+              </a:ext>
+            </a:extLst>
+          </a:blip>
+          <a:stretch>
+            <a:fillRect/>
+          </a:stretch>
+        </p:blipFill>
+        <p:spPr>
+          <a:xfrm>
+            <a:off x="470969" y="2277880"/>
+            <a:ext cx="5839259" cy="4286845"/>
+          </a:xfrm>
+        </p:spPr>
+      </p:pic>
+      <p:sp>
+        <p:nvSpPr>
+          <p:cNvPr id="3" name="Title 2"/>
+          <p:cNvSpPr>
+            <a:spLocks noGrp="1"/>
+          </p:cNvSpPr>
+          <p:nvPr>
+            <p:ph type="title"/>
+          </p:nvPr>
+        </p:nvSpPr>
+        <p:spPr/>
+        <p:txBody>
+          <a:bodyPr/>
+          <a:lstStyle/>
+          <a:p>
+            <a:r>
+              <a:rPr lang="en-US" dirty="0" err="1" smtClean="0"/>
+              <a:t>jBPM</a:t>
+            </a:r>
+            <a:r>
+              <a:rPr lang="en-US" dirty="0" smtClean="0"/>
+              <a:t> Overview</a:t>
+            </a:r>
+            <a:endParaRPr lang="en-US" dirty="0"/>
+          </a:p>
+        </p:txBody>
+      </p:sp>
+      <p:sp>
+        <p:nvSpPr>
+          <p:cNvPr id="6" name="TextBox 5"/>
+          <p:cNvSpPr txBox="1"/>
+          <p:nvPr/>
+        </p:nvSpPr>
+        <p:spPr>
+          <a:xfrm>
+            <a:off x="6970426" y="2698230"/>
+            <a:ext cx="184731" cy="369332"/>
+          </a:xfrm>
+          <a:prstGeom prst="rect">
+            <a:avLst/>
+          </a:prstGeom>
+          <a:noFill/>
+        </p:spPr>
+        <p:txBody>
+          <a:bodyPr wrap="none" rtlCol="0">
+            <a:spAutoFit/>
+          </a:bodyPr>
+          <a:lstStyle/>
+          <a:p>
+            <a:endParaRPr lang="en-US" dirty="0"/>
+          </a:p>
+        </p:txBody>
+      </p:sp>
+      <p:sp>
+        <p:nvSpPr>
+          <p:cNvPr id="9" name="TextBox 8"/>
+          <p:cNvSpPr txBox="1"/>
+          <p:nvPr/>
+        </p:nvSpPr>
+        <p:spPr>
+          <a:xfrm>
+            <a:off x="6538423" y="2282732"/>
+            <a:ext cx="5093944" cy="1938992"/>
+          </a:xfrm>
+          <a:prstGeom prst="rect">
+            <a:avLst/>
+          </a:prstGeom>
+          <a:noFill/>
+        </p:spPr>
+        <p:txBody>
+          <a:bodyPr wrap="square" rtlCol="0">
+            <a:spAutoFit/>
+          </a:bodyPr>
+          <a:lstStyle/>
+          <a:p>
+            <a:r>
+              <a:rPr lang="en-US" sz="2400" dirty="0"/>
+              <a:t>The Guvnor repository is an optional component that can be used to store all your business processes. It supports collaboration, versioning, etc</a:t>
+            </a:r>
+            <a:r>
+              <a:rPr lang="en-US" sz="2400" dirty="0" smtClean="0"/>
+              <a:t>.</a:t>
+            </a:r>
+            <a:endParaRPr lang="en-US" sz="2400" dirty="0"/>
+          </a:p>
+        </p:txBody>
+      </p:sp>
+      <p:sp>
+        <p:nvSpPr>
+          <p:cNvPr id="8" name="Oval 7"/>
+          <p:cNvSpPr/>
+          <p:nvPr/>
+        </p:nvSpPr>
+        <p:spPr>
+          <a:xfrm>
+            <a:off x="2008682" y="4586990"/>
+            <a:ext cx="1169233" cy="1214203"/>
+          </a:xfrm>
+          <a:prstGeom prst="ellipse">
+            <a:avLst/>
+          </a:prstGeom>
+          <a:noFill/>
+          <a:ln w="76200">
+            <a:solidFill>
+              <a:schemeClr val="accent5"/>
+            </a:solidFill>
+          </a:ln>
+        </p:spPr>
+        <p:style>
+          <a:lnRef idx="2">
+            <a:schemeClr val="accent1">
+              <a:shade val="50000"/>
+            </a:schemeClr>
+          </a:lnRef>
+          <a:fillRef idx="1">
+            <a:schemeClr val="accent1"/>
+          </a:fillRef>
+          <a:effectRef idx="0">
+            <a:schemeClr val="accent1"/>
+          </a:effectRef>
+          <a:fontRef idx="minor">
+            <a:schemeClr val="lt1"/>
+          </a:fontRef>
+        </p:style>
+        <p:txBody>
+          <a:bodyPr rtlCol="0" anchor="ctr"/>
+          <a:lstStyle/>
+          <a:p>
+            <a:pPr algn="ctr"/>
+            <a:endParaRPr lang="en-US"/>
+          </a:p>
+        </p:txBody>
+      </p:sp>
+    </p:spTree>
+    <p:extLst>
+      <p:ext uri="{BB962C8B-B14F-4D97-AF65-F5344CB8AC3E}">
+        <p14:creationId xmlns:p14="http://schemas.microsoft.com/office/powerpoint/2010/main" val="1123575605"/>
+      </p:ext>
+    </p:extLst>
+  </p:cSld>
+  <p:clrMapOvr>
+    <a:masterClrMapping/>
+  </p:clrMapOvr>
+  <p:timing>
+    <p:tnLst>
+      <p:par>
+        <p:cTn id="1" dur="indefinite" restart="never" nodeType="tmRoot"/>
+      </p:par>
+    </p:tnLst>
+  </p:timing>
+</p:sld>
+</file>
+
+<file path=ppt/slides/slide11.xml><?xml version="1.0" encoding="utf-8"?>
+<p:sld xmlns:a="http://schemas.openxmlformats.org/drawingml/2006/main" xmlns:r="http://schemas.openxmlformats.org/officeDocument/2006/relationships" xmlns:p="http://schemas.openxmlformats.org/presentationml/2006/main">
+  <p:cSld>
+    <p:spTree>
+      <p:nvGrpSpPr>
+        <p:cNvPr id="1" name=""/>
+        <p:cNvGrpSpPr/>
+        <p:nvPr/>
+      </p:nvGrpSpPr>
+      <p:grpSpPr>
+        <a:xfrm>
+          <a:off x="0" y="0"/>
+          <a:ext cx="0" cy="0"/>
+          <a:chOff x="0" y="0"/>
+          <a:chExt cx="0" cy="0"/>
+        </a:xfrm>
+      </p:grpSpPr>
+      <p:pic>
+        <p:nvPicPr>
+          <p:cNvPr id="5" name="Content Placeholder 4"/>
+          <p:cNvPicPr>
+            <a:picLocks noGrp="1" noChangeAspect="1"/>
+          </p:cNvPicPr>
+          <p:nvPr>
+            <p:ph idx="1"/>
+          </p:nvPr>
+        </p:nvPicPr>
+        <p:blipFill>
+          <a:blip r:embed="rId2">
+            <a:extLst>
+              <a:ext uri="{28A0092B-C50C-407E-A947-70E740481C1C}">
+                <a14:useLocalDpi xmlns:a14="http://schemas.microsoft.com/office/drawing/2010/main" val="0"/>
+              </a:ext>
+            </a:extLst>
+          </a:blip>
+          <a:stretch>
+            <a:fillRect/>
+          </a:stretch>
+        </p:blipFill>
+        <p:spPr>
+          <a:xfrm>
+            <a:off x="470969" y="2277880"/>
+            <a:ext cx="5839259" cy="4286845"/>
+          </a:xfrm>
+        </p:spPr>
+      </p:pic>
+      <p:sp>
+        <p:nvSpPr>
+          <p:cNvPr id="3" name="Title 2"/>
+          <p:cNvSpPr>
+            <a:spLocks noGrp="1"/>
+          </p:cNvSpPr>
+          <p:nvPr>
+            <p:ph type="title"/>
+          </p:nvPr>
+        </p:nvSpPr>
+        <p:spPr/>
+        <p:txBody>
+          <a:bodyPr/>
+          <a:lstStyle/>
+          <a:p>
+            <a:r>
+              <a:rPr lang="en-US" dirty="0" err="1" smtClean="0"/>
+              <a:t>jBPM</a:t>
+            </a:r>
+            <a:r>
+              <a:rPr lang="en-US" dirty="0" smtClean="0"/>
+              <a:t> Overview</a:t>
+            </a:r>
+            <a:endParaRPr lang="en-US" dirty="0"/>
+          </a:p>
+        </p:txBody>
+      </p:sp>
+      <p:sp>
+        <p:nvSpPr>
+          <p:cNvPr id="6" name="TextBox 5"/>
+          <p:cNvSpPr txBox="1"/>
+          <p:nvPr/>
+        </p:nvSpPr>
+        <p:spPr>
+          <a:xfrm>
+            <a:off x="6970426" y="2698230"/>
+            <a:ext cx="184731" cy="369332"/>
+          </a:xfrm>
+          <a:prstGeom prst="rect">
+            <a:avLst/>
+          </a:prstGeom>
+          <a:noFill/>
+        </p:spPr>
+        <p:txBody>
+          <a:bodyPr wrap="none" rtlCol="0">
+            <a:spAutoFit/>
+          </a:bodyPr>
+          <a:lstStyle/>
+          <a:p>
+            <a:endParaRPr lang="en-US" dirty="0"/>
+          </a:p>
+        </p:txBody>
+      </p:sp>
+      <p:sp>
+        <p:nvSpPr>
+          <p:cNvPr id="9" name="TextBox 8"/>
+          <p:cNvSpPr txBox="1"/>
+          <p:nvPr/>
+        </p:nvSpPr>
+        <p:spPr>
+          <a:xfrm>
+            <a:off x="6538423" y="2282732"/>
+            <a:ext cx="5093944" cy="2308324"/>
+          </a:xfrm>
+          <a:prstGeom prst="rect">
+            <a:avLst/>
+          </a:prstGeom>
+          <a:noFill/>
+        </p:spPr>
+        <p:txBody>
+          <a:bodyPr wrap="square" rtlCol="0">
+            <a:spAutoFit/>
+          </a:bodyPr>
+          <a:lstStyle/>
+          <a:p>
+            <a:r>
+              <a:rPr lang="en-US" sz="2400" dirty="0" smtClean="0"/>
+              <a:t>The web-based designer is integrated in the Guvnor repository, which is targeted towards </a:t>
+            </a:r>
+            <a:r>
+              <a:rPr lang="en-US" sz="2400" b="1" dirty="0" smtClean="0"/>
+              <a:t>business users</a:t>
+            </a:r>
+            <a:r>
+              <a:rPr lang="en-US" sz="2400" dirty="0" smtClean="0"/>
+              <a:t> and allows you to manage your processes separately from your application.</a:t>
+            </a:r>
+            <a:endParaRPr lang="en-US" sz="2400" dirty="0"/>
+          </a:p>
+        </p:txBody>
+      </p:sp>
+      <p:sp>
+        <p:nvSpPr>
+          <p:cNvPr id="7" name="Oval 6"/>
+          <p:cNvSpPr/>
+          <p:nvPr/>
+        </p:nvSpPr>
+        <p:spPr>
+          <a:xfrm>
+            <a:off x="2998033" y="5279637"/>
+            <a:ext cx="1169233" cy="1214203"/>
+          </a:xfrm>
+          <a:prstGeom prst="ellipse">
+            <a:avLst/>
+          </a:prstGeom>
+          <a:noFill/>
+          <a:ln w="76200">
+            <a:solidFill>
+              <a:schemeClr val="accent5"/>
+            </a:solidFill>
+          </a:ln>
+        </p:spPr>
+        <p:style>
+          <a:lnRef idx="2">
+            <a:schemeClr val="accent1">
+              <a:shade val="50000"/>
+            </a:schemeClr>
+          </a:lnRef>
+          <a:fillRef idx="1">
+            <a:schemeClr val="accent1"/>
+          </a:fillRef>
+          <a:effectRef idx="0">
+            <a:schemeClr val="accent1"/>
+          </a:effectRef>
+          <a:fontRef idx="minor">
+            <a:schemeClr val="lt1"/>
+          </a:fontRef>
+        </p:style>
+        <p:txBody>
+          <a:bodyPr rtlCol="0" anchor="ctr"/>
+          <a:lstStyle/>
+          <a:p>
+            <a:pPr algn="ctr"/>
+            <a:endParaRPr lang="en-US"/>
+          </a:p>
+        </p:txBody>
+      </p:sp>
+    </p:spTree>
+    <p:extLst>
+      <p:ext uri="{BB962C8B-B14F-4D97-AF65-F5344CB8AC3E}">
+        <p14:creationId xmlns:p14="http://schemas.microsoft.com/office/powerpoint/2010/main" val="247792496"/>
+      </p:ext>
+    </p:extLst>
+  </p:cSld>
+  <p:clrMapOvr>
+    <a:masterClrMapping/>
+  </p:clrMapOvr>
+  <p:timing>
+    <p:tnLst>
+      <p:par>
+        <p:cTn id="1" dur="indefinite" restart="never" nodeType="tmRoot"/>
+      </p:par>
+    </p:tnLst>
+  </p:timing>
+</p:sld>
+</file>
+
+<file path=ppt/slides/slide12.xml><?xml version="1.0" encoding="utf-8"?>
+<p:sld xmlns:a="http://schemas.openxmlformats.org/drawingml/2006/main" xmlns:r="http://schemas.openxmlformats.org/officeDocument/2006/relationships" xmlns:p="http://schemas.openxmlformats.org/presentationml/2006/main">
+  <p:cSld>
+    <p:spTree>
+      <p:nvGrpSpPr>
+        <p:cNvPr id="1" name=""/>
+        <p:cNvGrpSpPr/>
+        <p:nvPr/>
+      </p:nvGrpSpPr>
+      <p:grpSpPr>
+        <a:xfrm>
+          <a:off x="0" y="0"/>
+          <a:ext cx="0" cy="0"/>
+          <a:chOff x="0" y="0"/>
+          <a:chExt cx="0" cy="0"/>
+        </a:xfrm>
+      </p:grpSpPr>
+      <p:sp>
+        <p:nvSpPr>
+          <p:cNvPr id="3" name="Title 2"/>
+          <p:cNvSpPr>
+            <a:spLocks noGrp="1"/>
+          </p:cNvSpPr>
+          <p:nvPr>
+            <p:ph type="title"/>
+          </p:nvPr>
+        </p:nvSpPr>
+        <p:spPr/>
+        <p:txBody>
+          <a:bodyPr/>
+          <a:lstStyle/>
+          <a:p>
+            <a:r>
+              <a:rPr lang="en-US" dirty="0" err="1" smtClean="0"/>
+              <a:t>jBPM</a:t>
+            </a:r>
+            <a:r>
+              <a:rPr lang="en-US" dirty="0" smtClean="0"/>
+              <a:t> Overview</a:t>
+            </a:r>
+            <a:endParaRPr lang="en-US" dirty="0"/>
+          </a:p>
+        </p:txBody>
+      </p:sp>
+      <p:sp>
+        <p:nvSpPr>
+          <p:cNvPr id="6" name="TextBox 5"/>
+          <p:cNvSpPr txBox="1"/>
+          <p:nvPr/>
+        </p:nvSpPr>
+        <p:spPr>
+          <a:xfrm>
+            <a:off x="6970426" y="2698230"/>
+            <a:ext cx="184731" cy="369332"/>
+          </a:xfrm>
+          <a:prstGeom prst="rect">
+            <a:avLst/>
+          </a:prstGeom>
+          <a:noFill/>
+        </p:spPr>
+        <p:txBody>
+          <a:bodyPr wrap="none" rtlCol="0">
+            <a:spAutoFit/>
+          </a:bodyPr>
+          <a:lstStyle/>
+          <a:p>
+            <a:endParaRPr lang="en-US" dirty="0"/>
+          </a:p>
+        </p:txBody>
+      </p:sp>
+      <p:sp>
+        <p:nvSpPr>
+          <p:cNvPr id="9" name="TextBox 8"/>
+          <p:cNvSpPr txBox="1"/>
+          <p:nvPr/>
+        </p:nvSpPr>
+        <p:spPr>
+          <a:xfrm>
+            <a:off x="6538423" y="2282732"/>
+            <a:ext cx="5093944" cy="2308324"/>
+          </a:xfrm>
+          <a:prstGeom prst="rect">
+            <a:avLst/>
+          </a:prstGeom>
+          <a:noFill/>
+        </p:spPr>
+        <p:txBody>
+          <a:bodyPr wrap="square" rtlCol="0">
+            <a:spAutoFit/>
+          </a:bodyPr>
+          <a:lstStyle/>
+          <a:p>
+            <a:r>
+              <a:rPr lang="en-US" sz="2400" dirty="0" smtClean="0"/>
+              <a:t>The web-based designer is integrated in the Guvnor repository, which is targeted towards business users and allows you to manage your processes separately from your application.</a:t>
+            </a:r>
+            <a:endParaRPr lang="en-US" sz="2400" dirty="0"/>
+          </a:p>
+        </p:txBody>
+      </p:sp>
+      <p:sp>
+        <p:nvSpPr>
+          <p:cNvPr id="2" name="Content Placeholder 1"/>
+          <p:cNvSpPr>
+            <a:spLocks noGrp="1"/>
+          </p:cNvSpPr>
+          <p:nvPr>
+            <p:ph idx="1"/>
+          </p:nvPr>
+        </p:nvSpPr>
+        <p:spPr/>
+        <p:txBody>
+          <a:bodyPr/>
+          <a:lstStyle/>
+          <a:p>
+            <a:endParaRPr lang="en-US" dirty="0"/>
+          </a:p>
+        </p:txBody>
+      </p:sp>
+      <p:pic>
+        <p:nvPicPr>
+          <p:cNvPr id="7" name="Picture 6"/>
+          <p:cNvPicPr>
+            <a:picLocks noChangeAspect="1"/>
+          </p:cNvPicPr>
+          <p:nvPr/>
+        </p:nvPicPr>
+        <p:blipFill>
+          <a:blip r:embed="rId2">
+            <a:extLst>
+              <a:ext uri="{28A0092B-C50C-407E-A947-70E740481C1C}">
+                <a14:useLocalDpi xmlns:a14="http://schemas.microsoft.com/office/drawing/2010/main" val="0"/>
+              </a:ext>
+            </a:extLst>
+          </a:blip>
+          <a:stretch>
+            <a:fillRect/>
+          </a:stretch>
+        </p:blipFill>
+        <p:spPr>
+          <a:xfrm>
+            <a:off x="62274" y="2248348"/>
+            <a:ext cx="6338923" cy="4158972"/>
+          </a:xfrm>
+          <a:prstGeom prst="rect">
+            <a:avLst/>
+          </a:prstGeom>
+        </p:spPr>
+      </p:pic>
+    </p:spTree>
+    <p:extLst>
+      <p:ext uri="{BB962C8B-B14F-4D97-AF65-F5344CB8AC3E}">
+        <p14:creationId xmlns:p14="http://schemas.microsoft.com/office/powerpoint/2010/main" val="2526964888"/>
+      </p:ext>
+    </p:extLst>
+  </p:cSld>
+  <p:clrMapOvr>
+    <a:masterClrMapping/>
+  </p:clrMapOvr>
+  <p:timing>
+    <p:tnLst>
+      <p:par>
+        <p:cTn id="1" dur="indefinite" restart="never" nodeType="tmRoot"/>
+      </p:par>
+    </p:tnLst>
+  </p:timing>
+</p:sld>
+</file>
+
+<file path=ppt/slides/slide13.xml><?xml version="1.0" encoding="utf-8"?>
+<p:sld xmlns:a="http://schemas.openxmlformats.org/drawingml/2006/main" xmlns:r="http://schemas.openxmlformats.org/officeDocument/2006/relationships" xmlns:p="http://schemas.openxmlformats.org/presentationml/2006/main">
+  <p:cSld>
+    <p:spTree>
+      <p:nvGrpSpPr>
+        <p:cNvPr id="1" name=""/>
+        <p:cNvGrpSpPr/>
+        <p:nvPr/>
+      </p:nvGrpSpPr>
+      <p:grpSpPr>
+        <a:xfrm>
+          <a:off x="0" y="0"/>
+          <a:ext cx="0" cy="0"/>
+          <a:chOff x="0" y="0"/>
+          <a:chExt cx="0" cy="0"/>
+        </a:xfrm>
+      </p:grpSpPr>
+      <p:pic>
+        <p:nvPicPr>
+          <p:cNvPr id="5" name="Content Placeholder 4"/>
+          <p:cNvPicPr>
+            <a:picLocks noGrp="1" noChangeAspect="1"/>
+          </p:cNvPicPr>
+          <p:nvPr>
+            <p:ph idx="1"/>
+          </p:nvPr>
+        </p:nvPicPr>
+        <p:blipFill>
+          <a:blip r:embed="rId2">
+            <a:extLst>
+              <a:ext uri="{28A0092B-C50C-407E-A947-70E740481C1C}">
+                <a14:useLocalDpi xmlns:a14="http://schemas.microsoft.com/office/drawing/2010/main" val="0"/>
+              </a:ext>
+            </a:extLst>
+          </a:blip>
+          <a:stretch>
+            <a:fillRect/>
+          </a:stretch>
+        </p:blipFill>
+        <p:spPr>
+          <a:xfrm>
+            <a:off x="470969" y="2277880"/>
+            <a:ext cx="5839259" cy="4286845"/>
+          </a:xfrm>
+        </p:spPr>
+      </p:pic>
+      <p:sp>
+        <p:nvSpPr>
+          <p:cNvPr id="3" name="Title 2"/>
+          <p:cNvSpPr>
+            <a:spLocks noGrp="1"/>
+          </p:cNvSpPr>
+          <p:nvPr>
+            <p:ph type="title"/>
+          </p:nvPr>
+        </p:nvSpPr>
+        <p:spPr/>
+        <p:txBody>
+          <a:bodyPr/>
+          <a:lstStyle/>
+          <a:p>
+            <a:r>
+              <a:rPr lang="en-US" dirty="0" err="1" smtClean="0"/>
+              <a:t>jBPM</a:t>
+            </a:r>
+            <a:r>
+              <a:rPr lang="en-US" dirty="0" smtClean="0"/>
+              <a:t> Overview</a:t>
+            </a:r>
+            <a:endParaRPr lang="en-US" dirty="0"/>
+          </a:p>
+        </p:txBody>
+      </p:sp>
+      <p:sp>
+        <p:nvSpPr>
+          <p:cNvPr id="6" name="TextBox 5"/>
+          <p:cNvSpPr txBox="1"/>
+          <p:nvPr/>
+        </p:nvSpPr>
+        <p:spPr>
+          <a:xfrm>
+            <a:off x="6970426" y="2698230"/>
+            <a:ext cx="184731" cy="369332"/>
+          </a:xfrm>
+          <a:prstGeom prst="rect">
+            <a:avLst/>
+          </a:prstGeom>
+          <a:noFill/>
+        </p:spPr>
+        <p:txBody>
+          <a:bodyPr wrap="none" rtlCol="0">
+            <a:spAutoFit/>
+          </a:bodyPr>
+          <a:lstStyle/>
+          <a:p>
+            <a:endParaRPr lang="en-US" dirty="0"/>
+          </a:p>
+        </p:txBody>
+      </p:sp>
+      <p:sp>
+        <p:nvSpPr>
+          <p:cNvPr id="9" name="TextBox 8"/>
+          <p:cNvSpPr txBox="1"/>
+          <p:nvPr/>
+        </p:nvSpPr>
+        <p:spPr>
+          <a:xfrm>
+            <a:off x="6463472" y="1997919"/>
+            <a:ext cx="5093944" cy="4524315"/>
+          </a:xfrm>
+          <a:prstGeom prst="rect">
+            <a:avLst/>
+          </a:prstGeom>
+          <a:noFill/>
+        </p:spPr>
+        <p:txBody>
+          <a:bodyPr wrap="square" rtlCol="0">
+            <a:spAutoFit/>
+          </a:bodyPr>
+          <a:lstStyle/>
+          <a:p>
+            <a:r>
+              <a:rPr lang="en-US" sz="2400" dirty="0"/>
+              <a:t>Business processes can be managed through a web-based management console. </a:t>
+            </a:r>
+            <a:endParaRPr lang="en-US" sz="2400" dirty="0" smtClean="0"/>
+          </a:p>
+          <a:p>
+            <a:endParaRPr lang="en-US" sz="2400" dirty="0" smtClean="0"/>
+          </a:p>
+          <a:p>
+            <a:r>
+              <a:rPr lang="en-US" sz="2400" dirty="0" smtClean="0"/>
+              <a:t>It </a:t>
+            </a:r>
+            <a:r>
+              <a:rPr lang="en-US" sz="2400" dirty="0"/>
+              <a:t>is targeted towards business users and its main features are</a:t>
+            </a:r>
+            <a:r>
+              <a:rPr lang="en-US" sz="2400" dirty="0" smtClean="0"/>
+              <a:t>:</a:t>
+            </a:r>
+          </a:p>
+          <a:p>
+            <a:pPr marL="342900" indent="-342900">
+              <a:buFont typeface="Arial" panose="020B0604020202020204" pitchFamily="34" charset="0"/>
+              <a:buChar char="•"/>
+            </a:pPr>
+            <a:r>
+              <a:rPr lang="en-US" sz="2400" dirty="0"/>
+              <a:t>Runtime monitoring (Process Instance Management</a:t>
+            </a:r>
+            <a:r>
+              <a:rPr lang="en-US" sz="2400" dirty="0" smtClean="0"/>
+              <a:t>)</a:t>
+            </a:r>
+          </a:p>
+          <a:p>
+            <a:pPr marL="342900" indent="-342900">
+              <a:buFont typeface="Arial" panose="020B0604020202020204" pitchFamily="34" charset="0"/>
+              <a:buChar char="•"/>
+            </a:pPr>
+            <a:r>
+              <a:rPr lang="en-US" sz="2400" dirty="0" smtClean="0"/>
+              <a:t>Task </a:t>
+            </a:r>
+            <a:r>
+              <a:rPr lang="en-US" sz="2400" dirty="0"/>
+              <a:t>list (</a:t>
+            </a:r>
+            <a:r>
+              <a:rPr lang="en-US" sz="2400" dirty="0" smtClean="0"/>
+              <a:t>Human </a:t>
+            </a:r>
+            <a:r>
+              <a:rPr lang="en-US" sz="2400" dirty="0"/>
+              <a:t>Task Management</a:t>
+            </a:r>
+            <a:r>
+              <a:rPr lang="en-US" sz="2400" dirty="0" smtClean="0"/>
+              <a:t>) </a:t>
+            </a:r>
+          </a:p>
+          <a:p>
+            <a:pPr marL="342900" indent="-342900">
+              <a:buFont typeface="Arial" panose="020B0604020202020204" pitchFamily="34" charset="0"/>
+              <a:buChar char="•"/>
+            </a:pPr>
+            <a:r>
+              <a:rPr lang="en-US" sz="2400" dirty="0" smtClean="0"/>
+              <a:t>Business </a:t>
+            </a:r>
+            <a:r>
+              <a:rPr lang="en-US" sz="2400" dirty="0"/>
+              <a:t>Activity Monitoring (BAM) and </a:t>
+            </a:r>
+            <a:r>
+              <a:rPr lang="en-US" sz="2400" dirty="0" smtClean="0"/>
+              <a:t>Reporting</a:t>
+            </a:r>
+          </a:p>
+        </p:txBody>
+      </p:sp>
+      <p:sp>
+        <p:nvSpPr>
+          <p:cNvPr id="10" name="Oval 9"/>
+          <p:cNvSpPr/>
+          <p:nvPr/>
+        </p:nvSpPr>
+        <p:spPr>
+          <a:xfrm>
+            <a:off x="1693889" y="2275794"/>
+            <a:ext cx="4769583" cy="1214203"/>
+          </a:xfrm>
+          <a:prstGeom prst="ellipse">
+            <a:avLst/>
+          </a:prstGeom>
+          <a:noFill/>
+          <a:ln w="76200">
+            <a:solidFill>
+              <a:schemeClr val="accent5"/>
+            </a:solidFill>
+          </a:ln>
+        </p:spPr>
+        <p:style>
+          <a:lnRef idx="2">
+            <a:schemeClr val="accent1">
+              <a:shade val="50000"/>
+            </a:schemeClr>
+          </a:lnRef>
+          <a:fillRef idx="1">
+            <a:schemeClr val="accent1"/>
+          </a:fillRef>
+          <a:effectRef idx="0">
+            <a:schemeClr val="accent1"/>
+          </a:effectRef>
+          <a:fontRef idx="minor">
+            <a:schemeClr val="lt1"/>
+          </a:fontRef>
+        </p:style>
+        <p:txBody>
+          <a:bodyPr rtlCol="0" anchor="ctr"/>
+          <a:lstStyle/>
+          <a:p>
+            <a:pPr algn="ctr"/>
+            <a:endParaRPr lang="en-US"/>
+          </a:p>
+        </p:txBody>
+      </p:sp>
+    </p:spTree>
+    <p:extLst>
+      <p:ext uri="{BB962C8B-B14F-4D97-AF65-F5344CB8AC3E}">
+        <p14:creationId xmlns:p14="http://schemas.microsoft.com/office/powerpoint/2010/main" val="1861075437"/>
+      </p:ext>
+    </p:extLst>
+  </p:cSld>
+  <p:clrMapOvr>
+    <a:masterClrMapping/>
+  </p:clrMapOvr>
+  <p:timing>
+    <p:tnLst>
+      <p:par>
+        <p:cTn id="1" dur="indefinite" restart="never" nodeType="tmRoot"/>
+      </p:par>
+    </p:tnLst>
+  </p:timing>
+</p:sld>
+</file>
+
+<file path=ppt/slides/slide14.xml><?xml version="1.0" encoding="utf-8"?>
+<p:sld xmlns:a="http://schemas.openxmlformats.org/drawingml/2006/main" xmlns:r="http://schemas.openxmlformats.org/officeDocument/2006/relationships" xmlns:p="http://schemas.openxmlformats.org/presentationml/2006/main">
+  <p:cSld>
+    <p:spTree>
+      <p:nvGrpSpPr>
+        <p:cNvPr id="1" name=""/>
+        <p:cNvGrpSpPr/>
+        <p:nvPr/>
+      </p:nvGrpSpPr>
+      <p:grpSpPr>
+        <a:xfrm>
+          <a:off x="0" y="0"/>
+          <a:ext cx="0" cy="0"/>
+          <a:chOff x="0" y="0"/>
+          <a:chExt cx="0" cy="0"/>
+        </a:xfrm>
+      </p:grpSpPr>
+      <p:sp>
+        <p:nvSpPr>
+          <p:cNvPr id="3" name="Title 2"/>
+          <p:cNvSpPr>
+            <a:spLocks noGrp="1"/>
+          </p:cNvSpPr>
+          <p:nvPr>
+            <p:ph type="title"/>
+          </p:nvPr>
+        </p:nvSpPr>
+        <p:spPr/>
+        <p:txBody>
+          <a:bodyPr/>
+          <a:lstStyle/>
+          <a:p>
+            <a:r>
+              <a:rPr lang="en-US" dirty="0" err="1" smtClean="0"/>
+              <a:t>jBPM</a:t>
+            </a:r>
+            <a:r>
+              <a:rPr lang="en-US" dirty="0" smtClean="0"/>
+              <a:t> Overview</a:t>
+            </a:r>
+            <a:endParaRPr lang="en-US" dirty="0"/>
+          </a:p>
+        </p:txBody>
+      </p:sp>
+      <p:sp>
+        <p:nvSpPr>
+          <p:cNvPr id="6" name="TextBox 5"/>
+          <p:cNvSpPr txBox="1"/>
+          <p:nvPr/>
+        </p:nvSpPr>
+        <p:spPr>
+          <a:xfrm>
+            <a:off x="6970426" y="2698230"/>
+            <a:ext cx="184731" cy="369332"/>
+          </a:xfrm>
+          <a:prstGeom prst="rect">
+            <a:avLst/>
+          </a:prstGeom>
+          <a:noFill/>
+        </p:spPr>
+        <p:txBody>
+          <a:bodyPr wrap="none" rtlCol="0">
+            <a:spAutoFit/>
+          </a:bodyPr>
+          <a:lstStyle/>
+          <a:p>
+            <a:endParaRPr lang="en-US" dirty="0"/>
+          </a:p>
+        </p:txBody>
+      </p:sp>
+      <p:pic>
+        <p:nvPicPr>
+          <p:cNvPr id="7" name="Picture 6"/>
+          <p:cNvPicPr>
+            <a:picLocks noChangeAspect="1"/>
+          </p:cNvPicPr>
+          <p:nvPr/>
+        </p:nvPicPr>
+        <p:blipFill>
+          <a:blip r:embed="rId2">
+            <a:extLst>
+              <a:ext uri="{28A0092B-C50C-407E-A947-70E740481C1C}">
+                <a14:useLocalDpi xmlns:a14="http://schemas.microsoft.com/office/drawing/2010/main" val="0"/>
+              </a:ext>
+            </a:extLst>
+          </a:blip>
+          <a:stretch>
+            <a:fillRect/>
+          </a:stretch>
+        </p:blipFill>
+        <p:spPr>
+          <a:xfrm>
+            <a:off x="2264391" y="2015584"/>
+            <a:ext cx="7648875" cy="4707504"/>
+          </a:xfrm>
+          <a:prstGeom prst="rect">
+            <a:avLst/>
+          </a:prstGeom>
+        </p:spPr>
+      </p:pic>
+    </p:spTree>
+    <p:extLst>
+      <p:ext uri="{BB962C8B-B14F-4D97-AF65-F5344CB8AC3E}">
+        <p14:creationId xmlns:p14="http://schemas.microsoft.com/office/powerpoint/2010/main" val="104707173"/>
+      </p:ext>
+    </p:extLst>
+  </p:cSld>
+  <p:clrMapOvr>
+    <a:masterClrMapping/>
+  </p:clrMapOvr>
+  <p:timing>
+    <p:tnLst>
+      <p:par>
+        <p:cTn id="1" dur="indefinite" restart="never" nodeType="tmRoot"/>
+      </p:par>
+    </p:tnLst>
+  </p:timing>
+</p:sld>
+</file>
+
+<file path=ppt/slides/slide15.xml><?xml version="1.0" encoding="utf-8"?>
+<p:sld xmlns:a="http://schemas.openxmlformats.org/drawingml/2006/main" xmlns:r="http://schemas.openxmlformats.org/officeDocument/2006/relationships" xmlns:p="http://schemas.openxmlformats.org/presentationml/2006/main">
+  <p:cSld>
+    <p:spTree>
+      <p:nvGrpSpPr>
+        <p:cNvPr id="1" name=""/>
+        <p:cNvGrpSpPr/>
+        <p:nvPr/>
+      </p:nvGrpSpPr>
+      <p:grpSpPr>
+        <a:xfrm>
+          <a:off x="0" y="0"/>
+          <a:ext cx="0" cy="0"/>
+          <a:chOff x="0" y="0"/>
+          <a:chExt cx="0" cy="0"/>
+        </a:xfrm>
+      </p:grpSpPr>
+      <p:pic>
+        <p:nvPicPr>
+          <p:cNvPr id="5" name="Content Placeholder 4"/>
+          <p:cNvPicPr>
+            <a:picLocks noGrp="1" noChangeAspect="1"/>
+          </p:cNvPicPr>
+          <p:nvPr>
+            <p:ph idx="1"/>
+          </p:nvPr>
+        </p:nvPicPr>
+        <p:blipFill>
+          <a:blip r:embed="rId2">
+            <a:extLst>
+              <a:ext uri="{28A0092B-C50C-407E-A947-70E740481C1C}">
+                <a14:useLocalDpi xmlns:a14="http://schemas.microsoft.com/office/drawing/2010/main" val="0"/>
+              </a:ext>
+            </a:extLst>
+          </a:blip>
+          <a:stretch>
+            <a:fillRect/>
+          </a:stretch>
+        </p:blipFill>
+        <p:spPr>
+          <a:xfrm>
+            <a:off x="470969" y="2277880"/>
+            <a:ext cx="5839259" cy="4286845"/>
+          </a:xfrm>
+        </p:spPr>
+      </p:pic>
+      <p:sp>
+        <p:nvSpPr>
+          <p:cNvPr id="3" name="Title 2"/>
+          <p:cNvSpPr>
+            <a:spLocks noGrp="1"/>
+          </p:cNvSpPr>
+          <p:nvPr>
+            <p:ph type="title"/>
+          </p:nvPr>
+        </p:nvSpPr>
+        <p:spPr/>
+        <p:txBody>
+          <a:bodyPr/>
+          <a:lstStyle/>
+          <a:p>
+            <a:r>
+              <a:rPr lang="en-US" dirty="0" err="1" smtClean="0"/>
+              <a:t>jBPM</a:t>
+            </a:r>
+            <a:r>
+              <a:rPr lang="en-US" dirty="0" smtClean="0"/>
+              <a:t> Overview</a:t>
+            </a:r>
+            <a:endParaRPr lang="en-US" dirty="0"/>
+          </a:p>
+        </p:txBody>
+      </p:sp>
+      <p:sp>
+        <p:nvSpPr>
+          <p:cNvPr id="6" name="TextBox 5"/>
+          <p:cNvSpPr txBox="1"/>
+          <p:nvPr/>
+        </p:nvSpPr>
+        <p:spPr>
+          <a:xfrm>
+            <a:off x="6970426" y="2698230"/>
+            <a:ext cx="184731" cy="369332"/>
+          </a:xfrm>
+          <a:prstGeom prst="rect">
+            <a:avLst/>
+          </a:prstGeom>
+          <a:noFill/>
+        </p:spPr>
+        <p:txBody>
+          <a:bodyPr wrap="none" rtlCol="0">
+            <a:spAutoFit/>
+          </a:bodyPr>
+          <a:lstStyle/>
+          <a:p>
+            <a:endParaRPr lang="en-US" dirty="0"/>
+          </a:p>
+        </p:txBody>
+      </p:sp>
+      <p:sp>
+        <p:nvSpPr>
+          <p:cNvPr id="9" name="TextBox 8"/>
+          <p:cNvSpPr txBox="1"/>
+          <p:nvPr/>
+        </p:nvSpPr>
+        <p:spPr>
+          <a:xfrm>
+            <a:off x="6463472" y="1997919"/>
+            <a:ext cx="5093944" cy="1938992"/>
+          </a:xfrm>
+          <a:prstGeom prst="rect">
+            <a:avLst/>
+          </a:prstGeom>
+          <a:noFill/>
+        </p:spPr>
+        <p:txBody>
+          <a:bodyPr wrap="square" rtlCol="0">
+            <a:spAutoFit/>
+          </a:bodyPr>
+          <a:lstStyle/>
+          <a:p>
+            <a:r>
+              <a:rPr lang="en-US" sz="2400" dirty="0"/>
+              <a:t>A web-based form builder allows you to </a:t>
+            </a:r>
+            <a:r>
+              <a:rPr lang="en-US" sz="2400" b="1" dirty="0"/>
+              <a:t>create, generate and/or edit your form</a:t>
+            </a:r>
+            <a:r>
+              <a:rPr lang="en-US" sz="2400" dirty="0"/>
+              <a:t> (both for starting a process or completing a user task) using a WYSIWYG editor.</a:t>
+            </a:r>
+            <a:endParaRPr lang="en-US" sz="2400" dirty="0"/>
+          </a:p>
+        </p:txBody>
+      </p:sp>
+      <p:sp>
+        <p:nvSpPr>
+          <p:cNvPr id="7" name="Oval 6"/>
+          <p:cNvSpPr/>
+          <p:nvPr/>
+        </p:nvSpPr>
+        <p:spPr>
+          <a:xfrm>
+            <a:off x="4482058" y="5279637"/>
+            <a:ext cx="1169233" cy="1214203"/>
+          </a:xfrm>
+          <a:prstGeom prst="ellipse">
+            <a:avLst/>
+          </a:prstGeom>
+          <a:noFill/>
+          <a:ln w="76200">
+            <a:solidFill>
+              <a:schemeClr val="accent5"/>
+            </a:solidFill>
+          </a:ln>
+        </p:spPr>
+        <p:style>
+          <a:lnRef idx="2">
+            <a:schemeClr val="accent1">
+              <a:shade val="50000"/>
+            </a:schemeClr>
+          </a:lnRef>
+          <a:fillRef idx="1">
+            <a:schemeClr val="accent1"/>
+          </a:fillRef>
+          <a:effectRef idx="0">
+            <a:schemeClr val="accent1"/>
+          </a:effectRef>
+          <a:fontRef idx="minor">
+            <a:schemeClr val="lt1"/>
+          </a:fontRef>
+        </p:style>
+        <p:txBody>
+          <a:bodyPr rtlCol="0" anchor="ctr"/>
+          <a:lstStyle/>
+          <a:p>
+            <a:pPr algn="ctr"/>
+            <a:endParaRPr lang="en-US"/>
+          </a:p>
+        </p:txBody>
+      </p:sp>
+    </p:spTree>
+    <p:extLst>
+      <p:ext uri="{BB962C8B-B14F-4D97-AF65-F5344CB8AC3E}">
+        <p14:creationId xmlns:p14="http://schemas.microsoft.com/office/powerpoint/2010/main" val="4198592357"/>
+      </p:ext>
+    </p:extLst>
+  </p:cSld>
+  <p:clrMapOvr>
+    <a:masterClrMapping/>
+  </p:clrMapOvr>
+  <p:timing>
+    <p:tnLst>
+      <p:par>
+        <p:cTn id="1" dur="indefinite" restart="never" nodeType="tmRoot"/>
+      </p:par>
+    </p:tnLst>
+  </p:timing>
+</p:sld>
+</file>
+
+<file path=ppt/slides/slide16.xml><?xml version="1.0" encoding="utf-8"?>
+<p:sld xmlns:a="http://schemas.openxmlformats.org/drawingml/2006/main" xmlns:r="http://schemas.openxmlformats.org/officeDocument/2006/relationships" xmlns:p="http://schemas.openxmlformats.org/presentationml/2006/main">
+  <p:cSld>
+    <p:spTree>
+      <p:nvGrpSpPr>
+        <p:cNvPr id="1" name=""/>
+        <p:cNvGrpSpPr/>
+        <p:nvPr/>
+      </p:nvGrpSpPr>
+      <p:grpSpPr>
+        <a:xfrm>
+          <a:off x="0" y="0"/>
+          <a:ext cx="0" cy="0"/>
+          <a:chOff x="0" y="0"/>
+          <a:chExt cx="0" cy="0"/>
+        </a:xfrm>
+      </p:grpSpPr>
+      <p:sp>
+        <p:nvSpPr>
+          <p:cNvPr id="2" name="Content Placeholder 1"/>
+          <p:cNvSpPr>
+            <a:spLocks noGrp="1"/>
+          </p:cNvSpPr>
+          <p:nvPr>
+            <p:ph idx="1"/>
+          </p:nvPr>
+        </p:nvSpPr>
+        <p:spPr/>
+        <p:txBody>
+          <a:bodyPr/>
+          <a:lstStyle/>
+          <a:p>
+            <a:pPr marL="0" indent="0" algn="ctr">
+              <a:buNone/>
+            </a:pPr>
+            <a:r>
+              <a:rPr lang="en-US" dirty="0">
+                <a:hlinkClick r:id="rId2"/>
+              </a:rPr>
+              <a:t>www.egjug.org/files/Introducing%20JBPM.ppt</a:t>
+            </a:r>
+          </a:p>
+          <a:p>
+            <a:pPr marL="0" indent="0" algn="ctr">
+              <a:buNone/>
+            </a:pPr>
+            <a:r>
+              <a:rPr lang="en-US" dirty="0">
+                <a:hlinkClick r:id="rId3"/>
+              </a:rPr>
+              <a:t>http://wso2.com/products/business-process-server/</a:t>
+            </a:r>
+          </a:p>
+          <a:p>
+            <a:pPr marL="0" indent="0" algn="ctr">
+              <a:buNone/>
+            </a:pPr>
+            <a:r>
+              <a:rPr lang="en-US" dirty="0">
+                <a:hlinkClick r:id="rId4"/>
+              </a:rPr>
+              <a:t>http://www.jbpm.org</a:t>
+            </a:r>
+            <a:r>
+              <a:rPr lang="en-US" dirty="0" smtClean="0">
+                <a:hlinkClick r:id="rId4"/>
+              </a:rPr>
+              <a:t>/</a:t>
+            </a:r>
+            <a:endParaRPr lang="en-US" dirty="0" smtClean="0"/>
+          </a:p>
+          <a:p>
+            <a:pPr marL="0" indent="0" algn="ctr">
+              <a:buNone/>
+            </a:pPr>
+            <a:r>
+              <a:rPr lang="en-US" dirty="0" smtClean="0">
+                <a:hlinkClick r:id="rId5"/>
+              </a:rPr>
+              <a:t>http://docs.jboss.org/jbpm</a:t>
+            </a:r>
+            <a:endParaRPr lang="en-US" dirty="0" smtClean="0"/>
+          </a:p>
+        </p:txBody>
+      </p:sp>
+      <p:sp>
+        <p:nvSpPr>
+          <p:cNvPr id="3" name="Title 2"/>
+          <p:cNvSpPr>
+            <a:spLocks noGrp="1"/>
+          </p:cNvSpPr>
+          <p:nvPr>
+            <p:ph type="title"/>
+          </p:nvPr>
+        </p:nvSpPr>
+        <p:spPr/>
+        <p:txBody>
+          <a:bodyPr/>
+          <a:lstStyle/>
+          <a:p>
+            <a:r>
+              <a:rPr lang="en-US" dirty="0" smtClean="0"/>
+              <a:t>References</a:t>
+            </a:r>
+            <a:endParaRPr lang="en-US" dirty="0"/>
+          </a:p>
+        </p:txBody>
+      </p:sp>
+    </p:spTree>
+    <p:extLst>
+      <p:ext uri="{BB962C8B-B14F-4D97-AF65-F5344CB8AC3E}">
+        <p14:creationId xmlns:p14="http://schemas.microsoft.com/office/powerpoint/2010/main" val="71875033"/>
+      </p:ext>
+    </p:extLst>
+  </p:cSld>
+  <p:clrMapOvr>
+    <a:masterClrMapping/>
+  </p:clrMapOvr>
+  <p:timing>
+    <p:tnLst>
+      <p:par>
+        <p:cTn id="1" dur="indefinite" restart="never" nodeType="tmRoot"/>
+      </p:par>
+    </p:tnLst>
+  </p:timing>
 </p:sld>
 </file>
 
@@ -5371,6 +6668,13 @@
   <p:clrMapOvr>
     <a:masterClrMapping/>
   </p:clrMapOvr>
+  <p:timing>
+    <p:tnLst>
+      <p:par>
+        <p:cTn id="1" dur="indefinite" restart="never" nodeType="tmRoot"/>
+      </p:par>
+    </p:tnLst>
+  </p:timing>
 </p:sld>
 </file>
 
@@ -5391,91 +6695,550 @@
           <a:chExt cx="0" cy="0"/>
         </a:xfrm>
       </p:grpSpPr>
-      <p:sp>
-        <p:nvSpPr>
-          <p:cNvPr id="2" name="Content Placeholder 1"/>
-          <p:cNvSpPr>
-            <a:spLocks noGrp="1"/>
-          </p:cNvSpPr>
+      <p:pic>
+        <p:nvPicPr>
+          <p:cNvPr id="5" name="Content Placeholder 4"/>
+          <p:cNvPicPr>
+            <a:picLocks noGrp="1" noChangeAspect="1"/>
+          </p:cNvPicPr>
           <p:nvPr>
             <p:ph idx="1"/>
           </p:nvPr>
+        </p:nvPicPr>
+        <p:blipFill>
+          <a:blip r:embed="rId2">
+            <a:extLst>
+              <a:ext uri="{28A0092B-C50C-407E-A947-70E740481C1C}">
+                <a14:useLocalDpi xmlns:a14="http://schemas.microsoft.com/office/drawing/2010/main" val="0"/>
+              </a:ext>
+            </a:extLst>
+          </a:blip>
+          <a:stretch>
+            <a:fillRect/>
+          </a:stretch>
+        </p:blipFill>
+        <p:spPr>
+          <a:xfrm>
+            <a:off x="470969" y="2277880"/>
+            <a:ext cx="5839259" cy="4286845"/>
+          </a:xfrm>
+        </p:spPr>
+      </p:pic>
+      <p:sp>
+        <p:nvSpPr>
+          <p:cNvPr id="3" name="Title 2"/>
+          <p:cNvSpPr>
+            <a:spLocks noGrp="1"/>
+          </p:cNvSpPr>
+          <p:nvPr>
+            <p:ph type="title"/>
+          </p:nvPr>
         </p:nvSpPr>
         <p:spPr/>
         <p:txBody>
           <a:bodyPr/>
           <a:lstStyle/>
           <a:p>
-            <a:pPr marL="0" indent="0" algn="ctr">
-              <a:buNone/>
-            </a:pPr>
-            <a:r>
-              <a:rPr lang="en-US" dirty="0">
-                <a:hlinkClick r:id="rId2"/>
-              </a:rPr>
-              <a:t>www.egjug.org/files/Introducing%20JBPM.ppt</a:t>
-            </a:r>
-          </a:p>
-          <a:p>
-            <a:pPr marL="0" indent="0" algn="ctr">
-              <a:buNone/>
-            </a:pPr>
-            <a:r>
-              <a:rPr lang="en-US" dirty="0">
-                <a:hlinkClick r:id="rId3"/>
-              </a:rPr>
-              <a:t>http://wso2.com/products/business-process-server/</a:t>
-            </a:r>
-          </a:p>
-          <a:p>
-            <a:pPr marL="0" indent="0" algn="ctr">
-              <a:buNone/>
-            </a:pPr>
-            <a:r>
-              <a:rPr lang="en-US" dirty="0">
-                <a:hlinkClick r:id="rId4"/>
-              </a:rPr>
-              <a:t>http://www.jbpm.org/</a:t>
-            </a:r>
-          </a:p>
-          <a:p>
+            <a:r>
+              <a:rPr lang="en-US" dirty="0" err="1" smtClean="0"/>
+              <a:t>jBPM</a:t>
+            </a:r>
+            <a:r>
+              <a:rPr lang="en-US" dirty="0" smtClean="0"/>
+              <a:t> Overview</a:t>
+            </a:r>
             <a:endParaRPr lang="en-US" dirty="0"/>
           </a:p>
         </p:txBody>
       </p:sp>
       <p:sp>
         <p:nvSpPr>
-          <p:cNvPr id="3" name="Title 2"/>
-          <p:cNvSpPr>
-            <a:spLocks noGrp="1"/>
-          </p:cNvSpPr>
-          <p:nvPr>
-            <p:ph type="title"/>
-          </p:nvPr>
-        </p:nvSpPr>
-        <p:spPr/>
-        <p:txBody>
-          <a:bodyPr/>
-          <a:lstStyle/>
-          <a:p>
-            <a:r>
-              <a:rPr lang="en-US" dirty="0" smtClean="0"/>
-              <a:t>References</a:t>
-            </a:r>
+          <p:cNvPr id="6" name="TextBox 5"/>
+          <p:cNvSpPr txBox="1"/>
+          <p:nvPr/>
+        </p:nvSpPr>
+        <p:spPr>
+          <a:xfrm>
+            <a:off x="6970426" y="2698230"/>
+            <a:ext cx="184731" cy="369332"/>
+          </a:xfrm>
+          <a:prstGeom prst="rect">
+            <a:avLst/>
+          </a:prstGeom>
+          <a:noFill/>
+        </p:spPr>
+        <p:txBody>
+          <a:bodyPr wrap="none" rtlCol="0">
+            <a:spAutoFit/>
+          </a:bodyPr>
+          <a:lstStyle/>
+          <a:p>
             <a:endParaRPr lang="en-US" dirty="0"/>
+          </a:p>
+        </p:txBody>
+      </p:sp>
+      <p:sp>
+        <p:nvSpPr>
+          <p:cNvPr id="9" name="TextBox 8"/>
+          <p:cNvSpPr txBox="1"/>
+          <p:nvPr/>
+        </p:nvSpPr>
+        <p:spPr>
+          <a:xfrm>
+            <a:off x="6448482" y="2518348"/>
+            <a:ext cx="5093944" cy="3785652"/>
+          </a:xfrm>
+          <a:prstGeom prst="rect">
+            <a:avLst/>
+          </a:prstGeom>
+          <a:noFill/>
+        </p:spPr>
+        <p:txBody>
+          <a:bodyPr wrap="square" rtlCol="0">
+            <a:spAutoFit/>
+          </a:bodyPr>
+          <a:lstStyle/>
+          <a:p>
+            <a:r>
+              <a:rPr lang="en-US" sz="2400" dirty="0"/>
+              <a:t>The grey boxes show the component that are not part of </a:t>
+            </a:r>
+            <a:r>
+              <a:rPr lang="en-US" sz="2400" dirty="0" err="1"/>
+              <a:t>jBPM</a:t>
+            </a:r>
+            <a:r>
+              <a:rPr lang="en-US" sz="2400" dirty="0"/>
+              <a:t> project with which </a:t>
+            </a:r>
+            <a:r>
+              <a:rPr lang="en-US" sz="2400" dirty="0" err="1"/>
+              <a:t>jBPM</a:t>
+            </a:r>
+            <a:r>
+              <a:rPr lang="en-US" sz="2400" dirty="0"/>
+              <a:t> can </a:t>
+            </a:r>
+            <a:r>
+              <a:rPr lang="en-US" sz="2400" dirty="0" smtClean="0"/>
+              <a:t>integrate.</a:t>
+            </a:r>
+          </a:p>
+          <a:p>
+            <a:endParaRPr lang="en-US" sz="2400" dirty="0"/>
+          </a:p>
+          <a:p>
+            <a:r>
+              <a:rPr lang="en-US" sz="2400" dirty="0" smtClean="0"/>
+              <a:t>The </a:t>
+            </a:r>
+            <a:r>
+              <a:rPr lang="en-US" sz="2400" dirty="0"/>
+              <a:t>dashed border indicates the optional component, while the core engine is the core of the project and is required if you want to execute business processes.</a:t>
+            </a:r>
           </a:p>
         </p:txBody>
       </p:sp>
     </p:spTree>
     <p:extLst>
       <p:ext uri="{BB962C8B-B14F-4D97-AF65-F5344CB8AC3E}">
-        <p14:creationId xmlns:p14="http://schemas.microsoft.com/office/powerpoint/2010/main" val="71875033"/>
+        <p14:creationId xmlns:p14="http://schemas.microsoft.com/office/powerpoint/2010/main" val="2175012507"/>
       </p:ext>
     </p:extLst>
   </p:cSld>
   <p:clrMapOvr>
     <a:masterClrMapping/>
   </p:clrMapOvr>
+  <p:timing>
+    <p:tnLst>
+      <p:par>
+        <p:cTn id="1" dur="indefinite" restart="never" nodeType="tmRoot"/>
+      </p:par>
+    </p:tnLst>
+  </p:timing>
+</p:sld>
+</file>
+
+<file path=ppt/slides/slide8.xml><?xml version="1.0" encoding="utf-8"?>
+<p:sld xmlns:a="http://schemas.openxmlformats.org/drawingml/2006/main" xmlns:r="http://schemas.openxmlformats.org/officeDocument/2006/relationships" xmlns:p="http://schemas.openxmlformats.org/presentationml/2006/main">
+  <p:cSld>
+    <p:spTree>
+      <p:nvGrpSpPr>
+        <p:cNvPr id="1" name=""/>
+        <p:cNvGrpSpPr/>
+        <p:nvPr/>
+      </p:nvGrpSpPr>
+      <p:grpSpPr>
+        <a:xfrm>
+          <a:off x="0" y="0"/>
+          <a:ext cx="0" cy="0"/>
+          <a:chOff x="0" y="0"/>
+          <a:chExt cx="0" cy="0"/>
+        </a:xfrm>
+      </p:grpSpPr>
+      <p:pic>
+        <p:nvPicPr>
+          <p:cNvPr id="5" name="Content Placeholder 4"/>
+          <p:cNvPicPr>
+            <a:picLocks noGrp="1" noChangeAspect="1"/>
+          </p:cNvPicPr>
+          <p:nvPr>
+            <p:ph idx="1"/>
+          </p:nvPr>
+        </p:nvPicPr>
+        <p:blipFill>
+          <a:blip r:embed="rId2">
+            <a:extLst>
+              <a:ext uri="{28A0092B-C50C-407E-A947-70E740481C1C}">
+                <a14:useLocalDpi xmlns:a14="http://schemas.microsoft.com/office/drawing/2010/main" val="0"/>
+              </a:ext>
+            </a:extLst>
+          </a:blip>
+          <a:stretch>
+            <a:fillRect/>
+          </a:stretch>
+        </p:blipFill>
+        <p:spPr>
+          <a:xfrm>
+            <a:off x="470969" y="2277880"/>
+            <a:ext cx="5839259" cy="4286845"/>
+          </a:xfrm>
+        </p:spPr>
+      </p:pic>
+      <p:sp>
+        <p:nvSpPr>
+          <p:cNvPr id="3" name="Title 2"/>
+          <p:cNvSpPr>
+            <a:spLocks noGrp="1"/>
+          </p:cNvSpPr>
+          <p:nvPr>
+            <p:ph type="title"/>
+          </p:nvPr>
+        </p:nvSpPr>
+        <p:spPr/>
+        <p:txBody>
+          <a:bodyPr/>
+          <a:lstStyle/>
+          <a:p>
+            <a:r>
+              <a:rPr lang="en-US" dirty="0" err="1" smtClean="0"/>
+              <a:t>jBPM</a:t>
+            </a:r>
+            <a:r>
+              <a:rPr lang="en-US" dirty="0" smtClean="0"/>
+              <a:t> Overview</a:t>
+            </a:r>
+            <a:endParaRPr lang="en-US" dirty="0"/>
+          </a:p>
+        </p:txBody>
+      </p:sp>
+      <p:sp>
+        <p:nvSpPr>
+          <p:cNvPr id="6" name="TextBox 5"/>
+          <p:cNvSpPr txBox="1"/>
+          <p:nvPr/>
+        </p:nvSpPr>
+        <p:spPr>
+          <a:xfrm>
+            <a:off x="6970426" y="2698230"/>
+            <a:ext cx="184731" cy="369332"/>
+          </a:xfrm>
+          <a:prstGeom prst="rect">
+            <a:avLst/>
+          </a:prstGeom>
+          <a:noFill/>
+        </p:spPr>
+        <p:txBody>
+          <a:bodyPr wrap="none" rtlCol="0">
+            <a:spAutoFit/>
+          </a:bodyPr>
+          <a:lstStyle/>
+          <a:p>
+            <a:endParaRPr lang="en-US" dirty="0"/>
+          </a:p>
+        </p:txBody>
+      </p:sp>
+      <p:sp>
+        <p:nvSpPr>
+          <p:cNvPr id="9" name="TextBox 8"/>
+          <p:cNvSpPr txBox="1"/>
+          <p:nvPr/>
+        </p:nvSpPr>
+        <p:spPr>
+          <a:xfrm>
+            <a:off x="6538423" y="2282732"/>
+            <a:ext cx="5093944" cy="1569660"/>
+          </a:xfrm>
+          <a:prstGeom prst="rect">
+            <a:avLst/>
+          </a:prstGeom>
+          <a:noFill/>
+        </p:spPr>
+        <p:txBody>
+          <a:bodyPr wrap="square" rtlCol="0">
+            <a:spAutoFit/>
+          </a:bodyPr>
+          <a:lstStyle/>
+          <a:p>
+            <a:r>
+              <a:rPr lang="en-US" sz="2400" dirty="0"/>
+              <a:t>The history log will log all information about the current and previous state of all your process instances.</a:t>
+            </a:r>
+          </a:p>
+        </p:txBody>
+      </p:sp>
+      <p:sp>
+        <p:nvSpPr>
+          <p:cNvPr id="4" name="Oval 3"/>
+          <p:cNvSpPr/>
+          <p:nvPr/>
+        </p:nvSpPr>
+        <p:spPr>
+          <a:xfrm>
+            <a:off x="3177915" y="3477718"/>
+            <a:ext cx="1169233" cy="1214203"/>
+          </a:xfrm>
+          <a:prstGeom prst="ellipse">
+            <a:avLst/>
+          </a:prstGeom>
+          <a:noFill/>
+          <a:ln w="76200">
+            <a:solidFill>
+              <a:schemeClr val="accent5"/>
+            </a:solidFill>
+          </a:ln>
+        </p:spPr>
+        <p:style>
+          <a:lnRef idx="2">
+            <a:schemeClr val="accent1">
+              <a:shade val="50000"/>
+            </a:schemeClr>
+          </a:lnRef>
+          <a:fillRef idx="1">
+            <a:schemeClr val="accent1"/>
+          </a:fillRef>
+          <a:effectRef idx="0">
+            <a:schemeClr val="accent1"/>
+          </a:effectRef>
+          <a:fontRef idx="minor">
+            <a:schemeClr val="lt1"/>
+          </a:fontRef>
+        </p:style>
+        <p:txBody>
+          <a:bodyPr rtlCol="0" anchor="ctr"/>
+          <a:lstStyle/>
+          <a:p>
+            <a:pPr algn="ctr"/>
+            <a:endParaRPr lang="en-US"/>
+          </a:p>
+        </p:txBody>
+      </p:sp>
+    </p:spTree>
+    <p:extLst>
+      <p:ext uri="{BB962C8B-B14F-4D97-AF65-F5344CB8AC3E}">
+        <p14:creationId xmlns:p14="http://schemas.microsoft.com/office/powerpoint/2010/main" val="3373673194"/>
+      </p:ext>
+    </p:extLst>
+  </p:cSld>
+  <p:clrMapOvr>
+    <a:masterClrMapping/>
+  </p:clrMapOvr>
+  <p:timing>
+    <p:tnLst>
+      <p:par>
+        <p:cTn id="1" dur="indefinite" restart="never" nodeType="tmRoot"/>
+      </p:par>
+    </p:tnLst>
+  </p:timing>
+</p:sld>
+</file>
+
+<file path=ppt/slides/slide9.xml><?xml version="1.0" encoding="utf-8"?>
+<p:sld xmlns:a="http://schemas.openxmlformats.org/drawingml/2006/main" xmlns:r="http://schemas.openxmlformats.org/officeDocument/2006/relationships" xmlns:p="http://schemas.openxmlformats.org/presentationml/2006/main">
+  <p:cSld>
+    <p:spTree>
+      <p:nvGrpSpPr>
+        <p:cNvPr id="1" name=""/>
+        <p:cNvGrpSpPr/>
+        <p:nvPr/>
+      </p:nvGrpSpPr>
+      <p:grpSpPr>
+        <a:xfrm>
+          <a:off x="0" y="0"/>
+          <a:ext cx="0" cy="0"/>
+          <a:chOff x="0" y="0"/>
+          <a:chExt cx="0" cy="0"/>
+        </a:xfrm>
+      </p:grpSpPr>
+      <p:sp>
+        <p:nvSpPr>
+          <p:cNvPr id="3" name="Title 2"/>
+          <p:cNvSpPr>
+            <a:spLocks noGrp="1"/>
+          </p:cNvSpPr>
+          <p:nvPr>
+            <p:ph type="title"/>
+          </p:nvPr>
+        </p:nvSpPr>
+        <p:spPr/>
+        <p:txBody>
+          <a:bodyPr/>
+          <a:lstStyle/>
+          <a:p>
+            <a:r>
+              <a:rPr lang="en-US" dirty="0" err="1" smtClean="0"/>
+              <a:t>jBPM</a:t>
+            </a:r>
+            <a:r>
+              <a:rPr lang="en-US" dirty="0" smtClean="0"/>
+              <a:t> Overview</a:t>
+            </a:r>
+            <a:endParaRPr lang="en-US" dirty="0"/>
+          </a:p>
+        </p:txBody>
+      </p:sp>
+      <p:sp>
+        <p:nvSpPr>
+          <p:cNvPr id="6" name="TextBox 5"/>
+          <p:cNvSpPr txBox="1"/>
+          <p:nvPr/>
+        </p:nvSpPr>
+        <p:spPr>
+          <a:xfrm>
+            <a:off x="6970426" y="2698230"/>
+            <a:ext cx="184731" cy="369332"/>
+          </a:xfrm>
+          <a:prstGeom prst="rect">
+            <a:avLst/>
+          </a:prstGeom>
+          <a:noFill/>
+        </p:spPr>
+        <p:txBody>
+          <a:bodyPr wrap="none" rtlCol="0">
+            <a:spAutoFit/>
+          </a:bodyPr>
+          <a:lstStyle/>
+          <a:p>
+            <a:endParaRPr lang="en-US" dirty="0"/>
+          </a:p>
+        </p:txBody>
+      </p:sp>
+      <p:sp>
+        <p:nvSpPr>
+          <p:cNvPr id="9" name="TextBox 8"/>
+          <p:cNvSpPr txBox="1"/>
+          <p:nvPr/>
+        </p:nvSpPr>
+        <p:spPr>
+          <a:xfrm>
+            <a:off x="6538423" y="2282732"/>
+            <a:ext cx="5093944" cy="1569660"/>
+          </a:xfrm>
+          <a:prstGeom prst="rect">
+            <a:avLst/>
+          </a:prstGeom>
+          <a:noFill/>
+        </p:spPr>
+        <p:txBody>
+          <a:bodyPr wrap="square" rtlCol="0">
+            <a:spAutoFit/>
+          </a:bodyPr>
+          <a:lstStyle/>
+          <a:p>
+            <a:r>
+              <a:rPr lang="en-US" sz="2400" dirty="0"/>
+              <a:t>The human task service will take care of the human task life cycle if human actors participate in the process.</a:t>
+            </a:r>
+          </a:p>
+        </p:txBody>
+      </p:sp>
+      <p:pic>
+        <p:nvPicPr>
+          <p:cNvPr id="11" name="Picture 10"/>
+          <p:cNvPicPr>
+            <a:picLocks noChangeAspect="1"/>
+          </p:cNvPicPr>
+          <p:nvPr/>
+        </p:nvPicPr>
+        <p:blipFill>
+          <a:blip r:embed="rId2"/>
+          <a:stretch>
+            <a:fillRect/>
+          </a:stretch>
+        </p:blipFill>
+        <p:spPr>
+          <a:xfrm>
+            <a:off x="250004" y="2282732"/>
+            <a:ext cx="5838825" cy="4286250"/>
+          </a:xfrm>
+          <a:prstGeom prst="rect">
+            <a:avLst/>
+          </a:prstGeom>
+        </p:spPr>
+      </p:pic>
+      <p:sp>
+        <p:nvSpPr>
+          <p:cNvPr id="8" name="Oval 7"/>
+          <p:cNvSpPr/>
+          <p:nvPr/>
+        </p:nvSpPr>
+        <p:spPr>
+          <a:xfrm>
+            <a:off x="3990094" y="3470142"/>
+            <a:ext cx="1169233" cy="1214203"/>
+          </a:xfrm>
+          <a:prstGeom prst="ellipse">
+            <a:avLst/>
+          </a:prstGeom>
+          <a:noFill/>
+          <a:ln w="76200">
+            <a:solidFill>
+              <a:schemeClr val="accent5"/>
+            </a:solidFill>
+          </a:ln>
+        </p:spPr>
+        <p:style>
+          <a:lnRef idx="2">
+            <a:schemeClr val="accent1">
+              <a:shade val="50000"/>
+            </a:schemeClr>
+          </a:lnRef>
+          <a:fillRef idx="1">
+            <a:schemeClr val="accent1"/>
+          </a:fillRef>
+          <a:effectRef idx="0">
+            <a:schemeClr val="accent1"/>
+          </a:effectRef>
+          <a:fontRef idx="minor">
+            <a:schemeClr val="lt1"/>
+          </a:fontRef>
+        </p:style>
+        <p:txBody>
+          <a:bodyPr rtlCol="0" anchor="ctr"/>
+          <a:lstStyle/>
+          <a:p>
+            <a:pPr algn="ctr"/>
+            <a:endParaRPr lang="en-US"/>
+          </a:p>
+        </p:txBody>
+      </p:sp>
+    </p:spTree>
+    <p:extLst>
+      <p:ext uri="{BB962C8B-B14F-4D97-AF65-F5344CB8AC3E}">
+        <p14:creationId xmlns:p14="http://schemas.microsoft.com/office/powerpoint/2010/main" val="2247454382"/>
+      </p:ext>
+    </p:extLst>
+  </p:cSld>
+  <p:clrMapOvr>
+    <a:masterClrMapping/>
+  </p:clrMapOvr>
+  <p:timing>
+    <p:tnLst>
+      <p:par>
+        <p:cTn id="1" dur="indefinite" restart="never" nodeType="tmRoot"/>
+      </p:par>
+    </p:tnLst>
+  </p:timing>
 </p:sld>
 </file>
 

</xml_diff>

<commit_message>
revisi file presentasi jBPM karena kesalahan versi
</commit_message>
<xml_diff>
--- a/Eksplorasi WSO2 BPS dan JBPM.pptx
+++ b/Eksplorasi WSO2 BPS dan JBPM.pptx
@@ -11,16 +11,17 @@
     <p:sldId id="259" r:id="rId5"/>
     <p:sldId id="260" r:id="rId6"/>
     <p:sldId id="262" r:id="rId7"/>
-    <p:sldId id="263" r:id="rId8"/>
-    <p:sldId id="264" r:id="rId9"/>
-    <p:sldId id="265" r:id="rId10"/>
+    <p:sldId id="264" r:id="rId8"/>
+    <p:sldId id="265" r:id="rId9"/>
+    <p:sldId id="275" r:id="rId10"/>
     <p:sldId id="266" r:id="rId11"/>
     <p:sldId id="267" r:id="rId12"/>
-    <p:sldId id="269" r:id="rId13"/>
-    <p:sldId id="270" r:id="rId14"/>
+    <p:sldId id="270" r:id="rId13"/>
+    <p:sldId id="271" r:id="rId14"/>
     <p:sldId id="272" r:id="rId15"/>
-    <p:sldId id="271" r:id="rId16"/>
-    <p:sldId id="261" r:id="rId17"/>
+    <p:sldId id="274" r:id="rId16"/>
+    <p:sldId id="273" r:id="rId17"/>
+    <p:sldId id="261" r:id="rId18"/>
   </p:sldIdLst>
   <p:sldSz cx="12192000" cy="6858000"/>
   <p:notesSz cx="6858000" cy="9144000"/>
@@ -4733,6 +4734,13 @@
   <p:clrMapOvr>
     <a:masterClrMapping/>
   </p:clrMapOvr>
+  <p:timing>
+    <p:tnLst>
+      <p:par>
+        <p:cTn id="1" dur="indefinite" restart="never" nodeType="tmRoot"/>
+      </p:par>
+    </p:tnLst>
+  </p:timing>
 </p:sld>
 </file>
 
@@ -4753,9 +4761,180 @@
           <a:chExt cx="0" cy="0"/>
         </a:xfrm>
       </p:grpSpPr>
+      <p:sp>
+        <p:nvSpPr>
+          <p:cNvPr id="3" name="Title 2"/>
+          <p:cNvSpPr>
+            <a:spLocks noGrp="1"/>
+          </p:cNvSpPr>
+          <p:nvPr>
+            <p:ph type="title"/>
+          </p:nvPr>
+        </p:nvSpPr>
+        <p:spPr/>
+        <p:txBody>
+          <a:bodyPr/>
+          <a:lstStyle/>
+          <a:p>
+            <a:r>
+              <a:rPr lang="en-US" dirty="0" err="1" smtClean="0"/>
+              <a:t>jBPM</a:t>
+            </a:r>
+            <a:r>
+              <a:rPr lang="en-US" dirty="0" smtClean="0"/>
+              <a:t> Overview</a:t>
+            </a:r>
+            <a:endParaRPr lang="en-US" dirty="0"/>
+          </a:p>
+        </p:txBody>
+      </p:sp>
+      <p:sp>
+        <p:nvSpPr>
+          <p:cNvPr id="6" name="TextBox 5"/>
+          <p:cNvSpPr txBox="1"/>
+          <p:nvPr/>
+        </p:nvSpPr>
+        <p:spPr>
+          <a:xfrm>
+            <a:off x="6970426" y="2698230"/>
+            <a:ext cx="184731" cy="369332"/>
+          </a:xfrm>
+          <a:prstGeom prst="rect">
+            <a:avLst/>
+          </a:prstGeom>
+          <a:noFill/>
+        </p:spPr>
+        <p:txBody>
+          <a:bodyPr wrap="none" rtlCol="0">
+            <a:spAutoFit/>
+          </a:bodyPr>
+          <a:lstStyle/>
+          <a:p>
+            <a:endParaRPr lang="en-US" dirty="0"/>
+          </a:p>
+        </p:txBody>
+      </p:sp>
+      <p:sp>
+        <p:nvSpPr>
+          <p:cNvPr id="9" name="TextBox 8"/>
+          <p:cNvSpPr txBox="1"/>
+          <p:nvPr/>
+        </p:nvSpPr>
+        <p:spPr>
+          <a:xfrm>
+            <a:off x="6538423" y="2282732"/>
+            <a:ext cx="5093944" cy="1938992"/>
+          </a:xfrm>
+          <a:prstGeom prst="rect">
+            <a:avLst/>
+          </a:prstGeom>
+          <a:noFill/>
+        </p:spPr>
+        <p:txBody>
+          <a:bodyPr wrap="square" rtlCol="0">
+            <a:spAutoFit/>
+          </a:bodyPr>
+          <a:lstStyle/>
+          <a:p>
+            <a:r>
+              <a:rPr lang="en-US" sz="2400" dirty="0" smtClean="0"/>
+              <a:t>Process designer </a:t>
+            </a:r>
+            <a:r>
+              <a:rPr lang="en-US" sz="2400" dirty="0" err="1" smtClean="0"/>
+              <a:t>memungkinkan</a:t>
+            </a:r>
+            <a:r>
+              <a:rPr lang="en-US" sz="2400" dirty="0" smtClean="0"/>
+              <a:t> </a:t>
+            </a:r>
+            <a:r>
+              <a:rPr lang="en-US" sz="2400" dirty="0" err="1" smtClean="0"/>
+              <a:t>pengguna</a:t>
+            </a:r>
+            <a:r>
+              <a:rPr lang="en-US" sz="2400" dirty="0" smtClean="0"/>
+              <a:t> </a:t>
+            </a:r>
+            <a:r>
+              <a:rPr lang="en-US" sz="2400" dirty="0" err="1" smtClean="0"/>
+              <a:t>dari</a:t>
+            </a:r>
+            <a:r>
+              <a:rPr lang="en-US" sz="2400" dirty="0" smtClean="0"/>
+              <a:t> </a:t>
+            </a:r>
+            <a:r>
+              <a:rPr lang="en-US" sz="2400" dirty="0" err="1" smtClean="0"/>
+              <a:t>kelompok</a:t>
+            </a:r>
+            <a:r>
+              <a:rPr lang="en-US" sz="2400" dirty="0" smtClean="0"/>
+              <a:t> </a:t>
+            </a:r>
+            <a:r>
+              <a:rPr lang="en-US" sz="2400" dirty="0" err="1" smtClean="0"/>
+              <a:t>bisnis</a:t>
+            </a:r>
+            <a:r>
+              <a:rPr lang="en-US" sz="2400" dirty="0" smtClean="0"/>
+              <a:t> </a:t>
+            </a:r>
+            <a:r>
+              <a:rPr lang="en-US" sz="2400" dirty="0" err="1" smtClean="0"/>
+              <a:t>untuk</a:t>
+            </a:r>
+            <a:r>
+              <a:rPr lang="en-US" sz="2400" dirty="0" smtClean="0"/>
+              <a:t> </a:t>
+            </a:r>
+            <a:r>
+              <a:rPr lang="en-US" sz="2400" dirty="0" err="1" smtClean="0"/>
+              <a:t>merancang</a:t>
+            </a:r>
+            <a:r>
+              <a:rPr lang="en-US" sz="2400" dirty="0" smtClean="0"/>
+              <a:t> </a:t>
+            </a:r>
+            <a:r>
+              <a:rPr lang="en-US" sz="2400" dirty="0" err="1" smtClean="0"/>
+              <a:t>dan</a:t>
+            </a:r>
+            <a:r>
+              <a:rPr lang="en-US" sz="2400" dirty="0" smtClean="0"/>
+              <a:t> </a:t>
+            </a:r>
+            <a:r>
+              <a:rPr lang="en-US" sz="2400" dirty="0" err="1" smtClean="0"/>
+              <a:t>mensimulasikan</a:t>
+            </a:r>
+            <a:r>
+              <a:rPr lang="en-US" sz="2400" dirty="0" smtClean="0"/>
+              <a:t> proses </a:t>
+            </a:r>
+            <a:r>
+              <a:rPr lang="en-US" sz="2400" dirty="0" err="1" smtClean="0"/>
+              <a:t>bisnis</a:t>
+            </a:r>
+            <a:r>
+              <a:rPr lang="en-US" sz="2400" dirty="0" smtClean="0"/>
+              <a:t> </a:t>
+            </a:r>
+            <a:r>
+              <a:rPr lang="en-US" sz="2400" dirty="0" err="1" smtClean="0"/>
+              <a:t>melalui</a:t>
+            </a:r>
+            <a:r>
+              <a:rPr lang="en-US" sz="2400" dirty="0" smtClean="0"/>
+              <a:t> web.</a:t>
+            </a:r>
+            <a:endParaRPr lang="en-US" sz="2400" dirty="0"/>
+          </a:p>
+        </p:txBody>
+      </p:sp>
       <p:pic>
         <p:nvPicPr>
-          <p:cNvPr id="5" name="Content Placeholder 4"/>
+          <p:cNvPr id="13" name="Content Placeholder 13"/>
           <p:cNvPicPr>
             <a:picLocks noGrp="1" noChangeAspect="1"/>
           </p:cNvPicPr>
@@ -4777,108 +4956,21 @@
         </p:blipFill>
         <p:spPr>
           <a:xfrm>
-            <a:off x="470969" y="2277880"/>
-            <a:ext cx="5839259" cy="4286845"/>
+            <a:off x="386306" y="2282592"/>
+            <a:ext cx="5936116" cy="3878263"/>
           </a:xfrm>
         </p:spPr>
       </p:pic>
       <p:sp>
         <p:nvSpPr>
-          <p:cNvPr id="3" name="Title 2"/>
-          <p:cNvSpPr>
-            <a:spLocks noGrp="1"/>
-          </p:cNvSpPr>
-          <p:nvPr>
-            <p:ph type="title"/>
-          </p:nvPr>
-        </p:nvSpPr>
-        <p:spPr/>
-        <p:txBody>
-          <a:bodyPr/>
-          <a:lstStyle/>
-          <a:p>
-            <a:r>
-              <a:rPr lang="en-US" dirty="0" err="1" smtClean="0"/>
-              <a:t>jBPM</a:t>
-            </a:r>
-            <a:r>
-              <a:rPr lang="en-US" dirty="0" smtClean="0"/>
-              <a:t> Overview</a:t>
-            </a:r>
-            <a:endParaRPr lang="en-US" dirty="0"/>
-          </a:p>
-        </p:txBody>
-      </p:sp>
-      <p:sp>
-        <p:nvSpPr>
-          <p:cNvPr id="6" name="TextBox 5"/>
-          <p:cNvSpPr txBox="1"/>
+          <p:cNvPr id="16" name="Oval 15"/>
+          <p:cNvSpPr/>
           <p:nvPr/>
         </p:nvSpPr>
         <p:spPr>
           <a:xfrm>
-            <a:off x="6970426" y="2698230"/>
-            <a:ext cx="184731" cy="369332"/>
-          </a:xfrm>
-          <a:prstGeom prst="rect">
-            <a:avLst/>
-          </a:prstGeom>
-          <a:noFill/>
-        </p:spPr>
-        <p:txBody>
-          <a:bodyPr wrap="none" rtlCol="0">
-            <a:spAutoFit/>
-          </a:bodyPr>
-          <a:lstStyle/>
-          <a:p>
-            <a:endParaRPr lang="en-US" dirty="0"/>
-          </a:p>
-        </p:txBody>
-      </p:sp>
-      <p:sp>
-        <p:nvSpPr>
-          <p:cNvPr id="9" name="TextBox 8"/>
-          <p:cNvSpPr txBox="1"/>
-          <p:nvPr/>
-        </p:nvSpPr>
-        <p:spPr>
-          <a:xfrm>
-            <a:off x="6538423" y="2282732"/>
-            <a:ext cx="5093944" cy="1938992"/>
-          </a:xfrm>
-          <a:prstGeom prst="rect">
-            <a:avLst/>
-          </a:prstGeom>
-          <a:noFill/>
-        </p:spPr>
-        <p:txBody>
-          <a:bodyPr wrap="square" rtlCol="0">
-            <a:spAutoFit/>
-          </a:bodyPr>
-          <a:lstStyle/>
-          <a:p>
-            <a:r>
-              <a:rPr lang="en-US" sz="2400" dirty="0"/>
-              <a:t>The Guvnor repository is an optional component that can be used to store all your business processes. It supports collaboration, versioning, etc</a:t>
-            </a:r>
-            <a:r>
-              <a:rPr lang="en-US" sz="2400" dirty="0" smtClean="0"/>
-              <a:t>.</a:t>
-            </a:r>
-            <a:endParaRPr lang="en-US" sz="2400" dirty="0"/>
-          </a:p>
-        </p:txBody>
-      </p:sp>
-      <p:sp>
-        <p:nvSpPr>
-          <p:cNvPr id="8" name="Oval 7"/>
-          <p:cNvSpPr/>
-          <p:nvPr/>
-        </p:nvSpPr>
-        <p:spPr>
-          <a:xfrm>
-            <a:off x="2008682" y="4586990"/>
-            <a:ext cx="1169233" cy="1214203"/>
+            <a:off x="947966" y="4708913"/>
+            <a:ext cx="1015744" cy="914400"/>
           </a:xfrm>
           <a:prstGeom prst="ellipse">
             <a:avLst/>
@@ -4886,7 +4978,7 @@
           <a:noFill/>
           <a:ln w="76200">
             <a:solidFill>
-              <a:schemeClr val="accent5"/>
+              <a:srgbClr val="FFFF00"/>
             </a:solidFill>
           </a:ln>
         </p:spPr>
@@ -4952,9 +5044,180 @@
           <a:chExt cx="0" cy="0"/>
         </a:xfrm>
       </p:grpSpPr>
+      <p:sp>
+        <p:nvSpPr>
+          <p:cNvPr id="3" name="Title 2"/>
+          <p:cNvSpPr>
+            <a:spLocks noGrp="1"/>
+          </p:cNvSpPr>
+          <p:nvPr>
+            <p:ph type="title"/>
+          </p:nvPr>
+        </p:nvSpPr>
+        <p:spPr/>
+        <p:txBody>
+          <a:bodyPr/>
+          <a:lstStyle/>
+          <a:p>
+            <a:r>
+              <a:rPr lang="en-US" dirty="0" err="1" smtClean="0"/>
+              <a:t>jBPM</a:t>
+            </a:r>
+            <a:r>
+              <a:rPr lang="en-US" dirty="0" smtClean="0"/>
+              <a:t> Overview</a:t>
+            </a:r>
+            <a:endParaRPr lang="en-US" dirty="0"/>
+          </a:p>
+        </p:txBody>
+      </p:sp>
+      <p:sp>
+        <p:nvSpPr>
+          <p:cNvPr id="6" name="TextBox 5"/>
+          <p:cNvSpPr txBox="1"/>
+          <p:nvPr/>
+        </p:nvSpPr>
+        <p:spPr>
+          <a:xfrm>
+            <a:off x="6970426" y="2698230"/>
+            <a:ext cx="184731" cy="369332"/>
+          </a:xfrm>
+          <a:prstGeom prst="rect">
+            <a:avLst/>
+          </a:prstGeom>
+          <a:noFill/>
+        </p:spPr>
+        <p:txBody>
+          <a:bodyPr wrap="none" rtlCol="0">
+            <a:spAutoFit/>
+          </a:bodyPr>
+          <a:lstStyle/>
+          <a:p>
+            <a:endParaRPr lang="en-US" dirty="0"/>
+          </a:p>
+        </p:txBody>
+      </p:sp>
+      <p:sp>
+        <p:nvSpPr>
+          <p:cNvPr id="9" name="TextBox 8"/>
+          <p:cNvSpPr txBox="1"/>
+          <p:nvPr/>
+        </p:nvSpPr>
+        <p:spPr>
+          <a:xfrm>
+            <a:off x="6538423" y="2282732"/>
+            <a:ext cx="5093944" cy="1938992"/>
+          </a:xfrm>
+          <a:prstGeom prst="rect">
+            <a:avLst/>
+          </a:prstGeom>
+          <a:noFill/>
+        </p:spPr>
+        <p:txBody>
+          <a:bodyPr wrap="square" rtlCol="0">
+            <a:spAutoFit/>
+          </a:bodyPr>
+          <a:lstStyle/>
+          <a:p>
+            <a:r>
+              <a:rPr lang="en-US" sz="2400" dirty="0" smtClean="0"/>
+              <a:t>Data modeler </a:t>
+            </a:r>
+            <a:r>
+              <a:rPr lang="en-US" sz="2400" dirty="0" err="1" smtClean="0"/>
+              <a:t>memungkinkan</a:t>
+            </a:r>
+            <a:r>
+              <a:rPr lang="en-US" sz="2400" dirty="0" smtClean="0"/>
+              <a:t> </a:t>
+            </a:r>
+            <a:r>
+              <a:rPr lang="en-US" sz="2400" dirty="0" err="1" smtClean="0"/>
+              <a:t>pengguna</a:t>
+            </a:r>
+            <a:r>
+              <a:rPr lang="en-US" sz="2400" dirty="0" smtClean="0"/>
+              <a:t> non-</a:t>
+            </a:r>
+            <a:r>
+              <a:rPr lang="en-US" sz="2400" dirty="0" err="1" smtClean="0"/>
+              <a:t>teknis</a:t>
+            </a:r>
+            <a:r>
+              <a:rPr lang="en-US" sz="2400" dirty="0" smtClean="0"/>
+              <a:t> </a:t>
+            </a:r>
+            <a:r>
+              <a:rPr lang="en-US" sz="2400" dirty="0" err="1" smtClean="0"/>
+              <a:t>untuk</a:t>
+            </a:r>
+            <a:r>
+              <a:rPr lang="en-US" sz="2400" dirty="0" smtClean="0"/>
+              <a:t> </a:t>
+            </a:r>
+            <a:r>
+              <a:rPr lang="en-US" sz="2400" dirty="0" err="1" smtClean="0"/>
+              <a:t>melihat</a:t>
+            </a:r>
+            <a:r>
+              <a:rPr lang="en-US" sz="2400" dirty="0" smtClean="0"/>
+              <a:t>, </a:t>
+            </a:r>
+            <a:r>
+              <a:rPr lang="en-US" sz="2400" dirty="0" err="1" smtClean="0"/>
+              <a:t>memodifikasi</a:t>
+            </a:r>
+            <a:r>
+              <a:rPr lang="en-US" sz="2400" dirty="0" smtClean="0"/>
+              <a:t> </a:t>
+            </a:r>
+            <a:r>
+              <a:rPr lang="en-US" sz="2400" dirty="0" err="1" smtClean="0"/>
+              <a:t>dan</a:t>
+            </a:r>
+            <a:r>
+              <a:rPr lang="en-US" sz="2400" dirty="0" smtClean="0"/>
+              <a:t> </a:t>
+            </a:r>
+            <a:r>
+              <a:rPr lang="en-US" sz="2400" dirty="0" err="1" smtClean="0"/>
+              <a:t>membuat</a:t>
+            </a:r>
+            <a:r>
+              <a:rPr lang="en-US" sz="2400" dirty="0" smtClean="0"/>
+              <a:t> model data </a:t>
+            </a:r>
+            <a:r>
+              <a:rPr lang="en-US" sz="2400" dirty="0" err="1" smtClean="0"/>
+              <a:t>untuk</a:t>
+            </a:r>
+            <a:r>
+              <a:rPr lang="en-US" sz="2400" dirty="0" smtClean="0"/>
+              <a:t> </a:t>
+            </a:r>
+            <a:r>
+              <a:rPr lang="en-US" sz="2400" dirty="0" err="1" smtClean="0"/>
+              <a:t>digunakan</a:t>
+            </a:r>
+            <a:r>
+              <a:rPr lang="en-US" sz="2400" dirty="0" smtClean="0"/>
+              <a:t> </a:t>
+            </a:r>
+            <a:r>
+              <a:rPr lang="en-US" sz="2400" dirty="0" err="1" smtClean="0"/>
+              <a:t>dalam</a:t>
+            </a:r>
+            <a:r>
+              <a:rPr lang="en-US" sz="2400" dirty="0" smtClean="0"/>
+              <a:t> proses.</a:t>
+            </a:r>
+            <a:endParaRPr lang="en-US" sz="2400" dirty="0"/>
+          </a:p>
+        </p:txBody>
+      </p:sp>
       <p:pic>
         <p:nvPicPr>
-          <p:cNvPr id="5" name="Content Placeholder 4"/>
+          <p:cNvPr id="10" name="Content Placeholder 13"/>
           <p:cNvPicPr>
             <a:picLocks noGrp="1" noChangeAspect="1"/>
           </p:cNvPicPr>
@@ -4976,112 +5239,21 @@
         </p:blipFill>
         <p:spPr>
           <a:xfrm>
-            <a:off x="470969" y="2277880"/>
-            <a:ext cx="5839259" cy="4286845"/>
+            <a:off x="386306" y="2282732"/>
+            <a:ext cx="5936116" cy="3878263"/>
           </a:xfrm>
         </p:spPr>
       </p:pic>
       <p:sp>
         <p:nvSpPr>
-          <p:cNvPr id="3" name="Title 2"/>
-          <p:cNvSpPr>
-            <a:spLocks noGrp="1"/>
-          </p:cNvSpPr>
-          <p:nvPr>
-            <p:ph type="title"/>
-          </p:nvPr>
-        </p:nvSpPr>
-        <p:spPr/>
-        <p:txBody>
-          <a:bodyPr/>
-          <a:lstStyle/>
-          <a:p>
-            <a:r>
-              <a:rPr lang="en-US" dirty="0" err="1" smtClean="0"/>
-              <a:t>jBPM</a:t>
-            </a:r>
-            <a:r>
-              <a:rPr lang="en-US" dirty="0" smtClean="0"/>
-              <a:t> Overview</a:t>
-            </a:r>
-            <a:endParaRPr lang="en-US" dirty="0"/>
-          </a:p>
-        </p:txBody>
-      </p:sp>
-      <p:sp>
-        <p:nvSpPr>
-          <p:cNvPr id="6" name="TextBox 5"/>
-          <p:cNvSpPr txBox="1"/>
+          <p:cNvPr id="12" name="Oval 11"/>
+          <p:cNvSpPr/>
           <p:nvPr/>
         </p:nvSpPr>
         <p:spPr>
           <a:xfrm>
-            <a:off x="6970426" y="2698230"/>
-            <a:ext cx="184731" cy="369332"/>
-          </a:xfrm>
-          <a:prstGeom prst="rect">
-            <a:avLst/>
-          </a:prstGeom>
-          <a:noFill/>
-        </p:spPr>
-        <p:txBody>
-          <a:bodyPr wrap="none" rtlCol="0">
-            <a:spAutoFit/>
-          </a:bodyPr>
-          <a:lstStyle/>
-          <a:p>
-            <a:endParaRPr lang="en-US" dirty="0"/>
-          </a:p>
-        </p:txBody>
-      </p:sp>
-      <p:sp>
-        <p:nvSpPr>
-          <p:cNvPr id="9" name="TextBox 8"/>
-          <p:cNvSpPr txBox="1"/>
-          <p:nvPr/>
-        </p:nvSpPr>
-        <p:spPr>
-          <a:xfrm>
-            <a:off x="6538423" y="2282732"/>
-            <a:ext cx="5093944" cy="2308324"/>
-          </a:xfrm>
-          <a:prstGeom prst="rect">
-            <a:avLst/>
-          </a:prstGeom>
-          <a:noFill/>
-        </p:spPr>
-        <p:txBody>
-          <a:bodyPr wrap="square" rtlCol="0">
-            <a:spAutoFit/>
-          </a:bodyPr>
-          <a:lstStyle/>
-          <a:p>
-            <a:r>
-              <a:rPr lang="en-US" sz="2400" dirty="0" smtClean="0"/>
-              <a:t>The web-based designer is integrated in the Guvnor repository, which is targeted towards </a:t>
-            </a:r>
-            <a:r>
-              <a:rPr lang="en-US" sz="2400" b="1" dirty="0" smtClean="0"/>
-              <a:t>business users</a:t>
-            </a:r>
-            <a:r>
-              <a:rPr lang="en-US" sz="2400" dirty="0" smtClean="0"/>
-              <a:t> and allows you to manage your processes separately from your application.</a:t>
-            </a:r>
-            <a:endParaRPr lang="en-US" sz="2400" dirty="0"/>
-          </a:p>
-        </p:txBody>
-      </p:sp>
-      <p:sp>
-        <p:nvSpPr>
-          <p:cNvPr id="7" name="Oval 6"/>
-          <p:cNvSpPr/>
-          <p:nvPr/>
-        </p:nvSpPr>
-        <p:spPr>
-          <a:xfrm>
-            <a:off x="2998033" y="5279637"/>
-            <a:ext cx="1169233" cy="1214203"/>
+            <a:off x="1982289" y="4738896"/>
+            <a:ext cx="1015744" cy="914400"/>
           </a:xfrm>
           <a:prstGeom prst="ellipse">
             <a:avLst/>
@@ -5089,7 +5261,7 @@
           <a:noFill/>
           <a:ln w="76200">
             <a:solidFill>
-              <a:schemeClr val="accent5"/>
+              <a:srgbClr val="FFFF00"/>
             </a:solidFill>
           </a:ln>
         </p:spPr>
@@ -5216,8 +5388,8 @@
         </p:nvSpPr>
         <p:spPr>
           <a:xfrm>
-            <a:off x="6538423" y="2282732"/>
-            <a:ext cx="5093944" cy="2308324"/>
+            <a:off x="6463472" y="1997919"/>
+            <a:ext cx="5093944" cy="1938992"/>
           </a:xfrm>
           <a:prstGeom prst="rect">
             <a:avLst/>
@@ -5232,38 +5404,88 @@
           <a:p>
             <a:r>
               <a:rPr lang="en-US" sz="2400" dirty="0" smtClean="0"/>
-              <a:t>The web-based designer is integrated in the Guvnor repository, which is targeted towards business users and allows you to manage your processes separately from your application.</a:t>
-            </a:r>
-            <a:endParaRPr lang="en-US" sz="2400" dirty="0"/>
-          </a:p>
-        </p:txBody>
-      </p:sp>
-      <p:sp>
-        <p:nvSpPr>
-          <p:cNvPr id="2" name="Content Placeholder 1"/>
-          <p:cNvSpPr>
-            <a:spLocks noGrp="1"/>
-          </p:cNvSpPr>
-          <p:nvPr>
-            <p:ph idx="1"/>
-          </p:nvPr>
-        </p:nvSpPr>
-        <p:spPr/>
-        <p:txBody>
-          <a:bodyPr/>
-          <a:lstStyle/>
-          <a:p>
-            <a:endParaRPr lang="en-US" dirty="0"/>
+              <a:t>Web-based </a:t>
+            </a:r>
+            <a:r>
+              <a:rPr lang="en-US" sz="2400" dirty="0"/>
+              <a:t>form modeler </a:t>
+            </a:r>
+            <a:r>
+              <a:rPr lang="en-US" sz="2400" dirty="0" err="1" smtClean="0"/>
+              <a:t>memungkinkan</a:t>
+            </a:r>
+            <a:r>
+              <a:rPr lang="en-US" sz="2400" dirty="0" smtClean="0"/>
+              <a:t> </a:t>
+            </a:r>
+            <a:r>
+              <a:rPr lang="en-US" sz="2400" dirty="0" err="1" smtClean="0"/>
+              <a:t>pengguna</a:t>
+            </a:r>
+            <a:r>
+              <a:rPr lang="en-US" sz="2400" dirty="0" smtClean="0"/>
+              <a:t> </a:t>
+            </a:r>
+            <a:r>
+              <a:rPr lang="en-US" sz="2400" dirty="0" err="1" smtClean="0"/>
+              <a:t>untuk</a:t>
+            </a:r>
+            <a:r>
+              <a:rPr lang="en-US" sz="2400" dirty="0" smtClean="0"/>
+              <a:t> </a:t>
+            </a:r>
+            <a:r>
+              <a:rPr lang="en-US" sz="2400" dirty="0" err="1" smtClean="0"/>
+              <a:t>membuat</a:t>
+            </a:r>
+            <a:r>
+              <a:rPr lang="en-US" sz="2400" dirty="0" smtClean="0"/>
+              <a:t>, men-generate </a:t>
+            </a:r>
+            <a:r>
+              <a:rPr lang="en-US" sz="2400" dirty="0" err="1" smtClean="0"/>
+              <a:t>atau</a:t>
+            </a:r>
+            <a:r>
+              <a:rPr lang="en-US" sz="2400" dirty="0" smtClean="0"/>
+              <a:t> </a:t>
+            </a:r>
+            <a:r>
+              <a:rPr lang="en-US" sz="2400" dirty="0" err="1" smtClean="0"/>
+              <a:t>mengedit</a:t>
+            </a:r>
+            <a:r>
+              <a:rPr lang="en-US" sz="2400" dirty="0" smtClean="0"/>
+              <a:t> form yang </a:t>
+            </a:r>
+            <a:r>
+              <a:rPr lang="en-US" sz="2400" dirty="0" err="1" smtClean="0"/>
+              <a:t>berhubungan</a:t>
+            </a:r>
+            <a:r>
+              <a:rPr lang="en-US" sz="2400" dirty="0" smtClean="0"/>
+              <a:t> </a:t>
+            </a:r>
+            <a:r>
+              <a:rPr lang="en-US" sz="2400" dirty="0" err="1" smtClean="0"/>
+              <a:t>dengan</a:t>
+            </a:r>
+            <a:r>
+              <a:rPr lang="en-US" sz="2400" dirty="0" smtClean="0"/>
+              <a:t> proses-proses.</a:t>
+            </a:r>
           </a:p>
         </p:txBody>
       </p:sp>
       <p:pic>
         <p:nvPicPr>
-          <p:cNvPr id="7" name="Picture 6"/>
+          <p:cNvPr id="15" name="Content Placeholder 13"/>
           <p:cNvPicPr>
-            <a:picLocks noChangeAspect="1"/>
+            <a:picLocks noGrp="1" noChangeAspect="1"/>
           </p:cNvPicPr>
-          <p:nvPr/>
+          <p:nvPr>
+            <p:ph idx="1"/>
+          </p:nvPr>
         </p:nvPicPr>
         <p:blipFill>
           <a:blip r:embed="rId2">
@@ -5279,18 +5501,61 @@
         </p:blipFill>
         <p:spPr>
           <a:xfrm>
-            <a:off x="62274" y="2248348"/>
-            <a:ext cx="6338923" cy="4158972"/>
+            <a:off x="273879" y="2320944"/>
+            <a:ext cx="5936116" cy="3878263"/>
           </a:xfrm>
-          <a:prstGeom prst="rect">
+        </p:spPr>
+      </p:pic>
+      <p:sp>
+        <p:nvSpPr>
+          <p:cNvPr id="16" name="Oval 15"/>
+          <p:cNvSpPr/>
+          <p:nvPr/>
+        </p:nvSpPr>
+        <p:spPr>
+          <a:xfrm>
+            <a:off x="1847372" y="5351489"/>
+            <a:ext cx="1015744" cy="817738"/>
+          </a:xfrm>
+          <a:prstGeom prst="ellipse">
             <a:avLst/>
           </a:prstGeom>
+          <a:noFill/>
+          <a:ln w="76200">
+            <a:solidFill>
+              <a:srgbClr val="FFFF00"/>
+            </a:solidFill>
+          </a:ln>
         </p:spPr>
-      </p:pic>
+        <p:style>
+          <a:lnRef idx="2">
+            <a:schemeClr val="accent1">
+              <a:shade val="50000"/>
+            </a:schemeClr>
+          </a:lnRef>
+          <a:fillRef idx="1">
+            <a:schemeClr val="accent1"/>
+          </a:fillRef>
+          <a:effectRef idx="0">
+            <a:schemeClr val="accent1"/>
+          </a:effectRef>
+          <a:fontRef idx="minor">
+            <a:schemeClr val="lt1"/>
+          </a:fontRef>
+        </p:style>
+        <p:txBody>
+          <a:bodyPr rtlCol="0" anchor="ctr"/>
+          <a:lstStyle/>
+          <a:p>
+            <a:pPr algn="ctr"/>
+            <a:endParaRPr lang="en-US"/>
+          </a:p>
+        </p:txBody>
+      </p:sp>
     </p:spTree>
     <p:extLst>
       <p:ext uri="{BB962C8B-B14F-4D97-AF65-F5344CB8AC3E}">
-        <p14:creationId xmlns:p14="http://schemas.microsoft.com/office/powerpoint/2010/main" val="2526964888"/>
+        <p14:creationId xmlns:p14="http://schemas.microsoft.com/office/powerpoint/2010/main" val="1861075437"/>
       </p:ext>
     </p:extLst>
   </p:cSld>
@@ -5324,9 +5589,164 @@
           <a:chExt cx="0" cy="0"/>
         </a:xfrm>
       </p:grpSpPr>
+      <p:sp>
+        <p:nvSpPr>
+          <p:cNvPr id="3" name="Title 2"/>
+          <p:cNvSpPr>
+            <a:spLocks noGrp="1"/>
+          </p:cNvSpPr>
+          <p:nvPr>
+            <p:ph type="title"/>
+          </p:nvPr>
+        </p:nvSpPr>
+        <p:spPr/>
+        <p:txBody>
+          <a:bodyPr/>
+          <a:lstStyle/>
+          <a:p>
+            <a:r>
+              <a:rPr lang="en-US" dirty="0" err="1" smtClean="0"/>
+              <a:t>jBPM</a:t>
+            </a:r>
+            <a:r>
+              <a:rPr lang="en-US" dirty="0" smtClean="0"/>
+              <a:t> Overview</a:t>
+            </a:r>
+            <a:endParaRPr lang="en-US" dirty="0"/>
+          </a:p>
+        </p:txBody>
+      </p:sp>
+      <p:sp>
+        <p:nvSpPr>
+          <p:cNvPr id="6" name="TextBox 5"/>
+          <p:cNvSpPr txBox="1"/>
+          <p:nvPr/>
+        </p:nvSpPr>
+        <p:spPr>
+          <a:xfrm>
+            <a:off x="6970426" y="2698230"/>
+            <a:ext cx="184731" cy="369332"/>
+          </a:xfrm>
+          <a:prstGeom prst="rect">
+            <a:avLst/>
+          </a:prstGeom>
+          <a:noFill/>
+        </p:spPr>
+        <p:txBody>
+          <a:bodyPr wrap="none" rtlCol="0">
+            <a:spAutoFit/>
+          </a:bodyPr>
+          <a:lstStyle/>
+          <a:p>
+            <a:endParaRPr lang="en-US" dirty="0"/>
+          </a:p>
+        </p:txBody>
+      </p:sp>
+      <p:sp>
+        <p:nvSpPr>
+          <p:cNvPr id="9" name="TextBox 8"/>
+          <p:cNvSpPr txBox="1"/>
+          <p:nvPr/>
+        </p:nvSpPr>
+        <p:spPr>
+          <a:xfrm>
+            <a:off x="6463472" y="1997919"/>
+            <a:ext cx="5093944" cy="1569660"/>
+          </a:xfrm>
+          <a:prstGeom prst="rect">
+            <a:avLst/>
+          </a:prstGeom>
+          <a:noFill/>
+        </p:spPr>
+        <p:txBody>
+          <a:bodyPr wrap="square" rtlCol="0">
+            <a:spAutoFit/>
+          </a:bodyPr>
+          <a:lstStyle/>
+          <a:p>
+            <a:r>
+              <a:rPr lang="en-US" sz="2400" dirty="0"/>
+              <a:t>Rule authoring </a:t>
+            </a:r>
+            <a:r>
+              <a:rPr lang="en-US" sz="2400" dirty="0" err="1" smtClean="0"/>
+              <a:t>memungkinkan</a:t>
+            </a:r>
+            <a:r>
+              <a:rPr lang="en-US" sz="2400" dirty="0" smtClean="0"/>
+              <a:t> </a:t>
+            </a:r>
+            <a:r>
+              <a:rPr lang="en-US" sz="2400" dirty="0" err="1" smtClean="0"/>
+              <a:t>pengguna</a:t>
+            </a:r>
+            <a:r>
+              <a:rPr lang="en-US" sz="2400" dirty="0" smtClean="0"/>
+              <a:t> </a:t>
+            </a:r>
+            <a:r>
+              <a:rPr lang="en-US" sz="2400" dirty="0" err="1" smtClean="0"/>
+              <a:t>menspesifikasikan</a:t>
+            </a:r>
+            <a:r>
+              <a:rPr lang="en-US" sz="2400" dirty="0" smtClean="0"/>
+              <a:t> </a:t>
+            </a:r>
+            <a:r>
+              <a:rPr lang="en-US" sz="2400" dirty="0" err="1" smtClean="0"/>
+              <a:t>berbagai</a:t>
+            </a:r>
+            <a:r>
+              <a:rPr lang="en-US" sz="2400" dirty="0" smtClean="0"/>
+              <a:t> </a:t>
+            </a:r>
+            <a:r>
+              <a:rPr lang="en-US" sz="2400" dirty="0" err="1" smtClean="0"/>
+              <a:t>jenis</a:t>
+            </a:r>
+            <a:r>
+              <a:rPr lang="en-US" sz="2400" dirty="0" smtClean="0"/>
+              <a:t> business rule </a:t>
+            </a:r>
+            <a:r>
+              <a:rPr lang="en-US" sz="2400" dirty="0" err="1" smtClean="0"/>
+              <a:t>untuk</a:t>
+            </a:r>
+            <a:r>
+              <a:rPr lang="en-US" sz="2400" dirty="0" smtClean="0"/>
+              <a:t> </a:t>
+            </a:r>
+            <a:r>
+              <a:rPr lang="en-US" sz="2400" dirty="0" err="1" smtClean="0"/>
+              <a:t>kombinasi</a:t>
+            </a:r>
+            <a:r>
+              <a:rPr lang="en-US" sz="2400" dirty="0" smtClean="0"/>
+              <a:t> </a:t>
+            </a:r>
+            <a:r>
+              <a:rPr lang="en-US" sz="2400" dirty="0" err="1" smtClean="0"/>
+              <a:t>dari</a:t>
+            </a:r>
+            <a:r>
+              <a:rPr lang="en-US" sz="2400" dirty="0" smtClean="0"/>
+              <a:t> </a:t>
+            </a:r>
+            <a:r>
+              <a:rPr lang="en-US" sz="2400" dirty="0" err="1" smtClean="0"/>
+              <a:t>berbagai</a:t>
+            </a:r>
+            <a:r>
+              <a:rPr lang="en-US" sz="2400" dirty="0" smtClean="0"/>
+              <a:t> proses.</a:t>
+            </a:r>
+            <a:endParaRPr lang="en-US" sz="2400" dirty="0"/>
+          </a:p>
+        </p:txBody>
+      </p:sp>
       <p:pic>
         <p:nvPicPr>
-          <p:cNvPr id="5" name="Content Placeholder 4"/>
+          <p:cNvPr id="10" name="Content Placeholder 13"/>
           <p:cNvPicPr>
             <a:picLocks noGrp="1" noChangeAspect="1"/>
           </p:cNvPicPr>
@@ -5348,179 +5768,21 @@
         </p:blipFill>
         <p:spPr>
           <a:xfrm>
-            <a:off x="470969" y="2277880"/>
-            <a:ext cx="5839259" cy="4286845"/>
+            <a:off x="273879" y="2282733"/>
+            <a:ext cx="5936116" cy="3878263"/>
           </a:xfrm>
         </p:spPr>
       </p:pic>
       <p:sp>
         <p:nvSpPr>
-          <p:cNvPr id="3" name="Title 2"/>
-          <p:cNvSpPr>
-            <a:spLocks noGrp="1"/>
-          </p:cNvSpPr>
-          <p:nvPr>
-            <p:ph type="title"/>
-          </p:nvPr>
-        </p:nvSpPr>
-        <p:spPr/>
-        <p:txBody>
-          <a:bodyPr/>
-          <a:lstStyle/>
-          <a:p>
-            <a:r>
-              <a:rPr lang="en-US" dirty="0" err="1" smtClean="0"/>
-              <a:t>jBPM</a:t>
-            </a:r>
-            <a:r>
-              <a:rPr lang="en-US" dirty="0" smtClean="0"/>
-              <a:t> Overview</a:t>
-            </a:r>
-            <a:endParaRPr lang="en-US" dirty="0"/>
-          </a:p>
-        </p:txBody>
-      </p:sp>
-      <p:sp>
-        <p:nvSpPr>
-          <p:cNvPr id="6" name="TextBox 5"/>
-          <p:cNvSpPr txBox="1"/>
+          <p:cNvPr id="12" name="Oval 11"/>
+          <p:cNvSpPr/>
           <p:nvPr/>
         </p:nvSpPr>
         <p:spPr>
           <a:xfrm>
-            <a:off x="6970426" y="2698230"/>
-            <a:ext cx="184731" cy="369332"/>
-          </a:xfrm>
-          <a:prstGeom prst="rect">
-            <a:avLst/>
-          </a:prstGeom>
-          <a:noFill/>
-        </p:spPr>
-        <p:txBody>
-          <a:bodyPr wrap="none" rtlCol="0">
-            <a:spAutoFit/>
-          </a:bodyPr>
-          <a:lstStyle/>
-          <a:p>
-            <a:endParaRPr lang="en-US" dirty="0"/>
-          </a:p>
-        </p:txBody>
-      </p:sp>
-      <p:sp>
-        <p:nvSpPr>
-          <p:cNvPr id="9" name="TextBox 8"/>
-          <p:cNvSpPr txBox="1"/>
-          <p:nvPr/>
-        </p:nvSpPr>
-        <p:spPr>
-          <a:xfrm>
-            <a:off x="6463472" y="1997919"/>
-            <a:ext cx="5093944" cy="4524315"/>
-          </a:xfrm>
-          <a:prstGeom prst="rect">
-            <a:avLst/>
-          </a:prstGeom>
-          <a:noFill/>
-        </p:spPr>
-        <p:txBody>
-          <a:bodyPr wrap="square" rtlCol="0">
-            <a:spAutoFit/>
-          </a:bodyPr>
-          <a:lstStyle/>
-          <a:p>
-            <a:r>
-              <a:rPr lang="en-US" sz="2400" dirty="0"/>
-              <a:t>Business processes can be managed through a web-based management console. </a:t>
-            </a:r>
-            <a:endParaRPr lang="en-US" sz="2400" dirty="0" smtClean="0"/>
-          </a:p>
-          <a:p>
-            <a:endParaRPr lang="en-US" sz="2400" dirty="0" smtClean="0"/>
-          </a:p>
-          <a:p>
-            <a:r>
-              <a:rPr lang="en-US" sz="2400" dirty="0" smtClean="0"/>
-              <a:t>It </a:t>
-            </a:r>
-            <a:r>
-              <a:rPr lang="en-US" sz="2400" dirty="0"/>
-              <a:t>is targeted towards business users and its main features are</a:t>
-            </a:r>
-            <a:r>
-              <a:rPr lang="en-US" sz="2400" dirty="0" smtClean="0"/>
-              <a:t>:</a:t>
-            </a:r>
-          </a:p>
-          <a:p>
-            <a:pPr marL="342900" indent="-342900">
-              <a:buFont typeface="Arial" panose="020B0604020202020204" pitchFamily="34" charset="0"/>
-              <a:buChar char="•"/>
-            </a:pPr>
-            <a:r>
-              <a:rPr lang="en-US" sz="2400" dirty="0"/>
-              <a:t>Runtime monitoring (Process Instance Management</a:t>
-            </a:r>
-            <a:r>
-              <a:rPr lang="en-US" sz="2400" dirty="0" smtClean="0"/>
-              <a:t>)</a:t>
-            </a:r>
-          </a:p>
-          <a:p>
-            <a:pPr marL="342900" indent="-342900">
-              <a:buFont typeface="Arial" panose="020B0604020202020204" pitchFamily="34" charset="0"/>
-              <a:buChar char="•"/>
-            </a:pPr>
-            <a:r>
-              <a:rPr lang="en-US" sz="2400" dirty="0" smtClean="0"/>
-              <a:t>Task </a:t>
-            </a:r>
-            <a:r>
-              <a:rPr lang="en-US" sz="2400" dirty="0"/>
-              <a:t>list (</a:t>
-            </a:r>
-            <a:r>
-              <a:rPr lang="en-US" sz="2400" dirty="0" smtClean="0"/>
-              <a:t>Human </a:t>
-            </a:r>
-            <a:r>
-              <a:rPr lang="en-US" sz="2400" dirty="0"/>
-              <a:t>Task Management</a:t>
-            </a:r>
-            <a:r>
-              <a:rPr lang="en-US" sz="2400" dirty="0" smtClean="0"/>
-              <a:t>) </a:t>
-            </a:r>
-          </a:p>
-          <a:p>
-            <a:pPr marL="342900" indent="-342900">
-              <a:buFont typeface="Arial" panose="020B0604020202020204" pitchFamily="34" charset="0"/>
-              <a:buChar char="•"/>
-            </a:pPr>
-            <a:r>
-              <a:rPr lang="en-US" sz="2400" dirty="0" smtClean="0"/>
-              <a:t>Business </a:t>
-            </a:r>
-            <a:r>
-              <a:rPr lang="en-US" sz="2400" dirty="0"/>
-              <a:t>Activity Monitoring (BAM) and </a:t>
-            </a:r>
-            <a:r>
-              <a:rPr lang="en-US" sz="2400" dirty="0" smtClean="0"/>
-              <a:t>Reporting</a:t>
-            </a:r>
-          </a:p>
-        </p:txBody>
-      </p:sp>
-      <p:sp>
-        <p:nvSpPr>
-          <p:cNvPr id="10" name="Oval 9"/>
-          <p:cNvSpPr/>
-          <p:nvPr/>
-        </p:nvSpPr>
-        <p:spPr>
-          <a:xfrm>
-            <a:off x="1693889" y="2275794"/>
-            <a:ext cx="4769583" cy="1214203"/>
+            <a:off x="783069" y="5321508"/>
+            <a:ext cx="1015744" cy="794517"/>
           </a:xfrm>
           <a:prstGeom prst="ellipse">
             <a:avLst/>
@@ -5528,7 +5790,7 @@
           <a:noFill/>
           <a:ln w="76200">
             <a:solidFill>
-              <a:schemeClr val="accent5"/>
+              <a:srgbClr val="FFFF00"/>
             </a:solidFill>
           </a:ln>
         </p:spPr>
@@ -5560,7 +5822,7 @@
     </p:spTree>
     <p:extLst>
       <p:ext uri="{BB962C8B-B14F-4D97-AF65-F5344CB8AC3E}">
-        <p14:creationId xmlns:p14="http://schemas.microsoft.com/office/powerpoint/2010/main" val="1861075437"/>
+        <p14:creationId xmlns:p14="http://schemas.microsoft.com/office/powerpoint/2010/main" val="4198592357"/>
       </p:ext>
     </p:extLst>
   </p:cSld>
@@ -5647,13 +5909,112 @@
           </a:p>
         </p:txBody>
       </p:sp>
+      <p:sp>
+        <p:nvSpPr>
+          <p:cNvPr id="9" name="TextBox 8"/>
+          <p:cNvSpPr txBox="1"/>
+          <p:nvPr/>
+        </p:nvSpPr>
+        <p:spPr>
+          <a:xfrm>
+            <a:off x="6463472" y="2072869"/>
+            <a:ext cx="5093944" cy="1569660"/>
+          </a:xfrm>
+          <a:prstGeom prst="rect">
+            <a:avLst/>
+          </a:prstGeom>
+          <a:noFill/>
+        </p:spPr>
+        <p:txBody>
+          <a:bodyPr wrap="square" rtlCol="0">
+            <a:spAutoFit/>
+          </a:bodyPr>
+          <a:lstStyle/>
+          <a:p>
+            <a:r>
+              <a:rPr lang="en-US" sz="2400" dirty="0" err="1" smtClean="0"/>
+              <a:t>Seluruh</a:t>
+            </a:r>
+            <a:r>
+              <a:rPr lang="en-US" sz="2400" dirty="0" smtClean="0"/>
+              <a:t> asset </a:t>
+            </a:r>
+            <a:r>
+              <a:rPr lang="en-US" sz="2400" dirty="0" err="1" smtClean="0"/>
+              <a:t>disimpan</a:t>
+            </a:r>
+            <a:r>
+              <a:rPr lang="en-US" sz="2400" dirty="0" smtClean="0"/>
+              <a:t> </a:t>
+            </a:r>
+            <a:r>
+              <a:rPr lang="en-US" sz="2400" dirty="0" err="1" smtClean="0"/>
+              <a:t>dan</a:t>
+            </a:r>
+            <a:r>
+              <a:rPr lang="en-US" sz="2400" dirty="0" smtClean="0"/>
+              <a:t> </a:t>
+            </a:r>
+            <a:r>
+              <a:rPr lang="en-US" sz="2400" dirty="0" err="1" smtClean="0"/>
+              <a:t>dikelola</a:t>
+            </a:r>
+            <a:r>
+              <a:rPr lang="en-US" sz="2400" dirty="0" smtClean="0"/>
+              <a:t> di Guvnor repository </a:t>
+            </a:r>
+            <a:r>
+              <a:rPr lang="en-US" sz="2400" dirty="0" err="1" smtClean="0"/>
+              <a:t>dan</a:t>
+            </a:r>
+            <a:r>
+              <a:rPr lang="en-US" sz="2400" dirty="0" smtClean="0"/>
+              <a:t> </a:t>
+            </a:r>
+            <a:r>
+              <a:rPr lang="en-US" sz="2400" dirty="0" err="1" smtClean="0"/>
+              <a:t>dapat</a:t>
+            </a:r>
+            <a:r>
+              <a:rPr lang="en-US" sz="2400" dirty="0" smtClean="0"/>
+              <a:t> </a:t>
+            </a:r>
+            <a:r>
+              <a:rPr lang="en-US" sz="2400" dirty="0" err="1" smtClean="0"/>
+              <a:t>dikelola</a:t>
+            </a:r>
+            <a:r>
+              <a:rPr lang="en-US" sz="2400" dirty="0" smtClean="0"/>
+              <a:t> </a:t>
+            </a:r>
+            <a:r>
+              <a:rPr lang="en-US" sz="2400" dirty="0" err="1" smtClean="0"/>
+              <a:t>melalui</a:t>
+            </a:r>
+            <a:r>
+              <a:rPr lang="en-US" sz="2400" dirty="0" smtClean="0"/>
+              <a:t> versioning, di-built, </a:t>
+            </a:r>
+            <a:r>
+              <a:rPr lang="en-US" sz="2400" dirty="0" err="1" smtClean="0"/>
+              <a:t>dan</a:t>
+            </a:r>
+            <a:r>
+              <a:rPr lang="en-US" sz="2400" dirty="0" smtClean="0"/>
+              <a:t> di-deploy.</a:t>
+            </a:r>
+          </a:p>
+        </p:txBody>
+      </p:sp>
       <p:pic>
         <p:nvPicPr>
-          <p:cNvPr id="7" name="Picture 6"/>
+          <p:cNvPr id="10" name="Content Placeholder 13"/>
           <p:cNvPicPr>
-            <a:picLocks noChangeAspect="1"/>
+            <a:picLocks noGrp="1" noChangeAspect="1"/>
           </p:cNvPicPr>
-          <p:nvPr/>
+          <p:nvPr>
+            <p:ph idx="1"/>
+          </p:nvPr>
         </p:nvPicPr>
         <p:blipFill>
           <a:blip r:embed="rId2">
@@ -5669,18 +6030,61 @@
         </p:blipFill>
         <p:spPr>
           <a:xfrm>
-            <a:off x="2264391" y="2015584"/>
-            <a:ext cx="7648875" cy="4707504"/>
+            <a:off x="273879" y="2282733"/>
+            <a:ext cx="5936116" cy="3878263"/>
           </a:xfrm>
-          <a:prstGeom prst="rect">
+        </p:spPr>
+      </p:pic>
+      <p:sp>
+        <p:nvSpPr>
+          <p:cNvPr id="11" name="Oval 10"/>
+          <p:cNvSpPr/>
+          <p:nvPr/>
+        </p:nvSpPr>
+        <p:spPr>
+          <a:xfrm>
+            <a:off x="2734065" y="4691921"/>
+            <a:ext cx="1553122" cy="1214205"/>
+          </a:xfrm>
+          <a:prstGeom prst="ellipse">
             <a:avLst/>
           </a:prstGeom>
+          <a:noFill/>
+          <a:ln w="76200">
+            <a:solidFill>
+              <a:srgbClr val="FFFF00"/>
+            </a:solidFill>
+          </a:ln>
         </p:spPr>
-      </p:pic>
+        <p:style>
+          <a:lnRef idx="2">
+            <a:schemeClr val="accent1">
+              <a:shade val="50000"/>
+            </a:schemeClr>
+          </a:lnRef>
+          <a:fillRef idx="1">
+            <a:schemeClr val="accent1"/>
+          </a:fillRef>
+          <a:effectRef idx="0">
+            <a:schemeClr val="accent1"/>
+          </a:effectRef>
+          <a:fontRef idx="minor">
+            <a:schemeClr val="lt1"/>
+          </a:fontRef>
+        </p:style>
+        <p:txBody>
+          <a:bodyPr rtlCol="0" anchor="ctr"/>
+          <a:lstStyle/>
+          <a:p>
+            <a:pPr algn="ctr"/>
+            <a:endParaRPr lang="en-US"/>
+          </a:p>
+        </p:txBody>
+      </p:sp>
     </p:spTree>
     <p:extLst>
       <p:ext uri="{BB962C8B-B14F-4D97-AF65-F5344CB8AC3E}">
-        <p14:creationId xmlns:p14="http://schemas.microsoft.com/office/powerpoint/2010/main" val="104707173"/>
+        <p14:creationId xmlns:p14="http://schemas.microsoft.com/office/powerpoint/2010/main" val="1091178371"/>
       </p:ext>
     </p:extLst>
   </p:cSld>
@@ -5714,9 +6118,282 @@
           <a:chExt cx="0" cy="0"/>
         </a:xfrm>
       </p:grpSpPr>
+      <p:sp>
+        <p:nvSpPr>
+          <p:cNvPr id="3" name="Title 2"/>
+          <p:cNvSpPr>
+            <a:spLocks noGrp="1"/>
+          </p:cNvSpPr>
+          <p:nvPr>
+            <p:ph type="title"/>
+          </p:nvPr>
+        </p:nvSpPr>
+        <p:spPr/>
+        <p:txBody>
+          <a:bodyPr/>
+          <a:lstStyle/>
+          <a:p>
+            <a:r>
+              <a:rPr lang="en-US" dirty="0" err="1" smtClean="0"/>
+              <a:t>jBPM</a:t>
+            </a:r>
+            <a:r>
+              <a:rPr lang="en-US" dirty="0" smtClean="0"/>
+              <a:t> Overview</a:t>
+            </a:r>
+            <a:endParaRPr lang="en-US" dirty="0"/>
+          </a:p>
+        </p:txBody>
+      </p:sp>
+      <p:sp>
+        <p:nvSpPr>
+          <p:cNvPr id="6" name="TextBox 5"/>
+          <p:cNvSpPr txBox="1"/>
+          <p:nvPr/>
+        </p:nvSpPr>
+        <p:spPr>
+          <a:xfrm>
+            <a:off x="6970426" y="2698230"/>
+            <a:ext cx="184731" cy="369332"/>
+          </a:xfrm>
+          <a:prstGeom prst="rect">
+            <a:avLst/>
+          </a:prstGeom>
+          <a:noFill/>
+        </p:spPr>
+        <p:txBody>
+          <a:bodyPr wrap="none" rtlCol="0">
+            <a:spAutoFit/>
+          </a:bodyPr>
+          <a:lstStyle/>
+          <a:p>
+            <a:endParaRPr lang="en-US" dirty="0"/>
+          </a:p>
+        </p:txBody>
+      </p:sp>
+      <p:sp>
+        <p:nvSpPr>
+          <p:cNvPr id="9" name="TextBox 8"/>
+          <p:cNvSpPr txBox="1"/>
+          <p:nvPr/>
+        </p:nvSpPr>
+        <p:spPr>
+          <a:xfrm>
+            <a:off x="6463472" y="1997919"/>
+            <a:ext cx="5093944" cy="4154984"/>
+          </a:xfrm>
+          <a:prstGeom prst="rect">
+            <a:avLst/>
+          </a:prstGeom>
+          <a:noFill/>
+        </p:spPr>
+        <p:txBody>
+          <a:bodyPr wrap="square" rtlCol="0">
+            <a:spAutoFit/>
+          </a:bodyPr>
+          <a:lstStyle/>
+          <a:p>
+            <a:r>
+              <a:rPr lang="en-US" sz="2400" dirty="0" smtClean="0"/>
+              <a:t>Web-based </a:t>
+            </a:r>
+            <a:r>
+              <a:rPr lang="en-US" sz="2400" dirty="0"/>
+              <a:t>management console </a:t>
+            </a:r>
+            <a:r>
+              <a:rPr lang="en-US" sz="2400" dirty="0" err="1" smtClean="0"/>
+              <a:t>memungkinkan</a:t>
+            </a:r>
+            <a:r>
+              <a:rPr lang="en-US" sz="2400" dirty="0" smtClean="0"/>
+              <a:t> </a:t>
+            </a:r>
+            <a:r>
+              <a:rPr lang="en-US" sz="2400" dirty="0" err="1" smtClean="0"/>
+              <a:t>pengguna</a:t>
+            </a:r>
+            <a:r>
+              <a:rPr lang="en-US" sz="2400" dirty="0" smtClean="0"/>
+              <a:t> </a:t>
+            </a:r>
+            <a:r>
+              <a:rPr lang="en-US" sz="2400" dirty="0" err="1" smtClean="0"/>
+              <a:t>dari</a:t>
+            </a:r>
+            <a:r>
+              <a:rPr lang="en-US" sz="2400" dirty="0" smtClean="0"/>
+              <a:t> </a:t>
+            </a:r>
+            <a:r>
+              <a:rPr lang="en-US" sz="2400" dirty="0" err="1" smtClean="0"/>
+              <a:t>kelompok</a:t>
+            </a:r>
+            <a:r>
+              <a:rPr lang="en-US" sz="2400" dirty="0" smtClean="0"/>
+              <a:t> </a:t>
+            </a:r>
+            <a:r>
+              <a:rPr lang="en-US" sz="2400" dirty="0" err="1" smtClean="0"/>
+              <a:t>bisnis</a:t>
+            </a:r>
+            <a:r>
+              <a:rPr lang="en-US" sz="2400" dirty="0" smtClean="0"/>
+              <a:t> </a:t>
+            </a:r>
+            <a:r>
+              <a:rPr lang="en-US" sz="2400" dirty="0" err="1" smtClean="0"/>
+              <a:t>untuk</a:t>
+            </a:r>
+            <a:r>
+              <a:rPr lang="en-US" sz="2400" dirty="0" smtClean="0"/>
+              <a:t>  : </a:t>
+            </a:r>
+          </a:p>
+          <a:p>
+            <a:pPr marL="342900" indent="-342900">
+              <a:buFont typeface="Arial" panose="020B0604020202020204" pitchFamily="34" charset="0"/>
+              <a:buChar char="•"/>
+            </a:pPr>
+            <a:r>
+              <a:rPr lang="en-US" sz="2400" dirty="0" err="1" smtClean="0"/>
+              <a:t>Mengelola</a:t>
+            </a:r>
+            <a:r>
+              <a:rPr lang="en-US" sz="2400" dirty="0" smtClean="0"/>
+              <a:t> runtime (</a:t>
+            </a:r>
+            <a:r>
+              <a:rPr lang="en-US" sz="2400" dirty="0" err="1" smtClean="0"/>
+              <a:t>memulai</a:t>
+            </a:r>
+            <a:r>
+              <a:rPr lang="en-US" sz="2400" dirty="0" smtClean="0"/>
+              <a:t> proses, </a:t>
+            </a:r>
+            <a:r>
+              <a:rPr lang="en-US" sz="2400" dirty="0" err="1" smtClean="0"/>
+              <a:t>memeriksa</a:t>
+            </a:r>
+            <a:r>
+              <a:rPr lang="en-US" sz="2400" dirty="0" smtClean="0"/>
+              <a:t> proses yang </a:t>
+            </a:r>
+            <a:r>
+              <a:rPr lang="en-US" sz="2400" dirty="0" err="1" smtClean="0"/>
+              <a:t>sedang</a:t>
+            </a:r>
+            <a:r>
+              <a:rPr lang="en-US" sz="2400" dirty="0" smtClean="0"/>
+              <a:t> </a:t>
+            </a:r>
+            <a:r>
+              <a:rPr lang="en-US" sz="2400" dirty="0" err="1" smtClean="0"/>
+              <a:t>berjalan</a:t>
+            </a:r>
+            <a:r>
+              <a:rPr lang="en-US" sz="2400" dirty="0" smtClean="0"/>
+              <a:t>, </a:t>
+            </a:r>
+            <a:r>
+              <a:rPr lang="en-US" sz="2400" dirty="0" err="1" smtClean="0"/>
+              <a:t>dsb</a:t>
+            </a:r>
+            <a:r>
+              <a:rPr lang="en-US" sz="2400" dirty="0" smtClean="0"/>
+              <a:t>).</a:t>
+            </a:r>
+          </a:p>
+          <a:p>
+            <a:pPr marL="342900" indent="-342900">
+              <a:buFont typeface="Arial" panose="020B0604020202020204" pitchFamily="34" charset="0"/>
+              <a:buChar char="•"/>
+            </a:pPr>
+            <a:r>
+              <a:rPr lang="en-US" sz="2400" dirty="0" err="1" smtClean="0"/>
+              <a:t>Mengelola</a:t>
+            </a:r>
+            <a:r>
+              <a:rPr lang="en-US" sz="2400" dirty="0" smtClean="0"/>
+              <a:t> </a:t>
+            </a:r>
+            <a:r>
+              <a:rPr lang="en-US" sz="2400" dirty="0" err="1" smtClean="0"/>
+              <a:t>daftar</a:t>
+            </a:r>
+            <a:r>
+              <a:rPr lang="en-US" sz="2400" dirty="0" smtClean="0"/>
+              <a:t> </a:t>
+            </a:r>
+            <a:r>
+              <a:rPr lang="en-US" sz="2400" dirty="0" err="1" smtClean="0"/>
+              <a:t>tugas</a:t>
+            </a:r>
+            <a:r>
+              <a:rPr lang="en-US" sz="2400" dirty="0" smtClean="0"/>
+              <a:t> yang </a:t>
+            </a:r>
+            <a:r>
+              <a:rPr lang="en-US" sz="2400" dirty="0" err="1" smtClean="0"/>
+              <a:t>harus</a:t>
+            </a:r>
+            <a:r>
+              <a:rPr lang="en-US" sz="2400" dirty="0" smtClean="0"/>
+              <a:t> </a:t>
+            </a:r>
+            <a:r>
+              <a:rPr lang="en-US" sz="2400" dirty="0" err="1" smtClean="0"/>
+              <a:t>dilakukan</a:t>
+            </a:r>
+            <a:r>
+              <a:rPr lang="en-US" sz="2400" dirty="0" smtClean="0"/>
+              <a:t>.</a:t>
+            </a:r>
+          </a:p>
+          <a:p>
+            <a:pPr marL="342900" indent="-342900">
+              <a:buFont typeface="Arial" panose="020B0604020202020204" pitchFamily="34" charset="0"/>
+              <a:buChar char="•"/>
+            </a:pPr>
+            <a:r>
+              <a:rPr lang="en-US" sz="2400" dirty="0" err="1" smtClean="0"/>
+              <a:t>Menjalankan</a:t>
+            </a:r>
+            <a:r>
+              <a:rPr lang="en-US" sz="2400" dirty="0"/>
+              <a:t> </a:t>
+            </a:r>
+            <a:r>
+              <a:rPr lang="en-US" sz="2400" dirty="0" smtClean="0"/>
+              <a:t>Business </a:t>
+            </a:r>
+            <a:r>
+              <a:rPr lang="en-US" sz="2400" dirty="0"/>
+              <a:t>Activity Monitoring (BAM) </a:t>
+            </a:r>
+            <a:r>
+              <a:rPr lang="en-US" sz="2400" dirty="0" err="1" smtClean="0"/>
+              <a:t>dan</a:t>
+            </a:r>
+            <a:r>
+              <a:rPr lang="en-US" sz="2400" dirty="0" smtClean="0"/>
+              <a:t> </a:t>
+            </a:r>
+            <a:r>
+              <a:rPr lang="en-US" sz="2400" dirty="0" err="1" smtClean="0"/>
+              <a:t>melihat</a:t>
+            </a:r>
+            <a:r>
+              <a:rPr lang="en-US" sz="2400" dirty="0" smtClean="0"/>
+              <a:t> report.</a:t>
+            </a:r>
+            <a:endParaRPr lang="en-US" sz="2400" dirty="0"/>
+          </a:p>
+        </p:txBody>
+      </p:sp>
       <p:pic>
         <p:nvPicPr>
-          <p:cNvPr id="5" name="Content Placeholder 4"/>
+          <p:cNvPr id="10" name="Content Placeholder 13"/>
           <p:cNvPicPr>
             <a:picLocks noGrp="1" noChangeAspect="1"/>
           </p:cNvPicPr>
@@ -5738,112 +6415,21 @@
         </p:blipFill>
         <p:spPr>
           <a:xfrm>
-            <a:off x="470969" y="2277880"/>
-            <a:ext cx="5839259" cy="4286845"/>
+            <a:off x="273879" y="2282733"/>
+            <a:ext cx="5936116" cy="3878263"/>
           </a:xfrm>
         </p:spPr>
       </p:pic>
       <p:sp>
         <p:nvSpPr>
-          <p:cNvPr id="3" name="Title 2"/>
-          <p:cNvSpPr>
-            <a:spLocks noGrp="1"/>
-          </p:cNvSpPr>
-          <p:nvPr>
-            <p:ph type="title"/>
-          </p:nvPr>
-        </p:nvSpPr>
-        <p:spPr/>
-        <p:txBody>
-          <a:bodyPr/>
-          <a:lstStyle/>
-          <a:p>
-            <a:r>
-              <a:rPr lang="en-US" dirty="0" err="1" smtClean="0"/>
-              <a:t>jBPM</a:t>
-            </a:r>
-            <a:r>
-              <a:rPr lang="en-US" dirty="0" smtClean="0"/>
-              <a:t> Overview</a:t>
-            </a:r>
-            <a:endParaRPr lang="en-US" dirty="0"/>
-          </a:p>
-        </p:txBody>
-      </p:sp>
-      <p:sp>
-        <p:nvSpPr>
-          <p:cNvPr id="6" name="TextBox 5"/>
-          <p:cNvSpPr txBox="1"/>
-          <p:nvPr/>
-        </p:nvSpPr>
-        <p:spPr>
-          <a:xfrm>
-            <a:off x="6970426" y="2698230"/>
-            <a:ext cx="184731" cy="369332"/>
-          </a:xfrm>
-          <a:prstGeom prst="rect">
-            <a:avLst/>
-          </a:prstGeom>
-          <a:noFill/>
-        </p:spPr>
-        <p:txBody>
-          <a:bodyPr wrap="none" rtlCol="0">
-            <a:spAutoFit/>
-          </a:bodyPr>
-          <a:lstStyle/>
-          <a:p>
-            <a:endParaRPr lang="en-US" dirty="0"/>
-          </a:p>
-        </p:txBody>
-      </p:sp>
-      <p:sp>
-        <p:nvSpPr>
-          <p:cNvPr id="9" name="TextBox 8"/>
-          <p:cNvSpPr txBox="1"/>
-          <p:nvPr/>
-        </p:nvSpPr>
-        <p:spPr>
-          <a:xfrm>
-            <a:off x="6463472" y="1997919"/>
-            <a:ext cx="5093944" cy="1938992"/>
-          </a:xfrm>
-          <a:prstGeom prst="rect">
-            <a:avLst/>
-          </a:prstGeom>
-          <a:noFill/>
-        </p:spPr>
-        <p:txBody>
-          <a:bodyPr wrap="square" rtlCol="0">
-            <a:spAutoFit/>
-          </a:bodyPr>
-          <a:lstStyle/>
-          <a:p>
-            <a:r>
-              <a:rPr lang="en-US" sz="2400" dirty="0"/>
-              <a:t>A web-based form builder allows you to </a:t>
-            </a:r>
-            <a:r>
-              <a:rPr lang="en-US" sz="2400" b="1" dirty="0"/>
-              <a:t>create, generate and/or edit your form</a:t>
-            </a:r>
-            <a:r>
-              <a:rPr lang="en-US" sz="2400" dirty="0"/>
-              <a:t> (both for starting a process or completing a user task) using a WYSIWYG editor.</a:t>
-            </a:r>
-            <a:endParaRPr lang="en-US" sz="2400" dirty="0"/>
-          </a:p>
-        </p:txBody>
-      </p:sp>
-      <p:sp>
-        <p:nvSpPr>
           <p:cNvPr id="7" name="Oval 6"/>
           <p:cNvSpPr/>
           <p:nvPr/>
         </p:nvSpPr>
         <p:spPr>
           <a:xfrm>
-            <a:off x="4482058" y="5279637"/>
-            <a:ext cx="1169233" cy="1214203"/>
+            <a:off x="20402" y="2282733"/>
+            <a:ext cx="4926352" cy="1629700"/>
           </a:xfrm>
           <a:prstGeom prst="ellipse">
             <a:avLst/>
@@ -5851,7 +6437,7 @@
           <a:noFill/>
           <a:ln w="76200">
             <a:solidFill>
-              <a:schemeClr val="accent5"/>
+              <a:srgbClr val="FFFF00"/>
             </a:solidFill>
           </a:ln>
         </p:spPr>
@@ -5883,7 +6469,7 @@
     </p:spTree>
     <p:extLst>
       <p:ext uri="{BB962C8B-B14F-4D97-AF65-F5344CB8AC3E}">
-        <p14:creationId xmlns:p14="http://schemas.microsoft.com/office/powerpoint/2010/main" val="4198592357"/>
+        <p14:creationId xmlns:p14="http://schemas.microsoft.com/office/powerpoint/2010/main" val="453241398"/>
       </p:ext>
     </p:extLst>
   </p:cSld>
@@ -5901,6 +6487,338 @@
 </file>
 
 <file path=ppt/slides/slide16.xml><?xml version="1.0" encoding="utf-8"?>
+<p:sld xmlns:a="http://schemas.openxmlformats.org/drawingml/2006/main" xmlns:r="http://schemas.openxmlformats.org/officeDocument/2006/relationships" xmlns:p="http://schemas.openxmlformats.org/presentationml/2006/main">
+  <p:cSld>
+    <p:spTree>
+      <p:nvGrpSpPr>
+        <p:cNvPr id="1" name=""/>
+        <p:cNvGrpSpPr/>
+        <p:nvPr/>
+      </p:nvGrpSpPr>
+      <p:grpSpPr>
+        <a:xfrm>
+          <a:off x="0" y="0"/>
+          <a:ext cx="0" cy="0"/>
+          <a:chOff x="0" y="0"/>
+          <a:chExt cx="0" cy="0"/>
+        </a:xfrm>
+      </p:grpSpPr>
+      <p:sp>
+        <p:nvSpPr>
+          <p:cNvPr id="3" name="Title 2"/>
+          <p:cNvSpPr>
+            <a:spLocks noGrp="1"/>
+          </p:cNvSpPr>
+          <p:nvPr>
+            <p:ph type="title"/>
+          </p:nvPr>
+        </p:nvSpPr>
+        <p:spPr/>
+        <p:txBody>
+          <a:bodyPr/>
+          <a:lstStyle/>
+          <a:p>
+            <a:r>
+              <a:rPr lang="en-US" dirty="0" err="1" smtClean="0"/>
+              <a:t>jBPM</a:t>
+            </a:r>
+            <a:r>
+              <a:rPr lang="en-US" dirty="0" smtClean="0"/>
+              <a:t> Overview</a:t>
+            </a:r>
+            <a:endParaRPr lang="en-US" dirty="0"/>
+          </a:p>
+        </p:txBody>
+      </p:sp>
+      <p:sp>
+        <p:nvSpPr>
+          <p:cNvPr id="6" name="TextBox 5"/>
+          <p:cNvSpPr txBox="1"/>
+          <p:nvPr/>
+        </p:nvSpPr>
+        <p:spPr>
+          <a:xfrm>
+            <a:off x="6970426" y="2698230"/>
+            <a:ext cx="184731" cy="369332"/>
+          </a:xfrm>
+          <a:prstGeom prst="rect">
+            <a:avLst/>
+          </a:prstGeom>
+          <a:noFill/>
+        </p:spPr>
+        <p:txBody>
+          <a:bodyPr wrap="none" rtlCol="0">
+            <a:spAutoFit/>
+          </a:bodyPr>
+          <a:lstStyle/>
+          <a:p>
+            <a:endParaRPr lang="en-US" dirty="0"/>
+          </a:p>
+        </p:txBody>
+      </p:sp>
+      <p:sp>
+        <p:nvSpPr>
+          <p:cNvPr id="9" name="TextBox 8"/>
+          <p:cNvSpPr txBox="1"/>
+          <p:nvPr/>
+        </p:nvSpPr>
+        <p:spPr>
+          <a:xfrm>
+            <a:off x="6463472" y="2192789"/>
+            <a:ext cx="5093944" cy="2677656"/>
+          </a:xfrm>
+          <a:prstGeom prst="rect">
+            <a:avLst/>
+          </a:prstGeom>
+          <a:noFill/>
+        </p:spPr>
+        <p:txBody>
+          <a:bodyPr wrap="square" rtlCol="0">
+            <a:spAutoFit/>
+          </a:bodyPr>
+          <a:lstStyle/>
+          <a:p>
+            <a:pPr algn="just"/>
+            <a:r>
+              <a:rPr lang="en-US" sz="2400" dirty="0" smtClean="0"/>
+              <a:t>Eclipse-based </a:t>
+            </a:r>
+            <a:r>
+              <a:rPr lang="en-US" sz="2400" dirty="0"/>
+              <a:t>developer tools </a:t>
+            </a:r>
+            <a:r>
+              <a:rPr lang="en-US" sz="2400" dirty="0" err="1" smtClean="0"/>
+              <a:t>merupakan</a:t>
+            </a:r>
+            <a:r>
+              <a:rPr lang="en-US" sz="2400" dirty="0" smtClean="0"/>
+              <a:t> </a:t>
+            </a:r>
+            <a:r>
+              <a:rPr lang="en-US" sz="2400" dirty="0" err="1" smtClean="0"/>
+              <a:t>ekstensi</a:t>
+            </a:r>
+            <a:r>
+              <a:rPr lang="en-US" sz="2400" dirty="0" smtClean="0"/>
+              <a:t> </a:t>
+            </a:r>
+            <a:r>
+              <a:rPr lang="en-US" sz="2400" dirty="0" err="1" smtClean="0"/>
+              <a:t>dari</a:t>
+            </a:r>
+            <a:r>
+              <a:rPr lang="en-US" sz="2400" dirty="0" smtClean="0"/>
+              <a:t> </a:t>
+            </a:r>
+            <a:r>
+              <a:rPr lang="en-US" sz="2400" dirty="0"/>
+              <a:t>Eclipse IDE, </a:t>
+            </a:r>
+            <a:r>
+              <a:rPr lang="en-US" sz="2400" dirty="0" smtClean="0"/>
+              <a:t>yang </a:t>
+            </a:r>
+            <a:r>
+              <a:rPr lang="en-US" sz="2400" dirty="0" err="1" smtClean="0"/>
+              <a:t>ditujukan</a:t>
+            </a:r>
+            <a:r>
+              <a:rPr lang="en-US" sz="2400" dirty="0" smtClean="0"/>
+              <a:t> </a:t>
+            </a:r>
+            <a:r>
+              <a:rPr lang="en-US" sz="2400" dirty="0" err="1" smtClean="0"/>
+              <a:t>bagi</a:t>
+            </a:r>
+            <a:r>
+              <a:rPr lang="en-US" sz="2400" dirty="0" smtClean="0"/>
+              <a:t> </a:t>
+            </a:r>
+            <a:r>
+              <a:rPr lang="en-US" sz="2400" b="1" dirty="0" smtClean="0"/>
+              <a:t>developer</a:t>
+            </a:r>
+            <a:r>
+              <a:rPr lang="en-US" sz="2400" dirty="0" smtClean="0"/>
+              <a:t>, </a:t>
+            </a:r>
+            <a:r>
+              <a:rPr lang="en-US" sz="2400" dirty="0" err="1" smtClean="0"/>
+              <a:t>dan</a:t>
+            </a:r>
+            <a:r>
+              <a:rPr lang="en-US" sz="2400" dirty="0" smtClean="0"/>
+              <a:t> </a:t>
+            </a:r>
+            <a:r>
+              <a:rPr lang="en-US" sz="2400" dirty="0" err="1" smtClean="0"/>
+              <a:t>memungkinkan</a:t>
+            </a:r>
+            <a:r>
+              <a:rPr lang="en-US" sz="2400" dirty="0" smtClean="0"/>
+              <a:t> </a:t>
+            </a:r>
+            <a:r>
+              <a:rPr lang="en-US" sz="2400" dirty="0" err="1" smtClean="0"/>
+              <a:t>pembuatan</a:t>
+            </a:r>
+            <a:r>
+              <a:rPr lang="en-US" sz="2400" dirty="0" smtClean="0"/>
+              <a:t> proses </a:t>
+            </a:r>
+            <a:r>
+              <a:rPr lang="en-US" sz="2400" dirty="0" err="1" smtClean="0"/>
+              <a:t>bisnis</a:t>
+            </a:r>
+            <a:r>
+              <a:rPr lang="en-US" sz="2400" dirty="0" smtClean="0"/>
+              <a:t> </a:t>
+            </a:r>
+            <a:r>
+              <a:rPr lang="en-US" sz="2400" dirty="0" err="1" smtClean="0"/>
+              <a:t>dengan</a:t>
+            </a:r>
+            <a:r>
+              <a:rPr lang="en-US" sz="2400" dirty="0" smtClean="0"/>
+              <a:t> </a:t>
+            </a:r>
+            <a:r>
+              <a:rPr lang="en-US" sz="2400" dirty="0" err="1" smtClean="0"/>
+              <a:t>cara</a:t>
+            </a:r>
+            <a:r>
+              <a:rPr lang="en-US" sz="2400" dirty="0" smtClean="0"/>
+              <a:t> drag </a:t>
+            </a:r>
+            <a:r>
+              <a:rPr lang="en-US" sz="2400" dirty="0"/>
+              <a:t>and drop, </a:t>
+            </a:r>
+            <a:r>
+              <a:rPr lang="en-US" sz="2400" dirty="0" err="1" smtClean="0"/>
+              <a:t>pengetesan</a:t>
+            </a:r>
+            <a:r>
+              <a:rPr lang="en-US" sz="2400" dirty="0" smtClean="0"/>
+              <a:t> </a:t>
+            </a:r>
+            <a:r>
+              <a:rPr lang="en-US" sz="2400" dirty="0"/>
+              <a:t>and </a:t>
+            </a:r>
+            <a:r>
+              <a:rPr lang="en-US" sz="2400" dirty="0" smtClean="0"/>
+              <a:t>men-debug proses-proses, </a:t>
+            </a:r>
+            <a:r>
+              <a:rPr lang="en-US" sz="2400" dirty="0" err="1" smtClean="0"/>
+              <a:t>dsb</a:t>
+            </a:r>
+            <a:r>
+              <a:rPr lang="en-US" sz="2400" dirty="0" smtClean="0"/>
+              <a:t>.</a:t>
+            </a:r>
+            <a:endParaRPr lang="en-US" sz="2400" dirty="0"/>
+          </a:p>
+        </p:txBody>
+      </p:sp>
+      <p:pic>
+        <p:nvPicPr>
+          <p:cNvPr id="10" name="Content Placeholder 13"/>
+          <p:cNvPicPr>
+            <a:picLocks noGrp="1" noChangeAspect="1"/>
+          </p:cNvPicPr>
+          <p:nvPr>
+            <p:ph idx="1"/>
+          </p:nvPr>
+        </p:nvPicPr>
+        <p:blipFill>
+          <a:blip r:embed="rId2">
+            <a:extLst>
+              <a:ext uri="{28A0092B-C50C-407E-A947-70E740481C1C}">
+                <a14:useLocalDpi xmlns:a14="http://schemas.microsoft.com/office/drawing/2010/main" val="0"/>
+              </a:ext>
+            </a:extLst>
+          </a:blip>
+          <a:stretch>
+            <a:fillRect/>
+          </a:stretch>
+        </p:blipFill>
+        <p:spPr>
+          <a:xfrm>
+            <a:off x="273879" y="2282733"/>
+            <a:ext cx="5936116" cy="3878263"/>
+          </a:xfrm>
+        </p:spPr>
+      </p:pic>
+      <p:sp>
+        <p:nvSpPr>
+          <p:cNvPr id="7" name="Oval 6"/>
+          <p:cNvSpPr/>
+          <p:nvPr/>
+        </p:nvSpPr>
+        <p:spPr>
+          <a:xfrm>
+            <a:off x="4813118" y="4616971"/>
+            <a:ext cx="1015744" cy="1544026"/>
+          </a:xfrm>
+          <a:prstGeom prst="ellipse">
+            <a:avLst/>
+          </a:prstGeom>
+          <a:noFill/>
+          <a:ln w="76200">
+            <a:solidFill>
+              <a:srgbClr val="FFFF00"/>
+            </a:solidFill>
+          </a:ln>
+        </p:spPr>
+        <p:style>
+          <a:lnRef idx="2">
+            <a:schemeClr val="accent1">
+              <a:shade val="50000"/>
+            </a:schemeClr>
+          </a:lnRef>
+          <a:fillRef idx="1">
+            <a:schemeClr val="accent1"/>
+          </a:fillRef>
+          <a:effectRef idx="0">
+            <a:schemeClr val="accent1"/>
+          </a:effectRef>
+          <a:fontRef idx="minor">
+            <a:schemeClr val="lt1"/>
+          </a:fontRef>
+        </p:style>
+        <p:txBody>
+          <a:bodyPr rtlCol="0" anchor="ctr"/>
+          <a:lstStyle/>
+          <a:p>
+            <a:pPr algn="ctr"/>
+            <a:endParaRPr lang="en-US"/>
+          </a:p>
+        </p:txBody>
+      </p:sp>
+    </p:spTree>
+    <p:extLst>
+      <p:ext uri="{BB962C8B-B14F-4D97-AF65-F5344CB8AC3E}">
+        <p14:creationId xmlns:p14="http://schemas.microsoft.com/office/powerpoint/2010/main" val="2183108218"/>
+      </p:ext>
+    </p:extLst>
+  </p:cSld>
+  <p:clrMapOvr>
+    <a:masterClrMapping/>
+  </p:clrMapOvr>
+  <p:timing>
+    <p:tnLst>
+      <p:par>
+        <p:cTn id="1" dur="indefinite" restart="never" nodeType="tmRoot"/>
+      </p:par>
+    </p:tnLst>
+  </p:timing>
+</p:sld>
+</file>
+
+<file path=ppt/slides/slide17.xml><?xml version="1.0" encoding="utf-8"?>
 <p:sld xmlns:a="http://schemas.openxmlformats.org/drawingml/2006/main" xmlns:r="http://schemas.openxmlformats.org/officeDocument/2006/relationships" xmlns:p="http://schemas.openxmlformats.org/presentationml/2006/main">
   <p:cSld>
     <p:spTree>
@@ -6065,19 +6983,215 @@
             <a:pPr algn="just"/>
             <a:r>
               <a:rPr lang="en-US" dirty="0"/>
-              <a:t>WSO2 Business Process Server (BPS) is an easy-to-use Business Process Server that executes business processes written following WS-BPEL standard. </a:t>
-            </a:r>
-            <a:endParaRPr lang="en-US" dirty="0" smtClean="0"/>
-          </a:p>
-          <a:p>
-            <a:pPr algn="just"/>
+              <a:t>WSO2 Business Process Server (BPS) </a:t>
+            </a:r>
+            <a:r>
+              <a:rPr lang="en-US" dirty="0" err="1" smtClean="0"/>
+              <a:t>merupakan</a:t>
+            </a:r>
+            <a:r>
+              <a:rPr lang="en-US" dirty="0" smtClean="0"/>
+              <a:t> Business </a:t>
+            </a:r>
+            <a:r>
+              <a:rPr lang="en-US" dirty="0"/>
+              <a:t>Process Server </a:t>
+            </a:r>
+            <a:r>
+              <a:rPr lang="en-US" dirty="0" smtClean="0"/>
+              <a:t>yang </a:t>
+            </a:r>
+            <a:r>
+              <a:rPr lang="en-US" dirty="0" err="1" smtClean="0"/>
+              <a:t>menjalankan</a:t>
+            </a:r>
+            <a:r>
+              <a:rPr lang="en-US" dirty="0"/>
+              <a:t> </a:t>
+            </a:r>
+            <a:r>
+              <a:rPr lang="en-US" dirty="0" smtClean="0"/>
+              <a:t>proses </a:t>
+            </a:r>
+            <a:r>
+              <a:rPr lang="en-US" dirty="0" err="1" smtClean="0"/>
+              <a:t>bisnis</a:t>
+            </a:r>
+            <a:r>
+              <a:rPr lang="en-US" dirty="0" smtClean="0"/>
+              <a:t> yang </a:t>
+            </a:r>
+            <a:r>
+              <a:rPr lang="en-US" dirty="0" err="1" smtClean="0"/>
+              <a:t>dibuat</a:t>
+            </a:r>
+            <a:r>
+              <a:rPr lang="en-US" dirty="0" smtClean="0"/>
+              <a:t> </a:t>
+            </a:r>
+            <a:r>
+              <a:rPr lang="en-US" dirty="0" err="1" smtClean="0"/>
+              <a:t>sesuai</a:t>
+            </a:r>
+            <a:r>
+              <a:rPr lang="en-US" dirty="0" smtClean="0"/>
+              <a:t> </a:t>
+            </a:r>
             <a:r>
               <a:rPr lang="en-US" dirty="0" smtClean="0"/>
               <a:t>WS-BPEL </a:t>
             </a:r>
             <a:r>
               <a:rPr lang="en-US" dirty="0"/>
-              <a:t>is emerging as the de facto standard for composing multiple synchronous and asynchronous web services into collaborative and transactional process flows which increase the flexibility and agility of your service-oriented architecture. </a:t>
+              <a:t>standard. </a:t>
+            </a:r>
+            <a:endParaRPr lang="en-US" dirty="0" smtClean="0"/>
+          </a:p>
+          <a:p>
+            <a:pPr algn="just"/>
+            <a:r>
+              <a:rPr lang="en-US" dirty="0" smtClean="0"/>
+              <a:t>WS-BPEL </a:t>
+            </a:r>
+            <a:r>
+              <a:rPr lang="en-US" dirty="0" err="1" smtClean="0"/>
+              <a:t>merupakan</a:t>
+            </a:r>
+            <a:r>
+              <a:rPr lang="en-US" dirty="0" smtClean="0"/>
+              <a:t> </a:t>
+            </a:r>
+            <a:r>
+              <a:rPr lang="en-US" dirty="0" err="1" smtClean="0"/>
+              <a:t>standar</a:t>
+            </a:r>
+            <a:r>
+              <a:rPr lang="en-US" dirty="0" smtClean="0"/>
+              <a:t> </a:t>
+            </a:r>
+            <a:r>
+              <a:rPr lang="en-US" dirty="0"/>
+              <a:t>de facto </a:t>
+            </a:r>
+            <a:r>
+              <a:rPr lang="en-US" dirty="0" err="1" smtClean="0"/>
+              <a:t>dalam</a:t>
+            </a:r>
+            <a:r>
+              <a:rPr lang="en-US" dirty="0" smtClean="0"/>
+              <a:t> </a:t>
+            </a:r>
+            <a:r>
+              <a:rPr lang="en-US" dirty="0" err="1" smtClean="0"/>
+              <a:t>membuat</a:t>
+            </a:r>
+            <a:r>
+              <a:rPr lang="en-US" dirty="0" smtClean="0"/>
+              <a:t> </a:t>
+            </a:r>
+            <a:r>
+              <a:rPr lang="en-US" dirty="0" err="1" smtClean="0"/>
+              <a:t>berbagai</a:t>
+            </a:r>
+            <a:r>
+              <a:rPr lang="en-US" dirty="0" smtClean="0"/>
+              <a:t> web service </a:t>
+            </a:r>
+            <a:r>
+              <a:rPr lang="en-US" dirty="0" err="1" smtClean="0"/>
+              <a:t>baik</a:t>
+            </a:r>
+            <a:r>
+              <a:rPr lang="en-US" dirty="0" smtClean="0"/>
+              <a:t> synchronous </a:t>
+            </a:r>
+            <a:r>
+              <a:rPr lang="en-US" dirty="0" err="1" smtClean="0"/>
+              <a:t>dan</a:t>
+            </a:r>
+            <a:r>
+              <a:rPr lang="en-US" dirty="0" smtClean="0"/>
+              <a:t> asynchronous </a:t>
+            </a:r>
+            <a:r>
+              <a:rPr lang="en-US" dirty="0" err="1" smtClean="0"/>
+              <a:t>sehingga</a:t>
+            </a:r>
+            <a:r>
+              <a:rPr lang="en-US" dirty="0" smtClean="0"/>
+              <a:t> </a:t>
+            </a:r>
+            <a:r>
+              <a:rPr lang="en-US" dirty="0" err="1" smtClean="0"/>
+              <a:t>memiliki</a:t>
+            </a:r>
+            <a:r>
+              <a:rPr lang="en-US" dirty="0" smtClean="0"/>
+              <a:t> </a:t>
+            </a:r>
+            <a:r>
+              <a:rPr lang="en-US" dirty="0" err="1" smtClean="0"/>
+              <a:t>alur</a:t>
+            </a:r>
+            <a:r>
+              <a:rPr lang="en-US" dirty="0" smtClean="0"/>
+              <a:t> yang </a:t>
+            </a:r>
+            <a:r>
+              <a:rPr lang="en-US" dirty="0" err="1" smtClean="0"/>
+              <a:t>saling</a:t>
+            </a:r>
+            <a:r>
+              <a:rPr lang="en-US" dirty="0" smtClean="0"/>
+              <a:t> </a:t>
+            </a:r>
+            <a:r>
+              <a:rPr lang="en-US" dirty="0" err="1" smtClean="0"/>
+              <a:t>berkolaborasi</a:t>
+            </a:r>
+            <a:r>
+              <a:rPr lang="en-US" dirty="0" smtClean="0"/>
+              <a:t> </a:t>
+            </a:r>
+            <a:r>
+              <a:rPr lang="en-US" dirty="0" err="1" smtClean="0"/>
+              <a:t>serta</a:t>
+            </a:r>
+            <a:r>
+              <a:rPr lang="en-US" dirty="0" smtClean="0"/>
+              <a:t> </a:t>
+            </a:r>
+            <a:r>
+              <a:rPr lang="en-US" dirty="0" err="1" smtClean="0"/>
+              <a:t>meningkatkan</a:t>
+            </a:r>
+            <a:r>
+              <a:rPr lang="en-US" dirty="0" smtClean="0"/>
+              <a:t> </a:t>
+            </a:r>
+            <a:r>
+              <a:rPr lang="en-US" dirty="0" err="1" smtClean="0"/>
+              <a:t>fleksibilitas</a:t>
+            </a:r>
+            <a:r>
+              <a:rPr lang="en-US" dirty="0" smtClean="0"/>
+              <a:t> </a:t>
+            </a:r>
+            <a:r>
+              <a:rPr lang="en-US" dirty="0" err="1" smtClean="0"/>
+              <a:t>dari</a:t>
+            </a:r>
+            <a:r>
+              <a:rPr lang="en-US" dirty="0" smtClean="0"/>
+              <a:t> SOA yang </a:t>
+            </a:r>
+            <a:r>
+              <a:rPr lang="en-US" dirty="0" err="1" smtClean="0"/>
+              <a:t>dibuat</a:t>
+            </a:r>
+            <a:r>
+              <a:rPr lang="en-US" dirty="0" smtClean="0"/>
+              <a:t>. </a:t>
             </a:r>
             <a:endParaRPr lang="en-US" dirty="0" smtClean="0"/>
           </a:p>
@@ -6116,6 +7230,13 @@
   <p:clrMapOvr>
     <a:masterClrMapping/>
   </p:clrMapOvr>
+  <p:timing>
+    <p:tnLst>
+      <p:par>
+        <p:cTn id="1" dur="indefinite" restart="never" nodeType="tmRoot"/>
+      </p:par>
+    </p:tnLst>
+  </p:timing>
 </p:sld>
 </file>
 
@@ -6154,15 +7275,112 @@
             <a:pPr algn="just"/>
             <a:r>
               <a:rPr lang="en-US" dirty="0"/>
-              <a:t>WSO2 BPS is powered by Apache ODE (Apache Orchestration Director Engine). </a:t>
+              <a:t>WSO2 BPS </a:t>
+            </a:r>
+            <a:r>
+              <a:rPr lang="en-US" dirty="0" err="1" smtClean="0"/>
+              <a:t>didasari</a:t>
+            </a:r>
+            <a:r>
+              <a:rPr lang="en-US" dirty="0" smtClean="0"/>
+              <a:t> </a:t>
+            </a:r>
+            <a:r>
+              <a:rPr lang="en-US" dirty="0" err="1" smtClean="0"/>
+              <a:t>oleh</a:t>
+            </a:r>
+            <a:r>
+              <a:rPr lang="en-US" dirty="0" smtClean="0"/>
+              <a:t> </a:t>
+            </a:r>
+            <a:r>
+              <a:rPr lang="en-US" dirty="0"/>
+              <a:t>Apache ODE (Apache Orchestration Director Engine). </a:t>
             </a:r>
           </a:p>
           <a:p>
             <a:pPr algn="just"/>
             <a:r>
               <a:rPr lang="en-US" dirty="0"/>
-              <a:t>WSO2 BPS provides a complete Web-based graphical console to deploy, manage and monitor business process and process instances.</a:t>
-            </a:r>
+              <a:t>WSO2 BPS </a:t>
+            </a:r>
+            <a:r>
+              <a:rPr lang="en-US" dirty="0" err="1" smtClean="0"/>
+              <a:t>menyediakan</a:t>
+            </a:r>
+            <a:r>
+              <a:rPr lang="en-US" dirty="0" smtClean="0"/>
+              <a:t> </a:t>
+            </a:r>
+            <a:r>
+              <a:rPr lang="en-US" dirty="0" err="1" smtClean="0"/>
+              <a:t>konsol</a:t>
+            </a:r>
+            <a:r>
+              <a:rPr lang="en-US" dirty="0" smtClean="0"/>
+              <a:t> </a:t>
+            </a:r>
+            <a:r>
+              <a:rPr lang="en-US" dirty="0" err="1" smtClean="0"/>
+              <a:t>grafis</a:t>
+            </a:r>
+            <a:r>
+              <a:rPr lang="en-US" dirty="0" smtClean="0"/>
+              <a:t> </a:t>
+            </a:r>
+            <a:r>
+              <a:rPr lang="en-US" dirty="0" err="1" smtClean="0"/>
+              <a:t>berbasis</a:t>
+            </a:r>
+            <a:r>
+              <a:rPr lang="en-US" dirty="0" smtClean="0"/>
+              <a:t> web yang </a:t>
+            </a:r>
+            <a:r>
+              <a:rPr lang="en-US" dirty="0" err="1" smtClean="0"/>
+              <a:t>lengkap</a:t>
+            </a:r>
+            <a:r>
+              <a:rPr lang="en-US" dirty="0" smtClean="0"/>
+              <a:t> </a:t>
+            </a:r>
+            <a:r>
+              <a:rPr lang="en-US" dirty="0" err="1" smtClean="0"/>
+              <a:t>untuk</a:t>
+            </a:r>
+            <a:r>
+              <a:rPr lang="en-US" dirty="0" smtClean="0"/>
+              <a:t> men-deploy</a:t>
+            </a:r>
+            <a:r>
+              <a:rPr lang="en-US" dirty="0"/>
+              <a:t>, </a:t>
+            </a:r>
+            <a:r>
+              <a:rPr lang="en-US" dirty="0" smtClean="0"/>
+              <a:t>me-manage </a:t>
+            </a:r>
+            <a:r>
+              <a:rPr lang="en-US" dirty="0"/>
+              <a:t>and </a:t>
+            </a:r>
+            <a:r>
+              <a:rPr lang="en-US" dirty="0" smtClean="0"/>
+              <a:t>me-monitor </a:t>
+            </a:r>
+            <a:r>
+              <a:rPr lang="en-US" dirty="0"/>
+              <a:t>business process and </a:t>
+            </a:r>
+            <a:r>
+              <a:rPr lang="en-US" dirty="0" err="1" smtClean="0"/>
+              <a:t>penerapan</a:t>
+            </a:r>
+            <a:r>
+              <a:rPr lang="en-US" dirty="0" smtClean="0"/>
+              <a:t> proses.</a:t>
+            </a:r>
+            <a:endParaRPr lang="en-US" dirty="0"/>
           </a:p>
           <a:p>
             <a:endParaRPr lang="en-US" dirty="0"/>
@@ -6202,6 +7420,13 @@
   <p:clrMapOvr>
     <a:masterClrMapping/>
   </p:clrMapOvr>
+  <p:timing>
+    <p:tnLst>
+      <p:par>
+        <p:cTn id="1" dur="indefinite" restart="never" nodeType="tmRoot"/>
+      </p:par>
+    </p:tnLst>
+  </p:timing>
 </p:sld>
 </file>
 
@@ -6244,12 +7469,28 @@
               <a:buAutoNum type="arabicPeriod"/>
             </a:pPr>
             <a:r>
-              <a:rPr lang="en-US" dirty="0"/>
-              <a:t>Define and Execute Business </a:t>
+              <a:rPr lang="en-US" dirty="0" err="1" smtClean="0"/>
+              <a:t>Mendefinisikan</a:t>
             </a:r>
             <a:r>
               <a:rPr lang="en-US" dirty="0" smtClean="0"/>
-              <a:t>Processes</a:t>
+              <a:t> </a:t>
+            </a:r>
+            <a:r>
+              <a:rPr lang="en-US" dirty="0" err="1" smtClean="0"/>
+              <a:t>dan</a:t>
+            </a:r>
+            <a:r>
+              <a:rPr lang="en-US" dirty="0" smtClean="0"/>
+              <a:t> </a:t>
+            </a:r>
+            <a:r>
+              <a:rPr lang="en-US" dirty="0" err="1" smtClean="0"/>
+              <a:t>menjalankan</a:t>
+            </a:r>
+            <a:r>
+              <a:rPr lang="en-US" dirty="0" smtClean="0"/>
+              <a:t> business process</a:t>
             </a:r>
           </a:p>
           <a:p>
@@ -6258,12 +7499,12 @@
               <a:buAutoNum type="arabicPeriod"/>
             </a:pPr>
             <a:r>
-              <a:rPr lang="en-US" dirty="0"/>
-              <a:t>Data Manipulation &amp; </a:t>
+              <a:rPr lang="en-US" dirty="0" err="1" smtClean="0"/>
+              <a:t>Memanipulasi</a:t>
             </a:r>
             <a:r>
               <a:rPr lang="en-US" dirty="0" smtClean="0"/>
-              <a:t>Extensibility</a:t>
+              <a:t> data</a:t>
             </a:r>
           </a:p>
           <a:p>
@@ -6272,13 +7513,42 @@
               <a:buAutoNum type="arabicPeriod"/>
             </a:pPr>
             <a:r>
-              <a:rPr lang="en-US" dirty="0"/>
-              <a:t>Define Workflows Interacting with </a:t>
+              <a:rPr lang="en-US" dirty="0" err="1" smtClean="0"/>
+              <a:t>Mendefinisikan</a:t>
             </a:r>
             <a:r>
               <a:rPr lang="en-US" dirty="0" smtClean="0"/>
-              <a:t>People</a:t>
-            </a:r>
+              <a:t> workflow yang </a:t>
+            </a:r>
+            <a:r>
+              <a:rPr lang="en-US" dirty="0" err="1" smtClean="0"/>
+              <a:t>mampu</a:t>
+            </a:r>
+            <a:r>
+              <a:rPr lang="en-US" dirty="0" smtClean="0"/>
+              <a:t> </a:t>
+            </a:r>
+            <a:r>
+              <a:rPr lang="en-US" dirty="0" err="1" smtClean="0"/>
+              <a:t>berinteraksi</a:t>
+            </a:r>
+            <a:r>
+              <a:rPr lang="en-US" dirty="0" smtClean="0"/>
+              <a:t> </a:t>
+            </a:r>
+            <a:r>
+              <a:rPr lang="en-US" dirty="0" err="1" smtClean="0"/>
+              <a:t>dengan</a:t>
+            </a:r>
+            <a:r>
+              <a:rPr lang="en-US" dirty="0" smtClean="0"/>
+              <a:t> </a:t>
+            </a:r>
+            <a:r>
+              <a:rPr lang="en-US" dirty="0" err="1" smtClean="0"/>
+              <a:t>manusia</a:t>
+            </a:r>
+            <a:endParaRPr lang="en-US" dirty="0" smtClean="0"/>
           </a:p>
           <a:p>
             <a:pPr marL="457200" indent="-457200">
@@ -6286,12 +7556,36 @@
               <a:buAutoNum type="arabicPeriod"/>
             </a:pPr>
             <a:r>
-              <a:rPr lang="en-US" dirty="0"/>
-              <a:t>Create &amp; Monitor Custom Key Performance Indicators (KPIs</a:t>
+              <a:rPr lang="en-US" dirty="0" err="1" smtClean="0"/>
+              <a:t>Membuat</a:t>
             </a:r>
             <a:r>
               <a:rPr lang="en-US" dirty="0" smtClean="0"/>
-              <a:t>)</a:t>
+              <a:t> </a:t>
+            </a:r>
+            <a:r>
+              <a:rPr lang="en-US" dirty="0" err="1" smtClean="0"/>
+              <a:t>dan</a:t>
+            </a:r>
+            <a:r>
+              <a:rPr lang="en-US" dirty="0" smtClean="0"/>
+              <a:t> </a:t>
+            </a:r>
+            <a:r>
+              <a:rPr lang="en-US" dirty="0" err="1" smtClean="0"/>
+              <a:t>memonitor</a:t>
+            </a:r>
+            <a:r>
+              <a:rPr lang="en-US" dirty="0" smtClean="0"/>
+              <a:t> KPI yang </a:t>
+            </a:r>
+            <a:r>
+              <a:rPr lang="en-US" dirty="0" err="1" smtClean="0"/>
+              <a:t>bersifat</a:t>
+            </a:r>
+            <a:r>
+              <a:rPr lang="en-US" dirty="0" smtClean="0"/>
+              <a:t> custom</a:t>
             </a:r>
           </a:p>
           <a:p>
@@ -6300,8 +7594,12 @@
               <a:buAutoNum type="arabicPeriod"/>
             </a:pPr>
             <a:r>
+              <a:rPr lang="en-US" dirty="0" smtClean="0"/>
+              <a:t>Graphical </a:t>
+            </a:r>
+            <a:r>
               <a:rPr lang="en-US" dirty="0"/>
-              <a:t>Graphical Process </a:t>
+              <a:t>Process </a:t>
             </a:r>
             <a:r>
               <a:rPr lang="en-US" dirty="0" smtClean="0"/>
@@ -6314,8 +7612,24 @@
               <a:buAutoNum type="arabicPeriod"/>
             </a:pPr>
             <a:r>
+              <a:rPr lang="en-US" dirty="0" err="1" smtClean="0"/>
+              <a:t>Pengelolaan</a:t>
+            </a:r>
+            <a:r>
+              <a:rPr lang="en-US" dirty="0" smtClean="0"/>
+              <a:t> proses </a:t>
+            </a:r>
+            <a:r>
+              <a:rPr lang="en-US" dirty="0" err="1" smtClean="0"/>
+              <a:t>melalui</a:t>
+            </a:r>
+            <a:r>
+              <a:rPr lang="en-US" dirty="0" smtClean="0"/>
+              <a:t> </a:t>
+            </a:r>
+            <a:r>
               <a:rPr lang="en-US" dirty="0"/>
-              <a:t>Process Management via Graphical Administration </a:t>
+              <a:t>Graphical Administration </a:t>
             </a:r>
             <a:r>
               <a:rPr lang="en-US" dirty="0" smtClean="0"/>
@@ -6328,13 +7642,26 @@
               <a:buAutoNum type="arabicPeriod"/>
             </a:pPr>
             <a:r>
-              <a:rPr lang="en-US" dirty="0"/>
-              <a:t>Integrates to Existing </a:t>
+              <a:rPr lang="en-US" dirty="0" err="1" smtClean="0"/>
+              <a:t>Integrasi</a:t>
             </a:r>
             <a:r>
               <a:rPr lang="en-US" dirty="0" smtClean="0"/>
-              <a:t>Environment</a:t>
-            </a:r>
+              <a:t> </a:t>
+            </a:r>
+            <a:r>
+              <a:rPr lang="en-US" dirty="0" err="1" smtClean="0"/>
+              <a:t>dengan</a:t>
+            </a:r>
+            <a:r>
+              <a:rPr lang="en-US" dirty="0" smtClean="0"/>
+              <a:t> environment yang </a:t>
+            </a:r>
+            <a:r>
+              <a:rPr lang="en-US" dirty="0" err="1" smtClean="0"/>
+              <a:t>ada</a:t>
+            </a:r>
+            <a:endParaRPr lang="en-US" dirty="0" smtClean="0"/>
           </a:p>
           <a:p>
             <a:pPr marL="457200" indent="-457200">
@@ -6342,13 +7669,42 @@
               <a:buAutoNum type="arabicPeriod"/>
             </a:pPr>
             <a:r>
-              <a:rPr lang="en-US" dirty="0"/>
-              <a:t>High Availability, Scalability and </a:t>
+              <a:rPr lang="en-US" dirty="0" err="1" smtClean="0"/>
+              <a:t>Availabilitas</a:t>
             </a:r>
             <a:r>
               <a:rPr lang="en-US" dirty="0" smtClean="0"/>
-              <a:t>Stability</a:t>
-            </a:r>
+              <a:t>, </a:t>
+            </a:r>
+            <a:r>
+              <a:rPr lang="en-US" dirty="0" err="1" smtClean="0"/>
+              <a:t>skalabilitas</a:t>
+            </a:r>
+            <a:r>
+              <a:rPr lang="en-US" dirty="0" smtClean="0"/>
+              <a:t> </a:t>
+            </a:r>
+            <a:r>
+              <a:rPr lang="en-US" dirty="0" err="1" smtClean="0"/>
+              <a:t>dan</a:t>
+            </a:r>
+            <a:r>
+              <a:rPr lang="en-US" dirty="0" smtClean="0"/>
+              <a:t> </a:t>
+            </a:r>
+            <a:r>
+              <a:rPr lang="en-US" dirty="0" err="1" smtClean="0"/>
+              <a:t>stabilitas</a:t>
+            </a:r>
+            <a:r>
+              <a:rPr lang="en-US" dirty="0" smtClean="0"/>
+              <a:t> </a:t>
+            </a:r>
+            <a:r>
+              <a:rPr lang="en-US" dirty="0" err="1" smtClean="0"/>
+              <a:t>tinggi</a:t>
+            </a:r>
+            <a:endParaRPr lang="en-US" dirty="0" smtClean="0"/>
           </a:p>
           <a:p>
             <a:pPr marL="457200" indent="-457200">
@@ -6356,13 +7712,30 @@
               <a:buAutoNum type="arabicPeriod"/>
             </a:pPr>
             <a:r>
+              <a:rPr lang="en-US" dirty="0" smtClean="0"/>
+              <a:t>Lightweight</a:t>
+            </a:r>
+            <a:r>
               <a:rPr lang="en-US" dirty="0"/>
-              <a:t>Lightweight, Developer Friendly and Easy to </a:t>
+              <a:t>, Developer Friendly </a:t>
+            </a:r>
+            <a:r>
+              <a:rPr lang="en-US" dirty="0" err="1" smtClean="0"/>
+              <a:t>dan</a:t>
             </a:r>
             <a:r>
               <a:rPr lang="en-US" dirty="0" smtClean="0"/>
-              <a:t>Deploy</a:t>
-            </a:r>
+              <a:t> </a:t>
+            </a:r>
+            <a:r>
+              <a:rPr lang="en-US" dirty="0" err="1" smtClean="0"/>
+              <a:t>mudah</a:t>
+            </a:r>
+            <a:r>
+              <a:rPr lang="en-US" dirty="0" smtClean="0"/>
+              <a:t> di-deploy</a:t>
+            </a:r>
+            <a:endParaRPr lang="en-US" dirty="0" smtClean="0"/>
           </a:p>
           <a:p>
             <a:pPr marL="457200" indent="-457200">
@@ -6409,6 +7782,13 @@
   <p:clrMapOvr>
     <a:masterClrMapping/>
   </p:clrMapOvr>
+  <p:timing>
+    <p:tnLst>
+      <p:par>
+        <p:cTn id="1" dur="indefinite" restart="never" nodeType="tmRoot"/>
+      </p:par>
+    </p:tnLst>
+  </p:timing>
 </p:sld>
 </file>
 
@@ -6459,8 +7839,109 @@
             </a:r>
             <a:r>
               <a:rPr lang="en-US" dirty="0"/>
-              <a:t> is a workflow, process automation, that enables coordination between disparate applications and services, resulting in the deployment of new revenue generating business processes</a:t>
-            </a:r>
+              <a:t> </a:t>
+            </a:r>
+            <a:r>
+              <a:rPr lang="en-US" dirty="0" err="1" smtClean="0"/>
+              <a:t>merupakan</a:t>
+            </a:r>
+            <a:r>
+              <a:rPr lang="en-US" dirty="0" smtClean="0"/>
+              <a:t> </a:t>
+            </a:r>
+            <a:r>
+              <a:rPr lang="en-US" dirty="0" err="1" smtClean="0"/>
+              <a:t>otomatisasi</a:t>
+            </a:r>
+            <a:r>
+              <a:rPr lang="en-US" dirty="0" smtClean="0"/>
+              <a:t> proses </a:t>
+            </a:r>
+            <a:r>
+              <a:rPr lang="en-US" dirty="0" err="1" smtClean="0"/>
+              <a:t>berupa</a:t>
+            </a:r>
+            <a:r>
+              <a:rPr lang="en-US" dirty="0" smtClean="0"/>
+              <a:t> workflow yang </a:t>
+            </a:r>
+            <a:r>
+              <a:rPr lang="en-US" dirty="0" err="1" smtClean="0"/>
+              <a:t>memungkinkan</a:t>
+            </a:r>
+            <a:r>
+              <a:rPr lang="en-US" dirty="0" smtClean="0"/>
+              <a:t> </a:t>
+            </a:r>
+            <a:r>
+              <a:rPr lang="en-US" dirty="0" err="1" smtClean="0"/>
+              <a:t>koordinasi</a:t>
+            </a:r>
+            <a:r>
+              <a:rPr lang="en-US" dirty="0" smtClean="0"/>
+              <a:t> </a:t>
+            </a:r>
+            <a:r>
+              <a:rPr lang="en-US" dirty="0" err="1" smtClean="0"/>
+              <a:t>antar</a:t>
+            </a:r>
+            <a:r>
+              <a:rPr lang="en-US" dirty="0" smtClean="0"/>
+              <a:t> </a:t>
+            </a:r>
+            <a:r>
+              <a:rPr lang="en-US" dirty="0" err="1" smtClean="0"/>
+              <a:t>berbagai</a:t>
+            </a:r>
+            <a:r>
+              <a:rPr lang="en-US" dirty="0" smtClean="0"/>
+              <a:t> </a:t>
+            </a:r>
+            <a:r>
+              <a:rPr lang="en-US" dirty="0" err="1" smtClean="0"/>
+              <a:t>aplikasi</a:t>
+            </a:r>
+            <a:r>
+              <a:rPr lang="en-US" dirty="0" smtClean="0"/>
+              <a:t> </a:t>
+            </a:r>
+            <a:r>
+              <a:rPr lang="en-US" dirty="0" err="1" smtClean="0"/>
+              <a:t>dan</a:t>
+            </a:r>
+            <a:r>
+              <a:rPr lang="en-US" dirty="0" smtClean="0"/>
+              <a:t> service yang </a:t>
+            </a:r>
+            <a:r>
+              <a:rPr lang="en-US" dirty="0" err="1" smtClean="0"/>
+              <a:t>menghasilkan</a:t>
+            </a:r>
+            <a:r>
+              <a:rPr lang="en-US" dirty="0" smtClean="0"/>
+              <a:t> proses </a:t>
+            </a:r>
+            <a:r>
+              <a:rPr lang="en-US" dirty="0" err="1" smtClean="0"/>
+              <a:t>bisnis</a:t>
+            </a:r>
+            <a:r>
+              <a:rPr lang="en-US" dirty="0" smtClean="0"/>
+              <a:t> yang </a:t>
+            </a:r>
+            <a:r>
+              <a:rPr lang="en-US" dirty="0" err="1" smtClean="0"/>
+              <a:t>lebih</a:t>
+            </a:r>
+            <a:r>
+              <a:rPr lang="en-US" dirty="0" smtClean="0"/>
+              <a:t> </a:t>
+            </a:r>
+            <a:r>
+              <a:rPr lang="en-US" dirty="0" err="1" smtClean="0"/>
+              <a:t>efektif</a:t>
+            </a:r>
+            <a:endParaRPr lang="en-US" dirty="0"/>
           </a:p>
         </p:txBody>
       </p:sp>
@@ -6509,6 +7990,13 @@
   <p:clrMapOvr>
     <a:masterClrMapping/>
   </p:clrMapOvr>
+  <p:timing>
+    <p:tnLst>
+      <p:par>
+        <p:cTn id="1" dur="indefinite" restart="never" nodeType="tmRoot"/>
+      </p:par>
+    </p:tnLst>
+  </p:timing>
 </p:sld>
 </file>
 
@@ -6529,36 +8017,6 @@
           <a:chExt cx="0" cy="0"/>
         </a:xfrm>
       </p:grpSpPr>
-      <p:sp>
-        <p:nvSpPr>
-          <p:cNvPr id="2" name="Content Placeholder 1"/>
-          <p:cNvSpPr>
-            <a:spLocks noGrp="1"/>
-          </p:cNvSpPr>
-          <p:nvPr>
-            <p:ph idx="1"/>
-          </p:nvPr>
-        </p:nvSpPr>
-        <p:spPr/>
-        <p:txBody>
-          <a:bodyPr/>
-          <a:lstStyle/>
-          <a:p>
-            <a:pPr algn="just"/>
-            <a:r>
-              <a:rPr lang="en-US" dirty="0" err="1"/>
-              <a:t>JBoss</a:t>
-            </a:r>
-            <a:r>
-              <a:rPr lang="en-US" dirty="0"/>
-              <a:t> Enterprise Framework that delivers workflow, business process management (BPM) and service orchestration in a multi-process language platform and in a scalable and flexible product footprint. </a:t>
-            </a:r>
-          </a:p>
-          <a:p>
-            <a:endParaRPr lang="en-US" dirty="0"/>
-          </a:p>
-        </p:txBody>
-      </p:sp>
       <p:sp>
         <p:nvSpPr>
           <p:cNvPr id="3" name="Title 2"/>
@@ -6627,8 +8085,8 @@
         </p:blipFill>
         <p:spPr bwMode="auto">
           <a:xfrm>
-            <a:off x="2640106" y="3406589"/>
-            <a:ext cx="7380288" cy="3248025"/>
+            <a:off x="1580057" y="2447219"/>
+            <a:ext cx="9017543" cy="3968572"/>
           </a:xfrm>
           <a:prstGeom prst="rect">
             <a:avLst/>
@@ -6695,9 +8153,171 @@
           <a:chExt cx="0" cy="0"/>
         </a:xfrm>
       </p:grpSpPr>
+      <p:sp>
+        <p:nvSpPr>
+          <p:cNvPr id="3" name="Title 2"/>
+          <p:cNvSpPr>
+            <a:spLocks noGrp="1"/>
+          </p:cNvSpPr>
+          <p:nvPr>
+            <p:ph type="title"/>
+          </p:nvPr>
+        </p:nvSpPr>
+        <p:spPr/>
+        <p:txBody>
+          <a:bodyPr/>
+          <a:lstStyle/>
+          <a:p>
+            <a:r>
+              <a:rPr lang="en-US" dirty="0" err="1" smtClean="0"/>
+              <a:t>jBPM</a:t>
+            </a:r>
+            <a:r>
+              <a:rPr lang="en-US" dirty="0" smtClean="0"/>
+              <a:t> Overview</a:t>
+            </a:r>
+            <a:endParaRPr lang="en-US" dirty="0"/>
+          </a:p>
+        </p:txBody>
+      </p:sp>
+      <p:sp>
+        <p:nvSpPr>
+          <p:cNvPr id="6" name="TextBox 5"/>
+          <p:cNvSpPr txBox="1"/>
+          <p:nvPr/>
+        </p:nvSpPr>
+        <p:spPr>
+          <a:xfrm>
+            <a:off x="6970426" y="2698230"/>
+            <a:ext cx="184731" cy="369332"/>
+          </a:xfrm>
+          <a:prstGeom prst="rect">
+            <a:avLst/>
+          </a:prstGeom>
+          <a:noFill/>
+        </p:spPr>
+        <p:txBody>
+          <a:bodyPr wrap="none" rtlCol="0">
+            <a:spAutoFit/>
+          </a:bodyPr>
+          <a:lstStyle/>
+          <a:p>
+            <a:endParaRPr lang="en-US" dirty="0"/>
+          </a:p>
+        </p:txBody>
+      </p:sp>
+      <p:sp>
+        <p:nvSpPr>
+          <p:cNvPr id="9" name="TextBox 8"/>
+          <p:cNvSpPr txBox="1"/>
+          <p:nvPr/>
+        </p:nvSpPr>
+        <p:spPr>
+          <a:xfrm>
+            <a:off x="6688325" y="2464699"/>
+            <a:ext cx="5093944" cy="1569660"/>
+          </a:xfrm>
+          <a:prstGeom prst="rect">
+            <a:avLst/>
+          </a:prstGeom>
+          <a:noFill/>
+        </p:spPr>
+        <p:txBody>
+          <a:bodyPr wrap="square" rtlCol="0">
+            <a:spAutoFit/>
+          </a:bodyPr>
+          <a:lstStyle/>
+          <a:p>
+            <a:r>
+              <a:rPr lang="en-US" sz="2400" dirty="0" smtClean="0"/>
+              <a:t>Core engine </a:t>
+            </a:r>
+            <a:r>
+              <a:rPr lang="en-US" sz="2400" dirty="0" err="1" smtClean="0"/>
+              <a:t>merupakan</a:t>
+            </a:r>
+            <a:r>
+              <a:rPr lang="en-US" sz="2400" dirty="0" smtClean="0"/>
+              <a:t> </a:t>
+            </a:r>
+            <a:r>
+              <a:rPr lang="en-US" sz="2400" dirty="0" err="1" smtClean="0"/>
+              <a:t>inti</a:t>
+            </a:r>
+            <a:r>
+              <a:rPr lang="en-US" sz="2400" dirty="0" smtClean="0"/>
+              <a:t> </a:t>
+            </a:r>
+            <a:r>
+              <a:rPr lang="en-US" sz="2400" dirty="0" err="1" smtClean="0"/>
+              <a:t>dari</a:t>
+            </a:r>
+            <a:r>
+              <a:rPr lang="en-US" sz="2400" dirty="0" smtClean="0"/>
+              <a:t> </a:t>
+            </a:r>
+            <a:r>
+              <a:rPr lang="en-US" sz="2400" dirty="0"/>
+              <a:t>project </a:t>
+            </a:r>
+            <a:r>
+              <a:rPr lang="en-US" sz="2400" dirty="0" smtClean="0"/>
+              <a:t>yang </a:t>
+            </a:r>
+            <a:r>
+              <a:rPr lang="en-US" sz="2400" dirty="0" err="1" smtClean="0"/>
+              <a:t>memungkinkan</a:t>
+            </a:r>
+            <a:r>
+              <a:rPr lang="en-US" sz="2400" dirty="0" smtClean="0"/>
+              <a:t> </a:t>
+            </a:r>
+            <a:r>
+              <a:rPr lang="en-US" sz="2400" dirty="0" err="1" smtClean="0"/>
+              <a:t>kita</a:t>
+            </a:r>
+            <a:r>
+              <a:rPr lang="en-US" sz="2400" dirty="0" smtClean="0"/>
+              <a:t> </a:t>
+            </a:r>
+            <a:r>
+              <a:rPr lang="en-US" sz="2400" dirty="0" err="1" smtClean="0"/>
+              <a:t>menjalankan</a:t>
+            </a:r>
+            <a:r>
+              <a:rPr lang="en-US" sz="2400" dirty="0" smtClean="0"/>
+              <a:t> proses </a:t>
+            </a:r>
+            <a:r>
+              <a:rPr lang="en-US" sz="2400" dirty="0" err="1" smtClean="0"/>
+              <a:t>bisnis</a:t>
+            </a:r>
+            <a:r>
+              <a:rPr lang="en-US" sz="2400" dirty="0" smtClean="0"/>
+              <a:t> </a:t>
+            </a:r>
+            <a:r>
+              <a:rPr lang="en-US" sz="2400" dirty="0" err="1" smtClean="0"/>
+              <a:t>secara</a:t>
+            </a:r>
+            <a:r>
+              <a:rPr lang="en-US" sz="2400" dirty="0" smtClean="0"/>
+              <a:t> </a:t>
+            </a:r>
+            <a:r>
+              <a:rPr lang="en-US" sz="2400" dirty="0" err="1" smtClean="0"/>
+              <a:t>fleksibel</a:t>
+            </a:r>
+            <a:r>
+              <a:rPr lang="en-US" sz="2400" dirty="0" smtClean="0"/>
+              <a:t>.</a:t>
+            </a:r>
+          </a:p>
+        </p:txBody>
+      </p:sp>
       <p:pic>
         <p:nvPicPr>
-          <p:cNvPr id="5" name="Content Placeholder 4"/>
+          <p:cNvPr id="11" name="Content Placeholder 13"/>
           <p:cNvPicPr>
             <a:picLocks noGrp="1" noChangeAspect="1"/>
           </p:cNvPicPr>
@@ -6719,130 +8339,61 @@
         </p:blipFill>
         <p:spPr>
           <a:xfrm>
-            <a:off x="470969" y="2277880"/>
-            <a:ext cx="5839259" cy="4286845"/>
+            <a:off x="386306" y="2552428"/>
+            <a:ext cx="5936116" cy="3878263"/>
           </a:xfrm>
         </p:spPr>
       </p:pic>
       <p:sp>
         <p:nvSpPr>
-          <p:cNvPr id="3" name="Title 2"/>
-          <p:cNvSpPr>
-            <a:spLocks noGrp="1"/>
-          </p:cNvSpPr>
-          <p:nvPr>
-            <p:ph type="title"/>
-          </p:nvPr>
-        </p:nvSpPr>
-        <p:spPr/>
-        <p:txBody>
-          <a:bodyPr/>
-          <a:lstStyle/>
-          <a:p>
-            <a:r>
-              <a:rPr lang="en-US" dirty="0" err="1" smtClean="0"/>
-              <a:t>jBPM</a:t>
-            </a:r>
-            <a:r>
-              <a:rPr lang="en-US" dirty="0" smtClean="0"/>
-              <a:t> Overview</a:t>
-            </a:r>
-            <a:endParaRPr lang="en-US" dirty="0"/>
-          </a:p>
-        </p:txBody>
-      </p:sp>
-      <p:sp>
-        <p:nvSpPr>
-          <p:cNvPr id="6" name="TextBox 5"/>
-          <p:cNvSpPr txBox="1"/>
+          <p:cNvPr id="12" name="Oval 11"/>
+          <p:cNvSpPr/>
           <p:nvPr/>
         </p:nvSpPr>
         <p:spPr>
           <a:xfrm>
-            <a:off x="6970426" y="2698230"/>
-            <a:ext cx="184731" cy="369332"/>
+            <a:off x="873016" y="4034359"/>
+            <a:ext cx="1015744" cy="914400"/>
           </a:xfrm>
-          <a:prstGeom prst="rect">
+          <a:prstGeom prst="ellipse">
             <a:avLst/>
           </a:prstGeom>
           <a:noFill/>
+          <a:ln w="76200">
+            <a:solidFill>
+              <a:srgbClr val="FFFF00"/>
+            </a:solidFill>
+          </a:ln>
         </p:spPr>
-        <p:txBody>
-          <a:bodyPr wrap="none" rtlCol="0">
-            <a:spAutoFit/>
-          </a:bodyPr>
-          <a:lstStyle/>
-          <a:p>
-            <a:endParaRPr lang="en-US" dirty="0"/>
-          </a:p>
-        </p:txBody>
-      </p:sp>
-      <p:sp>
-        <p:nvSpPr>
-          <p:cNvPr id="9" name="TextBox 8"/>
-          <p:cNvSpPr txBox="1"/>
-          <p:nvPr/>
-        </p:nvSpPr>
-        <p:spPr>
-          <a:xfrm>
-            <a:off x="6448482" y="2518348"/>
-            <a:ext cx="5093944" cy="3785652"/>
-          </a:xfrm>
-          <a:prstGeom prst="rect">
-            <a:avLst/>
-          </a:prstGeom>
-          <a:noFill/>
-        </p:spPr>
-        <p:txBody>
-          <a:bodyPr wrap="square" rtlCol="0">
-            <a:spAutoFit/>
-          </a:bodyPr>
-          <a:lstStyle/>
-          <a:p>
-            <a:r>
-              <a:rPr lang="en-US" sz="2400" dirty="0"/>
-              <a:t>The grey boxes show the component that are not part of </a:t>
-            </a:r>
-            <a:r>
-              <a:rPr lang="en-US" sz="2400" dirty="0" err="1"/>
-              <a:t>jBPM</a:t>
-            </a:r>
-            <a:r>
-              <a:rPr lang="en-US" sz="2400" dirty="0"/>
-              <a:t> project with which </a:t>
-            </a:r>
-            <a:r>
-              <a:rPr lang="en-US" sz="2400" dirty="0" err="1"/>
-              <a:t>jBPM</a:t>
-            </a:r>
-            <a:r>
-              <a:rPr lang="en-US" sz="2400" dirty="0"/>
-              <a:t> can </a:t>
-            </a:r>
-            <a:r>
-              <a:rPr lang="en-US" sz="2400" dirty="0" smtClean="0"/>
-              <a:t>integrate.</a:t>
-            </a:r>
-          </a:p>
-          <a:p>
-            <a:endParaRPr lang="en-US" sz="2400" dirty="0"/>
-          </a:p>
-          <a:p>
-            <a:r>
-              <a:rPr lang="en-US" sz="2400" dirty="0" smtClean="0"/>
-              <a:t>The </a:t>
-            </a:r>
-            <a:r>
-              <a:rPr lang="en-US" sz="2400" dirty="0"/>
-              <a:t>dashed border indicates the optional component, while the core engine is the core of the project and is required if you want to execute business processes.</a:t>
-            </a:r>
+        <p:style>
+          <a:lnRef idx="2">
+            <a:schemeClr val="accent1">
+              <a:shade val="50000"/>
+            </a:schemeClr>
+          </a:lnRef>
+          <a:fillRef idx="1">
+            <a:schemeClr val="accent1"/>
+          </a:fillRef>
+          <a:effectRef idx="0">
+            <a:schemeClr val="accent1"/>
+          </a:effectRef>
+          <a:fontRef idx="minor">
+            <a:schemeClr val="lt1"/>
+          </a:fontRef>
+        </p:style>
+        <p:txBody>
+          <a:bodyPr rtlCol="0" anchor="ctr"/>
+          <a:lstStyle/>
+          <a:p>
+            <a:pPr algn="ctr"/>
+            <a:endParaRPr lang="en-US"/>
           </a:p>
         </p:txBody>
       </p:sp>
     </p:spTree>
     <p:extLst>
       <p:ext uri="{BB962C8B-B14F-4D97-AF65-F5344CB8AC3E}">
-        <p14:creationId xmlns:p14="http://schemas.microsoft.com/office/powerpoint/2010/main" val="2175012507"/>
+        <p14:creationId xmlns:p14="http://schemas.microsoft.com/office/powerpoint/2010/main" val="3373673194"/>
       </p:ext>
     </p:extLst>
   </p:cSld>
@@ -6876,9 +8427,147 @@
           <a:chExt cx="0" cy="0"/>
         </a:xfrm>
       </p:grpSpPr>
+      <p:sp>
+        <p:nvSpPr>
+          <p:cNvPr id="3" name="Title 2"/>
+          <p:cNvSpPr>
+            <a:spLocks noGrp="1"/>
+          </p:cNvSpPr>
+          <p:nvPr>
+            <p:ph type="title"/>
+          </p:nvPr>
+        </p:nvSpPr>
+        <p:spPr/>
+        <p:txBody>
+          <a:bodyPr/>
+          <a:lstStyle/>
+          <a:p>
+            <a:r>
+              <a:rPr lang="en-US" dirty="0" err="1" smtClean="0"/>
+              <a:t>jBPM</a:t>
+            </a:r>
+            <a:r>
+              <a:rPr lang="en-US" dirty="0" smtClean="0"/>
+              <a:t> Overview</a:t>
+            </a:r>
+            <a:endParaRPr lang="en-US" dirty="0"/>
+          </a:p>
+        </p:txBody>
+      </p:sp>
+      <p:sp>
+        <p:nvSpPr>
+          <p:cNvPr id="6" name="TextBox 5"/>
+          <p:cNvSpPr txBox="1"/>
+          <p:nvPr/>
+        </p:nvSpPr>
+        <p:spPr>
+          <a:xfrm>
+            <a:off x="6970426" y="2698230"/>
+            <a:ext cx="184731" cy="369332"/>
+          </a:xfrm>
+          <a:prstGeom prst="rect">
+            <a:avLst/>
+          </a:prstGeom>
+          <a:noFill/>
+        </p:spPr>
+        <p:txBody>
+          <a:bodyPr wrap="none" rtlCol="0">
+            <a:spAutoFit/>
+          </a:bodyPr>
+          <a:lstStyle/>
+          <a:p>
+            <a:endParaRPr lang="en-US" dirty="0"/>
+          </a:p>
+        </p:txBody>
+      </p:sp>
+      <p:sp>
+        <p:nvSpPr>
+          <p:cNvPr id="9" name="TextBox 8"/>
+          <p:cNvSpPr txBox="1"/>
+          <p:nvPr/>
+        </p:nvSpPr>
+        <p:spPr>
+          <a:xfrm>
+            <a:off x="6538423" y="2282732"/>
+            <a:ext cx="5093944" cy="1200329"/>
+          </a:xfrm>
+          <a:prstGeom prst="rect">
+            <a:avLst/>
+          </a:prstGeom>
+          <a:noFill/>
+        </p:spPr>
+        <p:txBody>
+          <a:bodyPr wrap="square" rtlCol="0">
+            <a:spAutoFit/>
+          </a:bodyPr>
+          <a:lstStyle/>
+          <a:p>
+            <a:r>
+              <a:rPr lang="en-US" sz="2400" dirty="0" smtClean="0"/>
+              <a:t>Human </a:t>
+            </a:r>
+            <a:r>
+              <a:rPr lang="en-US" sz="2400" dirty="0"/>
+              <a:t>task service </a:t>
+            </a:r>
+            <a:r>
+              <a:rPr lang="en-US" sz="2400" dirty="0" err="1" smtClean="0"/>
+              <a:t>mengelola</a:t>
+            </a:r>
+            <a:r>
+              <a:rPr lang="en-US" sz="2400" dirty="0"/>
+              <a:t> </a:t>
+            </a:r>
+            <a:r>
+              <a:rPr lang="en-US" sz="2400" dirty="0" smtClean="0"/>
+              <a:t>proses yang </a:t>
+            </a:r>
+            <a:r>
+              <a:rPr lang="en-US" sz="2400" dirty="0" err="1" smtClean="0"/>
+              <a:t>terkait</a:t>
+            </a:r>
+            <a:r>
+              <a:rPr lang="en-US" sz="2400" dirty="0" smtClean="0"/>
+              <a:t> </a:t>
+            </a:r>
+            <a:r>
+              <a:rPr lang="en-US" sz="2400" dirty="0" err="1" smtClean="0"/>
+              <a:t>dengan</a:t>
+            </a:r>
+            <a:r>
+              <a:rPr lang="en-US" sz="2400" dirty="0" smtClean="0"/>
+              <a:t> </a:t>
+            </a:r>
+            <a:r>
+              <a:rPr lang="en-US" sz="2400" dirty="0" err="1" smtClean="0"/>
+              <a:t>manusia</a:t>
+            </a:r>
+            <a:r>
+              <a:rPr lang="en-US" sz="2400" dirty="0" smtClean="0"/>
+              <a:t> </a:t>
+            </a:r>
+            <a:r>
+              <a:rPr lang="en-US" sz="2400" dirty="0" err="1" smtClean="0"/>
+              <a:t>sebagai</a:t>
+            </a:r>
+            <a:r>
+              <a:rPr lang="en-US" sz="2400" dirty="0" smtClean="0"/>
+              <a:t> </a:t>
+            </a:r>
+            <a:r>
+              <a:rPr lang="en-US" sz="2400" dirty="0" err="1" smtClean="0"/>
+              <a:t>pelakunya</a:t>
+            </a:r>
+            <a:r>
+              <a:rPr lang="en-US" sz="2400" dirty="0" smtClean="0"/>
+              <a:t>.</a:t>
+            </a:r>
+          </a:p>
+        </p:txBody>
+      </p:sp>
       <p:pic>
         <p:nvPicPr>
-          <p:cNvPr id="5" name="Content Placeholder 4"/>
+          <p:cNvPr id="12" name="Content Placeholder 13"/>
           <p:cNvPicPr>
             <a:picLocks noGrp="1" noChangeAspect="1"/>
           </p:cNvPicPr>
@@ -6900,103 +8589,21 @@
         </p:blipFill>
         <p:spPr>
           <a:xfrm>
-            <a:off x="470969" y="2277880"/>
-            <a:ext cx="5839259" cy="4286845"/>
+            <a:off x="444618" y="2425737"/>
+            <a:ext cx="5936116" cy="3878263"/>
           </a:xfrm>
         </p:spPr>
       </p:pic>
       <p:sp>
         <p:nvSpPr>
-          <p:cNvPr id="3" name="Title 2"/>
-          <p:cNvSpPr>
-            <a:spLocks noGrp="1"/>
-          </p:cNvSpPr>
-          <p:nvPr>
-            <p:ph type="title"/>
-          </p:nvPr>
-        </p:nvSpPr>
-        <p:spPr/>
-        <p:txBody>
-          <a:bodyPr/>
-          <a:lstStyle/>
-          <a:p>
-            <a:r>
-              <a:rPr lang="en-US" dirty="0" err="1" smtClean="0"/>
-              <a:t>jBPM</a:t>
-            </a:r>
-            <a:r>
-              <a:rPr lang="en-US" dirty="0" smtClean="0"/>
-              <a:t> Overview</a:t>
-            </a:r>
-            <a:endParaRPr lang="en-US" dirty="0"/>
-          </a:p>
-        </p:txBody>
-      </p:sp>
-      <p:sp>
-        <p:nvSpPr>
-          <p:cNvPr id="6" name="TextBox 5"/>
-          <p:cNvSpPr txBox="1"/>
+          <p:cNvPr id="13" name="Oval 12"/>
+          <p:cNvSpPr/>
           <p:nvPr/>
         </p:nvSpPr>
         <p:spPr>
           <a:xfrm>
-            <a:off x="6970426" y="2698230"/>
-            <a:ext cx="184731" cy="369332"/>
-          </a:xfrm>
-          <a:prstGeom prst="rect">
-            <a:avLst/>
-          </a:prstGeom>
-          <a:noFill/>
-        </p:spPr>
-        <p:txBody>
-          <a:bodyPr wrap="none" rtlCol="0">
-            <a:spAutoFit/>
-          </a:bodyPr>
-          <a:lstStyle/>
-          <a:p>
-            <a:endParaRPr lang="en-US" dirty="0"/>
-          </a:p>
-        </p:txBody>
-      </p:sp>
-      <p:sp>
-        <p:nvSpPr>
-          <p:cNvPr id="9" name="TextBox 8"/>
-          <p:cNvSpPr txBox="1"/>
-          <p:nvPr/>
-        </p:nvSpPr>
-        <p:spPr>
-          <a:xfrm>
-            <a:off x="6538423" y="2282732"/>
-            <a:ext cx="5093944" cy="1569660"/>
-          </a:xfrm>
-          <a:prstGeom prst="rect">
-            <a:avLst/>
-          </a:prstGeom>
-          <a:noFill/>
-        </p:spPr>
-        <p:txBody>
-          <a:bodyPr wrap="square" rtlCol="0">
-            <a:spAutoFit/>
-          </a:bodyPr>
-          <a:lstStyle/>
-          <a:p>
-            <a:r>
-              <a:rPr lang="en-US" sz="2400" dirty="0"/>
-              <a:t>The history log will log all information about the current and previous state of all your process instances.</a:t>
-            </a:r>
-          </a:p>
-        </p:txBody>
-      </p:sp>
-      <p:sp>
-        <p:nvSpPr>
-          <p:cNvPr id="4" name="Oval 3"/>
-          <p:cNvSpPr/>
-          <p:nvPr/>
-        </p:nvSpPr>
-        <p:spPr>
-          <a:xfrm>
-            <a:off x="3177915" y="3477718"/>
-            <a:ext cx="1169233" cy="1214203"/>
+            <a:off x="1937314" y="3929428"/>
+            <a:ext cx="1015744" cy="914400"/>
           </a:xfrm>
           <a:prstGeom prst="ellipse">
             <a:avLst/>
@@ -7004,7 +8611,7 @@
           <a:noFill/>
           <a:ln w="76200">
             <a:solidFill>
-              <a:schemeClr val="accent5"/>
+              <a:srgbClr val="FFFF00"/>
             </a:solidFill>
           </a:ln>
         </p:spPr>
@@ -7036,7 +8643,7 @@
     </p:spTree>
     <p:extLst>
       <p:ext uri="{BB962C8B-B14F-4D97-AF65-F5344CB8AC3E}">
-        <p14:creationId xmlns:p14="http://schemas.microsoft.com/office/powerpoint/2010/main" val="3373673194"/>
+        <p14:creationId xmlns:p14="http://schemas.microsoft.com/office/powerpoint/2010/main" val="2247454382"/>
       </p:ext>
     </p:extLst>
   </p:cSld>
@@ -7131,8 +8738,8 @@
         </p:nvSpPr>
         <p:spPr>
           <a:xfrm>
-            <a:off x="6538423" y="2282732"/>
-            <a:ext cx="5093944" cy="1569660"/>
+            <a:off x="6538423" y="2147822"/>
+            <a:ext cx="5093944" cy="4154984"/>
           </a:xfrm>
           <a:prstGeom prst="rect">
             <a:avLst/>
@@ -7147,45 +8754,246 @@
           <a:p>
             <a:r>
               <a:rPr lang="en-US" sz="2400" dirty="0"/>
-              <a:t>The human task service will take care of the human task life cycle if human actors participate in the process.</a:t>
-            </a:r>
+              <a:t>Runtime persistence </a:t>
+            </a:r>
+            <a:r>
+              <a:rPr lang="en-US" sz="2400" dirty="0" err="1" smtClean="0"/>
+              <a:t>menyimpan</a:t>
+            </a:r>
+            <a:r>
+              <a:rPr lang="en-US" sz="2400" dirty="0" smtClean="0"/>
+              <a:t> </a:t>
+            </a:r>
+            <a:r>
+              <a:rPr lang="en-US" sz="2400" dirty="0"/>
+              <a:t>state </a:t>
+            </a:r>
+            <a:r>
+              <a:rPr lang="en-US" sz="2400" dirty="0" err="1" smtClean="0"/>
+              <a:t>dari</a:t>
+            </a:r>
+            <a:r>
+              <a:rPr lang="en-US" sz="2400" dirty="0" smtClean="0"/>
+              <a:t> </a:t>
+            </a:r>
+            <a:r>
+              <a:rPr lang="en-US" sz="2400" dirty="0" err="1" smtClean="0"/>
+              <a:t>semua</a:t>
+            </a:r>
+            <a:r>
+              <a:rPr lang="en-US" sz="2400" dirty="0" smtClean="0"/>
+              <a:t> </a:t>
+            </a:r>
+            <a:r>
+              <a:rPr lang="en-US" sz="2400" dirty="0" err="1" smtClean="0"/>
+              <a:t>instansiasi</a:t>
+            </a:r>
+            <a:r>
+              <a:rPr lang="en-US" sz="2400" dirty="0" smtClean="0"/>
+              <a:t> proses </a:t>
+            </a:r>
+            <a:r>
+              <a:rPr lang="en-US" sz="2400" dirty="0" err="1" smtClean="0"/>
+              <a:t>dan</a:t>
+            </a:r>
+            <a:r>
+              <a:rPr lang="en-US" sz="2400" dirty="0" smtClean="0"/>
+              <a:t> </a:t>
+            </a:r>
+            <a:r>
+              <a:rPr lang="en-US" sz="2400" dirty="0" err="1" smtClean="0"/>
+              <a:t>informasi</a:t>
+            </a:r>
+            <a:r>
+              <a:rPr lang="en-US" sz="2400" dirty="0" smtClean="0"/>
+              <a:t> log </a:t>
+            </a:r>
+            <a:r>
+              <a:rPr lang="en-US" sz="2400" dirty="0" err="1" smtClean="0"/>
+              <a:t>mengenai</a:t>
+            </a:r>
+            <a:r>
+              <a:rPr lang="en-US" sz="2400" dirty="0" smtClean="0"/>
+              <a:t> </a:t>
+            </a:r>
+            <a:r>
+              <a:rPr lang="en-US" sz="2400" dirty="0" err="1" smtClean="0"/>
+              <a:t>semua</a:t>
+            </a:r>
+            <a:r>
+              <a:rPr lang="en-US" sz="2400" dirty="0" smtClean="0"/>
+              <a:t> yang </a:t>
+            </a:r>
+            <a:r>
+              <a:rPr lang="en-US" sz="2400" dirty="0" err="1" smtClean="0"/>
+              <a:t>terjadi</a:t>
+            </a:r>
+            <a:r>
+              <a:rPr lang="en-US" sz="2400" dirty="0" smtClean="0"/>
+              <a:t> </a:t>
+            </a:r>
+            <a:r>
+              <a:rPr lang="en-US" sz="2400" dirty="0" err="1" smtClean="0"/>
+              <a:t>selama</a:t>
+            </a:r>
+            <a:r>
+              <a:rPr lang="en-US" sz="2400" dirty="0" smtClean="0"/>
+              <a:t> runtime.</a:t>
+            </a:r>
+          </a:p>
+          <a:p>
+            <a:endParaRPr lang="en-US" sz="2400" dirty="0"/>
+          </a:p>
+          <a:p>
+            <a:r>
+              <a:rPr lang="en-US" sz="2400" dirty="0" err="1" smtClean="0"/>
+              <a:t>Aplikasi</a:t>
+            </a:r>
+            <a:r>
+              <a:rPr lang="en-US" sz="2400" dirty="0" smtClean="0"/>
+              <a:t> </a:t>
+            </a:r>
+            <a:r>
+              <a:rPr lang="en-US" sz="2400" dirty="0" err="1" smtClean="0"/>
+              <a:t>dapat</a:t>
+            </a:r>
+            <a:r>
+              <a:rPr lang="en-US" sz="2400" dirty="0" smtClean="0"/>
+              <a:t> </a:t>
+            </a:r>
+            <a:r>
+              <a:rPr lang="en-US" sz="2400" dirty="0" err="1" smtClean="0"/>
+              <a:t>terhubung</a:t>
+            </a:r>
+            <a:r>
+              <a:rPr lang="en-US" sz="2400" dirty="0" smtClean="0"/>
+              <a:t> </a:t>
+            </a:r>
+            <a:r>
+              <a:rPr lang="en-US" sz="2400" dirty="0" err="1" smtClean="0"/>
+              <a:t>ke</a:t>
+            </a:r>
+            <a:r>
+              <a:rPr lang="en-US" sz="2400" dirty="0" smtClean="0"/>
+              <a:t> </a:t>
+            </a:r>
+            <a:r>
+              <a:rPr lang="en-US" sz="2400" dirty="0"/>
+              <a:t>core engine </a:t>
+            </a:r>
+            <a:r>
+              <a:rPr lang="en-US" sz="2400" dirty="0" err="1" smtClean="0"/>
+              <a:t>melalui</a:t>
+            </a:r>
+            <a:r>
+              <a:rPr lang="en-US" sz="2400" dirty="0" smtClean="0"/>
+              <a:t> :</a:t>
+            </a:r>
+          </a:p>
+          <a:p>
+            <a:pPr marL="342900" indent="-342900">
+              <a:buFont typeface="Arial" panose="020B0604020202020204" pitchFamily="34" charset="0"/>
+              <a:buChar char="•"/>
+            </a:pPr>
+            <a:r>
+              <a:rPr lang="en-US" sz="2400" dirty="0" smtClean="0"/>
+              <a:t>Java </a:t>
+            </a:r>
+            <a:r>
+              <a:rPr lang="en-US" sz="2400" dirty="0"/>
+              <a:t>API </a:t>
+            </a:r>
+            <a:r>
+              <a:rPr lang="en-US" sz="2400" dirty="0" err="1" smtClean="0"/>
+              <a:t>atau</a:t>
+            </a:r>
+            <a:r>
+              <a:rPr lang="en-US" sz="2400" dirty="0" smtClean="0"/>
+              <a:t> </a:t>
+            </a:r>
+            <a:r>
+              <a:rPr lang="en-US" sz="2400" dirty="0" err="1" smtClean="0"/>
+              <a:t>sekumpulan</a:t>
+            </a:r>
+            <a:r>
+              <a:rPr lang="en-US" sz="2400" dirty="0" smtClean="0"/>
+              <a:t> </a:t>
+            </a:r>
+            <a:r>
+              <a:rPr lang="en-US" sz="2400" dirty="0"/>
+              <a:t>CDI </a:t>
+            </a:r>
+            <a:r>
+              <a:rPr lang="en-US" sz="2400" dirty="0" smtClean="0"/>
+              <a:t>services</a:t>
+            </a:r>
+          </a:p>
+          <a:p>
+            <a:pPr marL="342900" indent="-342900">
+              <a:buFont typeface="Arial" panose="020B0604020202020204" pitchFamily="34" charset="0"/>
+              <a:buChar char="•"/>
+            </a:pPr>
+            <a:r>
+              <a:rPr lang="en-US" sz="2400" dirty="0" smtClean="0"/>
+              <a:t>REST</a:t>
+            </a:r>
+          </a:p>
+          <a:p>
+            <a:pPr marL="342900" indent="-342900">
+              <a:buFont typeface="Arial" panose="020B0604020202020204" pitchFamily="34" charset="0"/>
+              <a:buChar char="•"/>
+            </a:pPr>
+            <a:r>
+              <a:rPr lang="en-US" sz="2400" dirty="0" smtClean="0"/>
+              <a:t>JMS </a:t>
+            </a:r>
+            <a:r>
+              <a:rPr lang="en-US" sz="2400" dirty="0"/>
+              <a:t>API.</a:t>
+            </a:r>
+            <a:endParaRPr lang="en-US" sz="2400" dirty="0"/>
           </a:p>
         </p:txBody>
       </p:sp>
       <p:pic>
         <p:nvPicPr>
-          <p:cNvPr id="11" name="Picture 10"/>
+          <p:cNvPr id="12" name="Content Placeholder 13"/>
           <p:cNvPicPr>
-            <a:picLocks noChangeAspect="1"/>
+            <a:picLocks noGrp="1" noChangeAspect="1"/>
           </p:cNvPicPr>
-          <p:nvPr/>
+          <p:nvPr>
+            <p:ph idx="1"/>
+          </p:nvPr>
         </p:nvPicPr>
         <p:blipFill>
-          <a:blip r:embed="rId2"/>
+          <a:blip r:embed="rId2">
+            <a:extLst>
+              <a:ext uri="{28A0092B-C50C-407E-A947-70E740481C1C}">
+                <a14:useLocalDpi xmlns:a14="http://schemas.microsoft.com/office/drawing/2010/main" val="0"/>
+              </a:ext>
+            </a:extLst>
+          </a:blip>
           <a:stretch>
             <a:fillRect/>
           </a:stretch>
         </p:blipFill>
         <p:spPr>
           <a:xfrm>
-            <a:off x="250004" y="2282732"/>
-            <a:ext cx="5838825" cy="4286250"/>
+            <a:off x="444618" y="2425737"/>
+            <a:ext cx="5936116" cy="3878263"/>
           </a:xfrm>
-          <a:prstGeom prst="rect">
-            <a:avLst/>
-          </a:prstGeom>
         </p:spPr>
       </p:pic>
       <p:sp>
         <p:nvSpPr>
-          <p:cNvPr id="8" name="Oval 7"/>
+          <p:cNvPr id="7" name="Oval 6"/>
           <p:cNvSpPr/>
           <p:nvPr/>
         </p:nvSpPr>
         <p:spPr>
           <a:xfrm>
-            <a:off x="3990094" y="3470142"/>
-            <a:ext cx="1169233" cy="1214203"/>
+            <a:off x="2881693" y="3959409"/>
+            <a:ext cx="1015744" cy="914400"/>
           </a:xfrm>
           <a:prstGeom prst="ellipse">
             <a:avLst/>
@@ -7193,7 +9001,7 @@
           <a:noFill/>
           <a:ln w="76200">
             <a:solidFill>
-              <a:schemeClr val="accent5"/>
+              <a:srgbClr val="FFFF00"/>
             </a:solidFill>
           </a:ln>
         </p:spPr>
@@ -7225,7 +9033,7 @@
     </p:spTree>
     <p:extLst>
       <p:ext uri="{BB962C8B-B14F-4D97-AF65-F5344CB8AC3E}">
-        <p14:creationId xmlns:p14="http://schemas.microsoft.com/office/powerpoint/2010/main" val="2247454382"/>
+        <p14:creationId xmlns:p14="http://schemas.microsoft.com/office/powerpoint/2010/main" val="1703341590"/>
       </p:ext>
     </p:extLst>
   </p:cSld>

</xml_diff>